<commit_message>
PPT and some adjustments
</commit_message>
<xml_diff>
--- a/PPT/Back to the basics, explaining design patterns with real life examples - Bridge & Prototype.pptx
+++ b/PPT/Back to the basics, explaining design patterns with real life examples - Bridge & Prototype.pptx
@@ -7,7 +7,7 @@
     <p:sldMasterId id="2147483698" r:id="rId3"/>
   </p:sldMasterIdLst>
   <p:notesMasterIdLst>
-    <p:notesMasterId r:id="rId19"/>
+    <p:notesMasterId r:id="rId21"/>
   </p:notesMasterIdLst>
   <p:sldIdLst>
     <p:sldId id="266" r:id="rId4"/>
@@ -20,11 +20,13 @@
     <p:sldId id="274" r:id="rId11"/>
     <p:sldId id="275" r:id="rId12"/>
     <p:sldId id="276" r:id="rId13"/>
-    <p:sldId id="268" r:id="rId14"/>
+    <p:sldId id="281" r:id="rId14"/>
     <p:sldId id="277" r:id="rId15"/>
-    <p:sldId id="278" r:id="rId16"/>
-    <p:sldId id="279" r:id="rId17"/>
-    <p:sldId id="280" r:id="rId18"/>
+    <p:sldId id="283" r:id="rId16"/>
+    <p:sldId id="284" r:id="rId17"/>
+    <p:sldId id="278" r:id="rId18"/>
+    <p:sldId id="279" r:id="rId19"/>
+    <p:sldId id="285" r:id="rId20"/>
   </p:sldIdLst>
   <p:sldSz cx="24384000" cy="13716000"/>
   <p:notesSz cx="6858000" cy="9144000"/>
@@ -134,7 +136,7 @@
 <file path=ppt/revisionInfo.xml><?xml version="1.0" encoding="utf-8"?>
 <p1510:revInfo xmlns:a="http://schemas.openxmlformats.org/drawingml/2006/main" xmlns:r="http://schemas.openxmlformats.org/officeDocument/2006/relationships" xmlns:p1510="http://schemas.microsoft.com/office/powerpoint/2015/10/main">
   <p1510:revLst>
-    <p1510:client id="{D80A0EBD-EE11-445B-8AB6-F630743B4943}" v="111" dt="2025-06-16T19:16:20.260"/>
+    <p1510:client id="{D80A0EBD-EE11-445B-8AB6-F630743B4943}" v="126" dt="2025-06-23T12:56:43.312"/>
   </p1510:revLst>
 </p1510:revInfo>
 </file>
@@ -144,7 +146,7 @@
   <pc:docChgLst>
     <pc:chgData name="Daniel Laurentiu Schmidt" userId="9ab8f5a0-558d-473f-8210-f04e6f74bedf" providerId="ADAL" clId="{D80A0EBD-EE11-445B-8AB6-F630743B4943}"/>
     <pc:docChg chg="undo redo custSel addSld delSld modSld sldOrd delMainMaster">
-      <pc:chgData name="Daniel Laurentiu Schmidt" userId="9ab8f5a0-558d-473f-8210-f04e6f74bedf" providerId="ADAL" clId="{D80A0EBD-EE11-445B-8AB6-F630743B4943}" dt="2025-06-16T19:19:50.029" v="941" actId="478"/>
+      <pc:chgData name="Daniel Laurentiu Schmidt" userId="9ab8f5a0-558d-473f-8210-f04e6f74bedf" providerId="ADAL" clId="{D80A0EBD-EE11-445B-8AB6-F630743B4943}" dt="2025-06-23T12:58:01.786" v="1906" actId="20577"/>
       <pc:docMkLst>
         <pc:docMk/>
       </pc:docMkLst>
@@ -161,30 +163,6 @@
           <pc:docMk/>
           <pc:sldMk cId="0" sldId="259"/>
         </pc:sldMkLst>
-        <pc:spChg chg="mod">
-          <ac:chgData name="Daniel Laurentiu Schmidt" userId="9ab8f5a0-558d-473f-8210-f04e6f74bedf" providerId="ADAL" clId="{D80A0EBD-EE11-445B-8AB6-F630743B4943}" dt="2025-06-15T11:46:01.324" v="28"/>
-          <ac:spMkLst>
-            <pc:docMk/>
-            <pc:sldMk cId="0" sldId="259"/>
-            <ac:spMk id="3" creationId="{75761519-73CD-674D-6679-ABE98663BB52}"/>
-          </ac:spMkLst>
-        </pc:spChg>
-        <pc:spChg chg="mod">
-          <ac:chgData name="Daniel Laurentiu Schmidt" userId="9ab8f5a0-558d-473f-8210-f04e6f74bedf" providerId="ADAL" clId="{D80A0EBD-EE11-445B-8AB6-F630743B4943}" dt="2025-06-15T11:47:53.712" v="66" actId="207"/>
-          <ac:spMkLst>
-            <pc:docMk/>
-            <pc:sldMk cId="0" sldId="259"/>
-            <ac:spMk id="200" creationId="{00000000-0000-0000-0000-000000000000}"/>
-          </ac:spMkLst>
-        </pc:spChg>
-        <pc:grpChg chg="del">
-          <ac:chgData name="Daniel Laurentiu Schmidt" userId="9ab8f5a0-558d-473f-8210-f04e6f74bedf" providerId="ADAL" clId="{D80A0EBD-EE11-445B-8AB6-F630743B4943}" dt="2025-06-15T11:34:47.190" v="23" actId="478"/>
-          <ac:grpSpMkLst>
-            <pc:docMk/>
-            <pc:sldMk cId="0" sldId="259"/>
-            <ac:grpSpMk id="4" creationId="{00901CB0-BC91-192D-6964-EE4F5143FD51}"/>
-          </ac:grpSpMkLst>
-        </pc:grpChg>
       </pc:sldChg>
       <pc:sldChg chg="new del">
         <pc:chgData name="Daniel Laurentiu Schmidt" userId="9ab8f5a0-558d-473f-8210-f04e6f74bedf" providerId="ADAL" clId="{D80A0EBD-EE11-445B-8AB6-F630743B4943}" dt="2025-06-15T11:49:16.967" v="72" actId="2696"/>
@@ -199,30 +177,6 @@
           <pc:docMk/>
           <pc:sldMk cId="0" sldId="265"/>
         </pc:sldMkLst>
-        <pc:spChg chg="mod ord">
-          <ac:chgData name="Daniel Laurentiu Schmidt" userId="9ab8f5a0-558d-473f-8210-f04e6f74bedf" providerId="ADAL" clId="{D80A0EBD-EE11-445B-8AB6-F630743B4943}" dt="2025-06-15T11:58:43.312" v="122" actId="700"/>
-          <ac:spMkLst>
-            <pc:docMk/>
-            <pc:sldMk cId="0" sldId="265"/>
-            <ac:spMk id="241" creationId="{00000000-0000-0000-0000-000000000000}"/>
-          </ac:spMkLst>
-        </pc:spChg>
-        <pc:spChg chg="mod ord">
-          <ac:chgData name="Daniel Laurentiu Schmidt" userId="9ab8f5a0-558d-473f-8210-f04e6f74bedf" providerId="ADAL" clId="{D80A0EBD-EE11-445B-8AB6-F630743B4943}" dt="2025-06-15T11:58:43.312" v="122" actId="700"/>
-          <ac:spMkLst>
-            <pc:docMk/>
-            <pc:sldMk cId="0" sldId="265"/>
-            <ac:spMk id="242" creationId="{00000000-0000-0000-0000-000000000000}"/>
-          </ac:spMkLst>
-        </pc:spChg>
-        <pc:spChg chg="mod ord">
-          <ac:chgData name="Daniel Laurentiu Schmidt" userId="9ab8f5a0-558d-473f-8210-f04e6f74bedf" providerId="ADAL" clId="{D80A0EBD-EE11-445B-8AB6-F630743B4943}" dt="2025-06-15T11:58:43.312" v="122" actId="700"/>
-          <ac:spMkLst>
-            <pc:docMk/>
-            <pc:sldMk cId="0" sldId="265"/>
-            <ac:spMk id="243" creationId="{00000000-0000-0000-0000-000000000000}"/>
-          </ac:spMkLst>
-        </pc:spChg>
       </pc:sldChg>
       <pc:sldChg chg="delSp modSp add del mod ord setBg">
         <pc:chgData name="Daniel Laurentiu Schmidt" userId="9ab8f5a0-558d-473f-8210-f04e6f74bedf" providerId="ADAL" clId="{D80A0EBD-EE11-445B-8AB6-F630743B4943}" dt="2025-06-15T15:39:56.983" v="129"/>
@@ -246,14 +200,6 @@
             <ac:spMk id="200" creationId="{00000000-0000-0000-0000-000000000000}"/>
           </ac:spMkLst>
         </pc:spChg>
-        <pc:grpChg chg="del">
-          <ac:chgData name="Daniel Laurentiu Schmidt" userId="9ab8f5a0-558d-473f-8210-f04e6f74bedf" providerId="ADAL" clId="{D80A0EBD-EE11-445B-8AB6-F630743B4943}" dt="2025-06-15T11:57:23.531" v="114" actId="478"/>
-          <ac:grpSpMkLst>
-            <pc:docMk/>
-            <pc:sldMk cId="0" sldId="266"/>
-            <ac:grpSpMk id="4" creationId="{00901CB0-BC91-192D-6964-EE4F5143FD51}"/>
-          </ac:grpSpMkLst>
-        </pc:grpChg>
       </pc:sldChg>
       <pc:sldChg chg="new del">
         <pc:chgData name="Daniel Laurentiu Schmidt" userId="9ab8f5a0-558d-473f-8210-f04e6f74bedf" providerId="ADAL" clId="{D80A0EBD-EE11-445B-8AB6-F630743B4943}" dt="2025-06-15T11:49:14.376" v="71" actId="2696"/>
@@ -275,110 +221,6 @@
           <pc:docMk/>
           <pc:sldMk cId="1671190096" sldId="267"/>
         </pc:sldMkLst>
-        <pc:spChg chg="del">
-          <ac:chgData name="Daniel Laurentiu Schmidt" userId="9ab8f5a0-558d-473f-8210-f04e6f74bedf" providerId="ADAL" clId="{D80A0EBD-EE11-445B-8AB6-F630743B4943}" dt="2025-06-15T11:56:11.909" v="102" actId="700"/>
-          <ac:spMkLst>
-            <pc:docMk/>
-            <pc:sldMk cId="1671190096" sldId="267"/>
-            <ac:spMk id="2" creationId="{3B8D2051-05D9-FF02-0D42-76DDA2712B95}"/>
-          </ac:spMkLst>
-        </pc:spChg>
-        <pc:spChg chg="del">
-          <ac:chgData name="Daniel Laurentiu Schmidt" userId="9ab8f5a0-558d-473f-8210-f04e6f74bedf" providerId="ADAL" clId="{D80A0EBD-EE11-445B-8AB6-F630743B4943}" dt="2025-06-15T11:56:11.909" v="102" actId="700"/>
-          <ac:spMkLst>
-            <pc:docMk/>
-            <pc:sldMk cId="1671190096" sldId="267"/>
-            <ac:spMk id="3" creationId="{07396743-9FA5-D141-B5B5-C8812B3C4E79}"/>
-          </ac:spMkLst>
-        </pc:spChg>
-        <pc:spChg chg="del">
-          <ac:chgData name="Daniel Laurentiu Schmidt" userId="9ab8f5a0-558d-473f-8210-f04e6f74bedf" providerId="ADAL" clId="{D80A0EBD-EE11-445B-8AB6-F630743B4943}" dt="2025-06-15T11:56:11.909" v="102" actId="700"/>
-          <ac:spMkLst>
-            <pc:docMk/>
-            <pc:sldMk cId="1671190096" sldId="267"/>
-            <ac:spMk id="4" creationId="{52430842-9C2A-AD4A-CB1C-3428CB844017}"/>
-          </ac:spMkLst>
-        </pc:spChg>
-        <pc:spChg chg="add del mod ord">
-          <ac:chgData name="Daniel Laurentiu Schmidt" userId="9ab8f5a0-558d-473f-8210-f04e6f74bedf" providerId="ADAL" clId="{D80A0EBD-EE11-445B-8AB6-F630743B4943}" dt="2025-06-15T11:57:08.280" v="112" actId="700"/>
-          <ac:spMkLst>
-            <pc:docMk/>
-            <pc:sldMk cId="1671190096" sldId="267"/>
-            <ac:spMk id="5" creationId="{002BB51E-49D7-8CA5-7764-297B5D807AD4}"/>
-          </ac:spMkLst>
-        </pc:spChg>
-        <pc:spChg chg="add del mod">
-          <ac:chgData name="Daniel Laurentiu Schmidt" userId="9ab8f5a0-558d-473f-8210-f04e6f74bedf" providerId="ADAL" clId="{D80A0EBD-EE11-445B-8AB6-F630743B4943}" dt="2025-06-15T11:56:28.488" v="104" actId="26606"/>
-          <ac:spMkLst>
-            <pc:docMk/>
-            <pc:sldMk cId="1671190096" sldId="267"/>
-            <ac:spMk id="6" creationId="{56F769F7-99C3-0606-6365-636CCC89533A}"/>
-          </ac:spMkLst>
-        </pc:spChg>
-        <pc:spChg chg="add del mod">
-          <ac:chgData name="Daniel Laurentiu Schmidt" userId="9ab8f5a0-558d-473f-8210-f04e6f74bedf" providerId="ADAL" clId="{D80A0EBD-EE11-445B-8AB6-F630743B4943}" dt="2025-06-15T11:57:08.280" v="112" actId="700"/>
-          <ac:spMkLst>
-            <pc:docMk/>
-            <pc:sldMk cId="1671190096" sldId="267"/>
-            <ac:spMk id="7" creationId="{4340EDDC-F9F0-6774-5A04-1DFA196A7EDC}"/>
-          </ac:spMkLst>
-        </pc:spChg>
-        <pc:spChg chg="add del mod">
-          <ac:chgData name="Daniel Laurentiu Schmidt" userId="9ab8f5a0-558d-473f-8210-f04e6f74bedf" providerId="ADAL" clId="{D80A0EBD-EE11-445B-8AB6-F630743B4943}" dt="2025-06-15T11:56:28.488" v="104" actId="26606"/>
-          <ac:spMkLst>
-            <pc:docMk/>
-            <pc:sldMk cId="1671190096" sldId="267"/>
-            <ac:spMk id="8" creationId="{4D9523C6-30B4-EE41-79BB-79B38A7CF279}"/>
-          </ac:spMkLst>
-        </pc:spChg>
-        <pc:spChg chg="add del mod">
-          <ac:chgData name="Daniel Laurentiu Schmidt" userId="9ab8f5a0-558d-473f-8210-f04e6f74bedf" providerId="ADAL" clId="{D80A0EBD-EE11-445B-8AB6-F630743B4943}" dt="2025-06-15T11:57:02.891" v="111" actId="478"/>
-          <ac:spMkLst>
-            <pc:docMk/>
-            <pc:sldMk cId="1671190096" sldId="267"/>
-            <ac:spMk id="9" creationId="{8A80FB62-9F09-F840-2564-A4644B0A6C5C}"/>
-          </ac:spMkLst>
-        </pc:spChg>
-        <pc:spChg chg="add del mod">
-          <ac:chgData name="Daniel Laurentiu Schmidt" userId="9ab8f5a0-558d-473f-8210-f04e6f74bedf" providerId="ADAL" clId="{D80A0EBD-EE11-445B-8AB6-F630743B4943}" dt="2025-06-15T11:56:28.488" v="104" actId="26606"/>
-          <ac:spMkLst>
-            <pc:docMk/>
-            <pc:sldMk cId="1671190096" sldId="267"/>
-            <ac:spMk id="10" creationId="{59C40EFE-C6C0-6B8F-196E-430865596817}"/>
-          </ac:spMkLst>
-        </pc:spChg>
-        <pc:spChg chg="add del mod ord">
-          <ac:chgData name="Daniel Laurentiu Schmidt" userId="9ab8f5a0-558d-473f-8210-f04e6f74bedf" providerId="ADAL" clId="{D80A0EBD-EE11-445B-8AB6-F630743B4943}" dt="2025-06-15T11:57:14.940" v="113" actId="478"/>
-          <ac:spMkLst>
-            <pc:docMk/>
-            <pc:sldMk cId="1671190096" sldId="267"/>
-            <ac:spMk id="11" creationId="{721073D7-D12D-5094-3A2D-058B7621C6F4}"/>
-          </ac:spMkLst>
-        </pc:spChg>
-        <pc:spChg chg="add del mod">
-          <ac:chgData name="Daniel Laurentiu Schmidt" userId="9ab8f5a0-558d-473f-8210-f04e6f74bedf" providerId="ADAL" clId="{D80A0EBD-EE11-445B-8AB6-F630743B4943}" dt="2025-06-15T11:56:29.432" v="106" actId="26606"/>
-          <ac:spMkLst>
-            <pc:docMk/>
-            <pc:sldMk cId="1671190096" sldId="267"/>
-            <ac:spMk id="12" creationId="{4DB33648-8A57-E77A-C314-8F45AF4204DA}"/>
-          </ac:spMkLst>
-        </pc:spChg>
-        <pc:spChg chg="add del mod">
-          <ac:chgData name="Daniel Laurentiu Schmidt" userId="9ab8f5a0-558d-473f-8210-f04e6f74bedf" providerId="ADAL" clId="{D80A0EBD-EE11-445B-8AB6-F630743B4943}" dt="2025-06-15T11:56:30.407" v="108" actId="26606"/>
-          <ac:spMkLst>
-            <pc:docMk/>
-            <pc:sldMk cId="1671190096" sldId="267"/>
-            <ac:spMk id="14" creationId="{12DF519C-4F77-1CE3-8CE7-29C3DF2963BB}"/>
-          </ac:spMkLst>
-        </pc:spChg>
-        <pc:spChg chg="add del mod">
-          <ac:chgData name="Daniel Laurentiu Schmidt" userId="9ab8f5a0-558d-473f-8210-f04e6f74bedf" providerId="ADAL" clId="{D80A0EBD-EE11-445B-8AB6-F630743B4943}" dt="2025-06-15T11:56:43.705" v="110" actId="700"/>
-          <ac:spMkLst>
-            <pc:docMk/>
-            <pc:sldMk cId="1671190096" sldId="267"/>
-            <ac:spMk id="16" creationId="{B00AC304-01AA-7800-B5C1-54661BCC9A5D}"/>
-          </ac:spMkLst>
-        </pc:spChg>
       </pc:sldChg>
       <pc:sldChg chg="addSp delSp modSp new mod modClrScheme chgLayout">
         <pc:chgData name="Daniel Laurentiu Schmidt" userId="9ab8f5a0-558d-473f-8210-f04e6f74bedf" providerId="ADAL" clId="{D80A0EBD-EE11-445B-8AB6-F630743B4943}" dt="2025-06-15T16:04:51.379" v="275" actId="1076"/>
@@ -386,14 +228,6 @@
           <pc:docMk/>
           <pc:sldMk cId="2370860523" sldId="267"/>
         </pc:sldMkLst>
-        <pc:spChg chg="del">
-          <ac:chgData name="Daniel Laurentiu Schmidt" userId="9ab8f5a0-558d-473f-8210-f04e6f74bedf" providerId="ADAL" clId="{D80A0EBD-EE11-445B-8AB6-F630743B4943}" dt="2025-06-15T15:43:11.686" v="132" actId="700"/>
-          <ac:spMkLst>
-            <pc:docMk/>
-            <pc:sldMk cId="2370860523" sldId="267"/>
-            <ac:spMk id="2" creationId="{4B274B10-C252-1192-E65B-4A7D30803EA2}"/>
-          </ac:spMkLst>
-        </pc:spChg>
         <pc:spChg chg="add mod">
           <ac:chgData name="Daniel Laurentiu Schmidt" userId="9ab8f5a0-558d-473f-8210-f04e6f74bedf" providerId="ADAL" clId="{D80A0EBD-EE11-445B-8AB6-F630743B4943}" dt="2025-06-15T16:04:11.805" v="272" actId="14100"/>
           <ac:spMkLst>
@@ -408,14 +242,6 @@
             <pc:docMk/>
             <pc:sldMk cId="2370860523" sldId="267"/>
             <ac:spMk id="4" creationId="{D8ECD6E7-0E54-BCF2-09CA-FCA7772CA821}"/>
-          </ac:spMkLst>
-        </pc:spChg>
-        <pc:spChg chg="add del mod">
-          <ac:chgData name="Daniel Laurentiu Schmidt" userId="9ab8f5a0-558d-473f-8210-f04e6f74bedf" providerId="ADAL" clId="{D80A0EBD-EE11-445B-8AB6-F630743B4943}" dt="2025-06-15T15:49:19.373" v="195"/>
-          <ac:spMkLst>
-            <pc:docMk/>
-            <pc:sldMk cId="2370860523" sldId="267"/>
-            <ac:spMk id="5" creationId="{E086637A-3EB0-3A12-CCA0-AFBD05FBDE2B}"/>
           </ac:spMkLst>
         </pc:spChg>
         <pc:spChg chg="add mod">
@@ -434,8 +260,8 @@
           <pc:sldMk cId="0" sldId="268"/>
         </pc:sldMkLst>
       </pc:sldChg>
-      <pc:sldChg chg="new">
-        <pc:chgData name="Daniel Laurentiu Schmidt" userId="9ab8f5a0-558d-473f-8210-f04e6f74bedf" providerId="ADAL" clId="{D80A0EBD-EE11-445B-8AB6-F630743B4943}" dt="2025-06-15T16:00:11.246" v="243" actId="680"/>
+      <pc:sldChg chg="new del">
+        <pc:chgData name="Daniel Laurentiu Schmidt" userId="9ab8f5a0-558d-473f-8210-f04e6f74bedf" providerId="ADAL" clId="{D80A0EBD-EE11-445B-8AB6-F630743B4943}" dt="2025-06-23T08:01:09.187" v="972" actId="2696"/>
         <pc:sldMkLst>
           <pc:docMk/>
           <pc:sldMk cId="3772312407" sldId="268"/>
@@ -486,22 +312,6 @@
             <ac:spMk id="4" creationId="{A1AE92E2-EFC2-411F-FCBB-B8E2A7165C61}"/>
           </ac:spMkLst>
         </pc:spChg>
-        <pc:picChg chg="add del mod">
-          <ac:chgData name="Daniel Laurentiu Schmidt" userId="9ab8f5a0-558d-473f-8210-f04e6f74bedf" providerId="ADAL" clId="{D80A0EBD-EE11-445B-8AB6-F630743B4943}" dt="2025-06-15T19:56:03.659" v="620" actId="478"/>
-          <ac:picMkLst>
-            <pc:docMk/>
-            <pc:sldMk cId="3445509486" sldId="270"/>
-            <ac:picMk id="5" creationId="{28A44DB1-B015-4548-1E28-2525EF54404C}"/>
-          </ac:picMkLst>
-        </pc:picChg>
-        <pc:picChg chg="add del mod">
-          <ac:chgData name="Daniel Laurentiu Schmidt" userId="9ab8f5a0-558d-473f-8210-f04e6f74bedf" providerId="ADAL" clId="{D80A0EBD-EE11-445B-8AB6-F630743B4943}" dt="2025-06-15T19:56:06.159" v="621" actId="478"/>
-          <ac:picMkLst>
-            <pc:docMk/>
-            <pc:sldMk cId="3445509486" sldId="270"/>
-            <ac:picMk id="7" creationId="{1F9BF1CE-A53C-30DF-5BCA-38E78F5BAC34}"/>
-          </ac:picMkLst>
-        </pc:picChg>
         <pc:picChg chg="add mod">
           <ac:chgData name="Daniel Laurentiu Schmidt" userId="9ab8f5a0-558d-473f-8210-f04e6f74bedf" providerId="ADAL" clId="{D80A0EBD-EE11-445B-8AB6-F630743B4943}" dt="2025-06-15T19:56:20.148" v="625" actId="1076"/>
           <ac:picMkLst>
@@ -524,14 +334,6 @@
             <pc:docMk/>
             <pc:sldMk cId="3445509486" sldId="270"/>
             <ac:picMk id="12" creationId="{E6B21B0C-BEC5-DFA0-E158-0E27AD478F93}"/>
-          </ac:picMkLst>
-        </pc:picChg>
-        <pc:picChg chg="add mod">
-          <ac:chgData name="Daniel Laurentiu Schmidt" userId="9ab8f5a0-558d-473f-8210-f04e6f74bedf" providerId="ADAL" clId="{D80A0EBD-EE11-445B-8AB6-F630743B4943}" dt="2025-06-15T19:56:24.719" v="626"/>
-          <ac:picMkLst>
-            <pc:docMk/>
-            <pc:sldMk cId="3445509486" sldId="270"/>
-            <ac:picMk id="13" creationId="{479A80EF-2DDA-D3A6-AB26-FEE5D7881F6E}"/>
           </ac:picMkLst>
         </pc:picChg>
       </pc:sldChg>
@@ -611,14 +413,6 @@
             <ac:spMk id="3" creationId="{54BF6C7B-208A-5AC4-CF35-8A50E6CE5EB3}"/>
           </ac:spMkLst>
         </pc:spChg>
-        <pc:spChg chg="del mod">
-          <ac:chgData name="Daniel Laurentiu Schmidt" userId="9ab8f5a0-558d-473f-8210-f04e6f74bedf" providerId="ADAL" clId="{D80A0EBD-EE11-445B-8AB6-F630743B4943}" dt="2025-06-15T16:12:49.818" v="385"/>
-          <ac:spMkLst>
-            <pc:docMk/>
-            <pc:sldMk cId="1656584900" sldId="273"/>
-            <ac:spMk id="4" creationId="{C831D49F-49B4-E9A3-5CEB-E2771F236CAB}"/>
-          </ac:spMkLst>
-        </pc:spChg>
         <pc:spChg chg="add mod">
           <ac:chgData name="Daniel Laurentiu Schmidt" userId="9ab8f5a0-558d-473f-8210-f04e6f74bedf" providerId="ADAL" clId="{D80A0EBD-EE11-445B-8AB6-F630743B4943}" dt="2025-06-15T16:49:03.059" v="520" actId="1076"/>
           <ac:spMkLst>
@@ -641,54 +435,6 @@
             <pc:docMk/>
             <pc:sldMk cId="1656584900" sldId="273"/>
             <ac:spMk id="7" creationId="{C4D165F4-B37A-E559-568A-A1BB027F987B}"/>
-          </ac:spMkLst>
-        </pc:spChg>
-        <pc:spChg chg="add del mod">
-          <ac:chgData name="Daniel Laurentiu Schmidt" userId="9ab8f5a0-558d-473f-8210-f04e6f74bedf" providerId="ADAL" clId="{D80A0EBD-EE11-445B-8AB6-F630743B4943}" dt="2025-06-15T16:45:24.936" v="441" actId="478"/>
-          <ac:spMkLst>
-            <pc:docMk/>
-            <pc:sldMk cId="1656584900" sldId="273"/>
-            <ac:spMk id="8" creationId="{695F7A50-31A1-B3E8-2D3F-DD36A448BCEC}"/>
-          </ac:spMkLst>
-        </pc:spChg>
-        <pc:spChg chg="add mod">
-          <ac:chgData name="Daniel Laurentiu Schmidt" userId="9ab8f5a0-558d-473f-8210-f04e6f74bedf" providerId="ADAL" clId="{D80A0EBD-EE11-445B-8AB6-F630743B4943}" dt="2025-06-15T16:44:27.616" v="427"/>
-          <ac:spMkLst>
-            <pc:docMk/>
-            <pc:sldMk cId="1656584900" sldId="273"/>
-            <ac:spMk id="9" creationId="{C234F2E7-E994-D0D3-A397-D132D39A4D48}"/>
-          </ac:spMkLst>
-        </pc:spChg>
-        <pc:spChg chg="add mod">
-          <ac:chgData name="Daniel Laurentiu Schmidt" userId="9ab8f5a0-558d-473f-8210-f04e6f74bedf" providerId="ADAL" clId="{D80A0EBD-EE11-445B-8AB6-F630743B4943}" dt="2025-06-15T16:44:27.168" v="426"/>
-          <ac:spMkLst>
-            <pc:docMk/>
-            <pc:sldMk cId="1656584900" sldId="273"/>
-            <ac:spMk id="10" creationId="{A44807E4-0052-6C50-4707-8005CE50DB23}"/>
-          </ac:spMkLst>
-        </pc:spChg>
-        <pc:spChg chg="add del mod">
-          <ac:chgData name="Daniel Laurentiu Schmidt" userId="9ab8f5a0-558d-473f-8210-f04e6f74bedf" providerId="ADAL" clId="{D80A0EBD-EE11-445B-8AB6-F630743B4943}" dt="2025-06-15T16:45:35.448" v="443" actId="478"/>
-          <ac:spMkLst>
-            <pc:docMk/>
-            <pc:sldMk cId="1656584900" sldId="273"/>
-            <ac:spMk id="11" creationId="{C23DBD93-F897-5E00-14E6-1EE2659ABB9C}"/>
-          </ac:spMkLst>
-        </pc:spChg>
-        <pc:spChg chg="add del mod">
-          <ac:chgData name="Daniel Laurentiu Schmidt" userId="9ab8f5a0-558d-473f-8210-f04e6f74bedf" providerId="ADAL" clId="{D80A0EBD-EE11-445B-8AB6-F630743B4943}" dt="2025-06-15T16:45:13.161" v="438"/>
-          <ac:spMkLst>
-            <pc:docMk/>
-            <pc:sldMk cId="1656584900" sldId="273"/>
-            <ac:spMk id="12" creationId="{59AF21D9-4B42-3CA9-EE78-5DE35150F5E9}"/>
-          </ac:spMkLst>
-        </pc:spChg>
-        <pc:spChg chg="add">
-          <ac:chgData name="Daniel Laurentiu Schmidt" userId="9ab8f5a0-558d-473f-8210-f04e6f74bedf" providerId="ADAL" clId="{D80A0EBD-EE11-445B-8AB6-F630743B4943}" dt="2025-06-15T16:47:06.442" v="478"/>
-          <ac:spMkLst>
-            <pc:docMk/>
-            <pc:sldMk cId="1656584900" sldId="273"/>
-            <ac:spMk id="13" creationId="{C8327723-06EB-47FD-F471-2EEA6FAE8D1B}"/>
           </ac:spMkLst>
         </pc:spChg>
       </pc:sldChg>
@@ -714,22 +460,6 @@
             <ac:spMk id="3" creationId="{1626B9A1-5239-6F2E-FE25-89AA3967ED7B}"/>
           </ac:spMkLst>
         </pc:spChg>
-        <pc:spChg chg="del">
-          <ac:chgData name="Daniel Laurentiu Schmidt" userId="9ab8f5a0-558d-473f-8210-f04e6f74bedf" providerId="ADAL" clId="{D80A0EBD-EE11-445B-8AB6-F630743B4943}" dt="2025-06-15T19:50:53.028" v="561" actId="478"/>
-          <ac:spMkLst>
-            <pc:docMk/>
-            <pc:sldMk cId="3767381252" sldId="274"/>
-            <ac:spMk id="5" creationId="{3A4568B3-456C-283D-0591-F4F9F8C2C686}"/>
-          </ac:spMkLst>
-        </pc:spChg>
-        <pc:spChg chg="del">
-          <ac:chgData name="Daniel Laurentiu Schmidt" userId="9ab8f5a0-558d-473f-8210-f04e6f74bedf" providerId="ADAL" clId="{D80A0EBD-EE11-445B-8AB6-F630743B4943}" dt="2025-06-15T19:50:51.480" v="560" actId="478"/>
-          <ac:spMkLst>
-            <pc:docMk/>
-            <pc:sldMk cId="3767381252" sldId="274"/>
-            <ac:spMk id="7" creationId="{DC86F7EE-0EA3-B058-EAC5-616715BA5E82}"/>
-          </ac:spMkLst>
-        </pc:spChg>
       </pc:sldChg>
       <pc:sldChg chg="addSp delSp modSp add mod">
         <pc:chgData name="Daniel Laurentiu Schmidt" userId="9ab8f5a0-558d-473f-8210-f04e6f74bedf" providerId="ADAL" clId="{D80A0EBD-EE11-445B-8AB6-F630743B4943}" dt="2025-06-15T20:15:21.368" v="781" actId="1076"/>
@@ -737,14 +467,6 @@
           <pc:docMk/>
           <pc:sldMk cId="3640432184" sldId="275"/>
         </pc:sldMkLst>
-        <pc:spChg chg="del">
-          <ac:chgData name="Daniel Laurentiu Schmidt" userId="9ab8f5a0-558d-473f-8210-f04e6f74bedf" providerId="ADAL" clId="{D80A0EBD-EE11-445B-8AB6-F630743B4943}" dt="2025-06-15T19:57:07.900" v="630" actId="478"/>
-          <ac:spMkLst>
-            <pc:docMk/>
-            <pc:sldMk cId="3640432184" sldId="275"/>
-            <ac:spMk id="2" creationId="{C8613C2B-66B7-1692-7779-5F7864F416BF}"/>
-          </ac:spMkLst>
-        </pc:spChg>
         <pc:spChg chg="add del mod">
           <ac:chgData name="Daniel Laurentiu Schmidt" userId="9ab8f5a0-558d-473f-8210-f04e6f74bedf" providerId="ADAL" clId="{D80A0EBD-EE11-445B-8AB6-F630743B4943}" dt="2025-06-15T19:57:47.650" v="661" actId="20577"/>
           <ac:spMkLst>
@@ -753,38 +475,6 @@
             <ac:spMk id="3" creationId="{708520F1-5CB1-3E72-1463-566343371991}"/>
           </ac:spMkLst>
         </pc:spChg>
-        <pc:spChg chg="add del mod">
-          <ac:chgData name="Daniel Laurentiu Schmidt" userId="9ab8f5a0-558d-473f-8210-f04e6f74bedf" providerId="ADAL" clId="{D80A0EBD-EE11-445B-8AB6-F630743B4943}" dt="2025-06-15T20:11:11.088" v="691"/>
-          <ac:spMkLst>
-            <pc:docMk/>
-            <pc:sldMk cId="3640432184" sldId="275"/>
-            <ac:spMk id="5" creationId="{8B58C7E6-467D-5F33-B470-27599460C5E5}"/>
-          </ac:spMkLst>
-        </pc:spChg>
-        <pc:spChg chg="add del">
-          <ac:chgData name="Daniel Laurentiu Schmidt" userId="9ab8f5a0-558d-473f-8210-f04e6f74bedf" providerId="ADAL" clId="{D80A0EBD-EE11-445B-8AB6-F630743B4943}" dt="2025-06-15T20:14:40.474" v="774" actId="22"/>
-          <ac:spMkLst>
-            <pc:docMk/>
-            <pc:sldMk cId="3640432184" sldId="275"/>
-            <ac:spMk id="9" creationId="{E7A085D9-66F1-02CE-B7AF-38F02DF7C6CD}"/>
-          </ac:spMkLst>
-        </pc:spChg>
-        <pc:picChg chg="add mod">
-          <ac:chgData name="Daniel Laurentiu Schmidt" userId="9ab8f5a0-558d-473f-8210-f04e6f74bedf" providerId="ADAL" clId="{D80A0EBD-EE11-445B-8AB6-F630743B4943}" dt="2025-06-15T19:57:43.483" v="649"/>
-          <ac:picMkLst>
-            <pc:docMk/>
-            <pc:sldMk cId="3640432184" sldId="275"/>
-            <ac:picMk id="4" creationId="{7A213A40-6EF6-D9FA-B317-77721E8D01B9}"/>
-          </ac:picMkLst>
-        </pc:picChg>
-        <pc:picChg chg="add del mod">
-          <ac:chgData name="Daniel Laurentiu Schmidt" userId="9ab8f5a0-558d-473f-8210-f04e6f74bedf" providerId="ADAL" clId="{D80A0EBD-EE11-445B-8AB6-F630743B4943}" dt="2025-06-15T20:11:07.338" v="688" actId="478"/>
-          <ac:picMkLst>
-            <pc:docMk/>
-            <pc:sldMk cId="3640432184" sldId="275"/>
-            <ac:picMk id="7" creationId="{B124FD6A-430C-3F5F-DD17-1DF763CD009E}"/>
-          </ac:picMkLst>
-        </pc:picChg>
         <pc:picChg chg="add mod">
           <ac:chgData name="Daniel Laurentiu Schmidt" userId="9ab8f5a0-558d-473f-8210-f04e6f74bedf" providerId="ADAL" clId="{D80A0EBD-EE11-445B-8AB6-F630743B4943}" dt="2025-06-15T20:15:21.368" v="781" actId="1076"/>
           <ac:picMkLst>
@@ -824,14 +514,6 @@
             <ac:picMk id="2" creationId="{E40E035D-5ABF-97C3-30B8-966E10D43B79}"/>
           </ac:picMkLst>
         </pc:picChg>
-        <pc:picChg chg="del">
-          <ac:chgData name="Daniel Laurentiu Schmidt" userId="9ab8f5a0-558d-473f-8210-f04e6f74bedf" providerId="ADAL" clId="{D80A0EBD-EE11-445B-8AB6-F630743B4943}" dt="2025-06-15T20:15:34.229" v="795" actId="478"/>
-          <ac:picMkLst>
-            <pc:docMk/>
-            <pc:sldMk cId="461529983" sldId="276"/>
-            <ac:picMk id="10" creationId="{85015803-C002-E9D5-878A-078F01C28778}"/>
-          </ac:picMkLst>
-        </pc:picChg>
       </pc:sldChg>
       <pc:sldChg chg="addSp modSp add mod ord">
         <pc:chgData name="Daniel Laurentiu Schmidt" userId="9ab8f5a0-558d-473f-8210-f04e6f74bedf" providerId="ADAL" clId="{D80A0EBD-EE11-445B-8AB6-F630743B4943}" dt="2025-06-16T18:55:29.035" v="865" actId="1076"/>
@@ -845,14 +527,6 @@
             <pc:docMk/>
             <pc:sldMk cId="3184352506" sldId="277"/>
             <ac:spMk id="2" creationId="{D42E4777-6320-484D-35B8-4FC90A20ACE2}"/>
-          </ac:spMkLst>
-        </pc:spChg>
-        <pc:spChg chg="add">
-          <ac:chgData name="Daniel Laurentiu Schmidt" userId="9ab8f5a0-558d-473f-8210-f04e6f74bedf" providerId="ADAL" clId="{D80A0EBD-EE11-445B-8AB6-F630743B4943}" dt="2025-06-16T18:47:19.064" v="853"/>
-          <ac:spMkLst>
-            <pc:docMk/>
-            <pc:sldMk cId="3184352506" sldId="277"/>
-            <ac:spMk id="4" creationId="{35A230F2-3DA0-8A3E-2962-69B85CA05C37}"/>
           </ac:spMkLst>
         </pc:spChg>
         <pc:spChg chg="mod">
@@ -871,63 +545,15 @@
             <ac:spMk id="7" creationId="{8113B97D-B264-A6C4-ABA6-F079C3841A2C}"/>
           </ac:spMkLst>
         </pc:spChg>
-        <pc:spChg chg="add">
-          <ac:chgData name="Daniel Laurentiu Schmidt" userId="9ab8f5a0-558d-473f-8210-f04e6f74bedf" providerId="ADAL" clId="{D80A0EBD-EE11-445B-8AB6-F630743B4943}" dt="2025-06-16T18:47:30.014" v="854"/>
-          <ac:spMkLst>
-            <pc:docMk/>
-            <pc:sldMk cId="3184352506" sldId="277"/>
-            <ac:spMk id="8" creationId="{788CEA1E-3452-4BED-E77B-A481EF0A1989}"/>
-          </ac:spMkLst>
-        </pc:spChg>
-        <pc:spChg chg="add">
-          <ac:chgData name="Daniel Laurentiu Schmidt" userId="9ab8f5a0-558d-473f-8210-f04e6f74bedf" providerId="ADAL" clId="{D80A0EBD-EE11-445B-8AB6-F630743B4943}" dt="2025-06-16T18:47:40.564" v="855"/>
-          <ac:spMkLst>
-            <pc:docMk/>
-            <pc:sldMk cId="3184352506" sldId="277"/>
-            <ac:spMk id="9" creationId="{D6995FB5-08A1-033E-B432-7D4ABCA8F758}"/>
-          </ac:spMkLst>
-        </pc:spChg>
-        <pc:spChg chg="add">
-          <ac:chgData name="Daniel Laurentiu Schmidt" userId="9ab8f5a0-558d-473f-8210-f04e6f74bedf" providerId="ADAL" clId="{D80A0EBD-EE11-445B-8AB6-F630743B4943}" dt="2025-06-16T18:47:49.770" v="856"/>
-          <ac:spMkLst>
-            <pc:docMk/>
-            <pc:sldMk cId="3184352506" sldId="277"/>
-            <ac:spMk id="10" creationId="{C79C73F3-6C3C-88E0-C19C-617DA5D77ACD}"/>
-          </ac:spMkLst>
-        </pc:spChg>
-        <pc:spChg chg="add">
-          <ac:chgData name="Daniel Laurentiu Schmidt" userId="9ab8f5a0-558d-473f-8210-f04e6f74bedf" providerId="ADAL" clId="{D80A0EBD-EE11-445B-8AB6-F630743B4943}" dt="2025-06-16T18:47:52.879" v="857"/>
-          <ac:spMkLst>
-            <pc:docMk/>
-            <pc:sldMk cId="3184352506" sldId="277"/>
-            <ac:spMk id="11" creationId="{DC5F3C65-826E-FAF7-0E1A-63FF84A6F5A4}"/>
-          </ac:spMkLst>
-        </pc:spChg>
-        <pc:spChg chg="add">
-          <ac:chgData name="Daniel Laurentiu Schmidt" userId="9ab8f5a0-558d-473f-8210-f04e6f74bedf" providerId="ADAL" clId="{D80A0EBD-EE11-445B-8AB6-F630743B4943}" dt="2025-06-16T18:47:54.132" v="858"/>
-          <ac:spMkLst>
-            <pc:docMk/>
-            <pc:sldMk cId="3184352506" sldId="277"/>
-            <ac:spMk id="12" creationId="{1F80A373-D029-8EF8-45AB-9AD8D8B3E61C}"/>
-          </ac:spMkLst>
-        </pc:spChg>
       </pc:sldChg>
       <pc:sldChg chg="addSp delSp modSp add mod">
-        <pc:chgData name="Daniel Laurentiu Schmidt" userId="9ab8f5a0-558d-473f-8210-f04e6f74bedf" providerId="ADAL" clId="{D80A0EBD-EE11-445B-8AB6-F630743B4943}" dt="2025-06-16T19:13:31.426" v="903" actId="12"/>
+        <pc:chgData name="Daniel Laurentiu Schmidt" userId="9ab8f5a0-558d-473f-8210-f04e6f74bedf" providerId="ADAL" clId="{D80A0EBD-EE11-445B-8AB6-F630743B4943}" dt="2025-06-23T12:58:01.786" v="1906" actId="20577"/>
         <pc:sldMkLst>
           <pc:docMk/>
           <pc:sldMk cId="2893984340" sldId="278"/>
         </pc:sldMkLst>
-        <pc:spChg chg="del">
-          <ac:chgData name="Daniel Laurentiu Schmidt" userId="9ab8f5a0-558d-473f-8210-f04e6f74bedf" providerId="ADAL" clId="{D80A0EBD-EE11-445B-8AB6-F630743B4943}" dt="2025-06-16T19:12:06.742" v="887" actId="478"/>
-          <ac:spMkLst>
-            <pc:docMk/>
-            <pc:sldMk cId="2893984340" sldId="278"/>
-            <ac:spMk id="2" creationId="{8CB6CA55-D81E-56AC-17C4-9721D0E33161}"/>
-          </ac:spMkLst>
-        </pc:spChg>
         <pc:spChg chg="mod">
-          <ac:chgData name="Daniel Laurentiu Schmidt" userId="9ab8f5a0-558d-473f-8210-f04e6f74bedf" providerId="ADAL" clId="{D80A0EBD-EE11-445B-8AB6-F630743B4943}" dt="2025-06-16T18:59:15.523" v="886" actId="20577"/>
+          <ac:chgData name="Daniel Laurentiu Schmidt" userId="9ab8f5a0-558d-473f-8210-f04e6f74bedf" providerId="ADAL" clId="{D80A0EBD-EE11-445B-8AB6-F630743B4943}" dt="2025-06-23T12:58:01.786" v="1906" actId="20577"/>
           <ac:spMkLst>
             <pc:docMk/>
             <pc:sldMk cId="2893984340" sldId="278"/>
@@ -940,22 +566,6 @@
             <pc:docMk/>
             <pc:sldMk cId="2893984340" sldId="278"/>
             <ac:spMk id="4" creationId="{7BD96063-02C3-5E2D-7C84-051C0ADE8839}"/>
-          </ac:spMkLst>
-        </pc:spChg>
-        <pc:spChg chg="del">
-          <ac:chgData name="Daniel Laurentiu Schmidt" userId="9ab8f5a0-558d-473f-8210-f04e6f74bedf" providerId="ADAL" clId="{D80A0EBD-EE11-445B-8AB6-F630743B4943}" dt="2025-06-16T19:12:06.742" v="887" actId="478"/>
-          <ac:spMkLst>
-            <pc:docMk/>
-            <pc:sldMk cId="2893984340" sldId="278"/>
-            <ac:spMk id="5" creationId="{9A938B64-601F-DE3C-EE56-83FE0D9FF1C2}"/>
-          </ac:spMkLst>
-        </pc:spChg>
-        <pc:spChg chg="del">
-          <ac:chgData name="Daniel Laurentiu Schmidt" userId="9ab8f5a0-558d-473f-8210-f04e6f74bedf" providerId="ADAL" clId="{D80A0EBD-EE11-445B-8AB6-F630743B4943}" dt="2025-06-16T19:12:06.742" v="887" actId="478"/>
-          <ac:spMkLst>
-            <pc:docMk/>
-            <pc:sldMk cId="2893984340" sldId="278"/>
-            <ac:spMk id="7" creationId="{5A781E5D-9639-6FFB-B3B7-40228FCB71E1}"/>
           </ac:spMkLst>
         </pc:spChg>
       </pc:sldChg>
@@ -981,37 +591,13 @@
             <ac:spMk id="4" creationId="{99A145CF-A727-429B-0396-E9FA4AB03608}"/>
           </ac:spMkLst>
         </pc:spChg>
-        <pc:picChg chg="add del">
-          <ac:chgData name="Daniel Laurentiu Schmidt" userId="9ab8f5a0-558d-473f-8210-f04e6f74bedf" providerId="ADAL" clId="{D80A0EBD-EE11-445B-8AB6-F630743B4943}" dt="2025-06-16T19:15:52.771" v="919" actId="22"/>
-          <ac:picMkLst>
-            <pc:docMk/>
-            <pc:sldMk cId="1667982708" sldId="279"/>
-            <ac:picMk id="5" creationId="{A4CE65BB-A6BF-BB38-E35A-6FD0B2E1D821}"/>
-          </ac:picMkLst>
-        </pc:picChg>
       </pc:sldChg>
-      <pc:sldChg chg="addSp delSp modSp add mod">
-        <pc:chgData name="Daniel Laurentiu Schmidt" userId="9ab8f5a0-558d-473f-8210-f04e6f74bedf" providerId="ADAL" clId="{D80A0EBD-EE11-445B-8AB6-F630743B4943}" dt="2025-06-16T19:19:50.029" v="941" actId="478"/>
+      <pc:sldChg chg="addSp delSp modSp add del mod">
+        <pc:chgData name="Daniel Laurentiu Schmidt" userId="9ab8f5a0-558d-473f-8210-f04e6f74bedf" providerId="ADAL" clId="{D80A0EBD-EE11-445B-8AB6-F630743B4943}" dt="2025-06-23T12:56:18.785" v="1845" actId="47"/>
         <pc:sldMkLst>
           <pc:docMk/>
           <pc:sldMk cId="2601877011" sldId="280"/>
         </pc:sldMkLst>
-        <pc:spChg chg="del">
-          <ac:chgData name="Daniel Laurentiu Schmidt" userId="9ab8f5a0-558d-473f-8210-f04e6f74bedf" providerId="ADAL" clId="{D80A0EBD-EE11-445B-8AB6-F630743B4943}" dt="2025-06-16T19:19:50.029" v="941" actId="478"/>
-          <ac:spMkLst>
-            <pc:docMk/>
-            <pc:sldMk cId="2601877011" sldId="280"/>
-            <ac:spMk id="3" creationId="{19BB658B-65CF-EF2B-1E13-C4928AF2AA81}"/>
-          </ac:spMkLst>
-        </pc:spChg>
-        <pc:spChg chg="del">
-          <ac:chgData name="Daniel Laurentiu Schmidt" userId="9ab8f5a0-558d-473f-8210-f04e6f74bedf" providerId="ADAL" clId="{D80A0EBD-EE11-445B-8AB6-F630743B4943}" dt="2025-06-16T19:19:50.029" v="941" actId="478"/>
-          <ac:spMkLst>
-            <pc:docMk/>
-            <pc:sldMk cId="2601877011" sldId="280"/>
-            <ac:spMk id="4" creationId="{520BD3AD-BE94-98A9-6D39-22BE8DA700BD}"/>
-          </ac:spMkLst>
-        </pc:spChg>
         <pc:spChg chg="add mod">
           <ac:chgData name="Daniel Laurentiu Schmidt" userId="9ab8f5a0-558d-473f-8210-f04e6f74bedf" providerId="ADAL" clId="{D80A0EBD-EE11-445B-8AB6-F630743B4943}" dt="2025-06-16T19:19:50.029" v="941" actId="478"/>
           <ac:spMkLst>
@@ -1020,12 +606,119 @@
             <ac:spMk id="5" creationId="{36C170B6-A7B9-F491-43BB-A27B9BAA1F8E}"/>
           </ac:spMkLst>
         </pc:spChg>
-        <pc:spChg chg="del">
-          <ac:chgData name="Daniel Laurentiu Schmidt" userId="9ab8f5a0-558d-473f-8210-f04e6f74bedf" providerId="ADAL" clId="{D80A0EBD-EE11-445B-8AB6-F630743B4943}" dt="2025-06-16T19:19:50.029" v="941" actId="478"/>
+      </pc:sldChg>
+      <pc:sldChg chg="delSp modSp add mod">
+        <pc:chgData name="Daniel Laurentiu Schmidt" userId="9ab8f5a0-558d-473f-8210-f04e6f74bedf" providerId="ADAL" clId="{D80A0EBD-EE11-445B-8AB6-F630743B4943}" dt="2025-06-23T08:01:01.756" v="971"/>
+        <pc:sldMkLst>
+          <pc:docMk/>
+          <pc:sldMk cId="3803058074" sldId="281"/>
+        </pc:sldMkLst>
+        <pc:spChg chg="mod">
+          <ac:chgData name="Daniel Laurentiu Schmidt" userId="9ab8f5a0-558d-473f-8210-f04e6f74bedf" providerId="ADAL" clId="{D80A0EBD-EE11-445B-8AB6-F630743B4943}" dt="2025-06-23T08:00:45.318" v="966" actId="20577"/>
           <ac:spMkLst>
             <pc:docMk/>
-            <pc:sldMk cId="2601877011" sldId="280"/>
-            <ac:spMk id="6" creationId="{8EB7FF48-1656-FBB2-274D-315CEE1AAECD}"/>
+            <pc:sldMk cId="3803058074" sldId="281"/>
+            <ac:spMk id="3" creationId="{1F1C976F-2A3E-AE4E-B9C6-89565BCC1937}"/>
+          </ac:spMkLst>
+        </pc:spChg>
+        <pc:spChg chg="mod">
+          <ac:chgData name="Daniel Laurentiu Schmidt" userId="9ab8f5a0-558d-473f-8210-f04e6f74bedf" providerId="ADAL" clId="{D80A0EBD-EE11-445B-8AB6-F630743B4943}" dt="2025-06-23T08:01:01.756" v="971"/>
+          <ac:spMkLst>
+            <pc:docMk/>
+            <pc:sldMk cId="3803058074" sldId="281"/>
+            <ac:spMk id="4" creationId="{21793812-83EB-98F9-C1AA-5DDDF9E51F50}"/>
+          </ac:spMkLst>
+        </pc:spChg>
+        <pc:picChg chg="del">
+          <ac:chgData name="Daniel Laurentiu Schmidt" userId="9ab8f5a0-558d-473f-8210-f04e6f74bedf" providerId="ADAL" clId="{D80A0EBD-EE11-445B-8AB6-F630743B4943}" dt="2025-06-23T08:00:26.873" v="943" actId="478"/>
+          <ac:picMkLst>
+            <pc:docMk/>
+            <pc:sldMk cId="3803058074" sldId="281"/>
+            <ac:picMk id="2" creationId="{DE6B54DB-B116-AC42-7A89-45F49A3C4154}"/>
+          </ac:picMkLst>
+        </pc:picChg>
+      </pc:sldChg>
+      <pc:sldChg chg="add del">
+        <pc:chgData name="Daniel Laurentiu Schmidt" userId="9ab8f5a0-558d-473f-8210-f04e6f74bedf" providerId="ADAL" clId="{D80A0EBD-EE11-445B-8AB6-F630743B4943}" dt="2025-06-23T08:01:43.190" v="979" actId="2696"/>
+        <pc:sldMkLst>
+          <pc:docMk/>
+          <pc:sldMk cId="692081194" sldId="282"/>
+        </pc:sldMkLst>
+      </pc:sldChg>
+      <pc:sldChg chg="modSp add mod ord">
+        <pc:chgData name="Daniel Laurentiu Schmidt" userId="9ab8f5a0-558d-473f-8210-f04e6f74bedf" providerId="ADAL" clId="{D80A0EBD-EE11-445B-8AB6-F630743B4943}" dt="2025-06-23T12:55:59.031" v="1832" actId="20577"/>
+        <pc:sldMkLst>
+          <pc:docMk/>
+          <pc:sldMk cId="1510368498" sldId="283"/>
+        </pc:sldMkLst>
+        <pc:spChg chg="mod">
+          <ac:chgData name="Daniel Laurentiu Schmidt" userId="9ab8f5a0-558d-473f-8210-f04e6f74bedf" providerId="ADAL" clId="{D80A0EBD-EE11-445B-8AB6-F630743B4943}" dt="2025-06-23T12:54:27.669" v="1809" actId="20577"/>
+          <ac:spMkLst>
+            <pc:docMk/>
+            <pc:sldMk cId="1510368498" sldId="283"/>
+            <ac:spMk id="2" creationId="{66FDA351-0C36-CE1B-05BB-EE80B892548C}"/>
+          </ac:spMkLst>
+        </pc:spChg>
+        <pc:spChg chg="mod">
+          <ac:chgData name="Daniel Laurentiu Schmidt" userId="9ab8f5a0-558d-473f-8210-f04e6f74bedf" providerId="ADAL" clId="{D80A0EBD-EE11-445B-8AB6-F630743B4943}" dt="2025-06-23T12:55:59.031" v="1832" actId="20577"/>
+          <ac:spMkLst>
+            <pc:docMk/>
+            <pc:sldMk cId="1510368498" sldId="283"/>
+            <ac:spMk id="6" creationId="{B29F58BD-E68B-8200-F803-1BF6500FFDE7}"/>
+          </ac:spMkLst>
+        </pc:spChg>
+      </pc:sldChg>
+      <pc:sldChg chg="addSp delSp modSp add mod">
+        <pc:chgData name="Daniel Laurentiu Schmidt" userId="9ab8f5a0-558d-473f-8210-f04e6f74bedf" providerId="ADAL" clId="{D80A0EBD-EE11-445B-8AB6-F630743B4943}" dt="2025-06-23T12:56:03.247" v="1841" actId="20577"/>
+        <pc:sldMkLst>
+          <pc:docMk/>
+          <pc:sldMk cId="4086353399" sldId="284"/>
+        </pc:sldMkLst>
+        <pc:spChg chg="del mod">
+          <ac:chgData name="Daniel Laurentiu Schmidt" userId="9ab8f5a0-558d-473f-8210-f04e6f74bedf" providerId="ADAL" clId="{D80A0EBD-EE11-445B-8AB6-F630743B4943}" dt="2025-06-23T12:54:44.471" v="1815" actId="478"/>
+          <ac:spMkLst>
+            <pc:docMk/>
+            <pc:sldMk cId="4086353399" sldId="284"/>
+            <ac:spMk id="2" creationId="{350CC40F-0C9D-43B6-F8B0-537691A7D4CC}"/>
+          </ac:spMkLst>
+        </pc:spChg>
+        <pc:spChg chg="mod">
+          <ac:chgData name="Daniel Laurentiu Schmidt" userId="9ab8f5a0-558d-473f-8210-f04e6f74bedf" providerId="ADAL" clId="{D80A0EBD-EE11-445B-8AB6-F630743B4943}" dt="2025-06-23T12:56:03.247" v="1841" actId="20577"/>
+          <ac:spMkLst>
+            <pc:docMk/>
+            <pc:sldMk cId="4086353399" sldId="284"/>
+            <ac:spMk id="6" creationId="{9A73F275-46C1-0232-23CD-0594E20FA1B6}"/>
+          </ac:spMkLst>
+        </pc:spChg>
+        <pc:picChg chg="add mod">
+          <ac:chgData name="Daniel Laurentiu Schmidt" userId="9ab8f5a0-558d-473f-8210-f04e6f74bedf" providerId="ADAL" clId="{D80A0EBD-EE11-445B-8AB6-F630743B4943}" dt="2025-06-23T12:55:34.004" v="1821" actId="1076"/>
+          <ac:picMkLst>
+            <pc:docMk/>
+            <pc:sldMk cId="4086353399" sldId="284"/>
+            <ac:picMk id="5" creationId="{25FAD399-C65F-C235-7B42-860886FC2112}"/>
+          </ac:picMkLst>
+        </pc:picChg>
+      </pc:sldChg>
+      <pc:sldChg chg="modSp add mod ord">
+        <pc:chgData name="Daniel Laurentiu Schmidt" userId="9ab8f5a0-558d-473f-8210-f04e6f74bedf" providerId="ADAL" clId="{D80A0EBD-EE11-445B-8AB6-F630743B4943}" dt="2025-06-23T12:56:43.312" v="1859"/>
+        <pc:sldMkLst>
+          <pc:docMk/>
+          <pc:sldMk cId="1457509898" sldId="285"/>
+        </pc:sldMkLst>
+        <pc:spChg chg="mod">
+          <ac:chgData name="Daniel Laurentiu Schmidt" userId="9ab8f5a0-558d-473f-8210-f04e6f74bedf" providerId="ADAL" clId="{D80A0EBD-EE11-445B-8AB6-F630743B4943}" dt="2025-06-23T12:56:43.312" v="1859"/>
+          <ac:spMkLst>
+            <pc:docMk/>
+            <pc:sldMk cId="1457509898" sldId="285"/>
+            <ac:spMk id="4" creationId="{5C7F35E6-AB7E-931E-6AC9-32962D1F5DCA}"/>
+          </ac:spMkLst>
+        </pc:spChg>
+        <pc:spChg chg="mod">
+          <ac:chgData name="Daniel Laurentiu Schmidt" userId="9ab8f5a0-558d-473f-8210-f04e6f74bedf" providerId="ADAL" clId="{D80A0EBD-EE11-445B-8AB6-F630743B4943}" dt="2025-06-23T12:56:23.023" v="1854" actId="20577"/>
+          <ac:spMkLst>
+            <pc:docMk/>
+            <pc:sldMk cId="1457509898" sldId="285"/>
+            <ac:spMk id="6" creationId="{FE5F7E66-8DA2-25AB-BC88-E55837F038F7}"/>
           </ac:spMkLst>
         </pc:spChg>
       </pc:sldChg>
@@ -1280,7 +973,7 @@
           <a:p>
             <a:fld id="{F3818F04-716F-4EA1-8D94-EE650D13863D}" type="datetimeFigureOut">
               <a:rPr lang="en-US" smtClean="0"/>
-              <a:t>6/15/2025</a:t>
+              <a:t>6/23/2025</a:t>
             </a:fld>
             <a:endParaRPr lang="en-US"/>
           </a:p>
@@ -1639,7 +1332,7 @@
         <p:cNvPr id="1" name="">
           <a:extLst>
             <a:ext uri="{FF2B5EF4-FFF2-40B4-BE49-F238E27FC236}">
-              <a16:creationId xmlns:a16="http://schemas.microsoft.com/office/drawing/2014/main" id="{B5426745-D84C-9988-78AF-118BB3B66C64}"/>
+              <a16:creationId xmlns:a16="http://schemas.microsoft.com/office/drawing/2014/main" id="{BA08B795-E6EE-ACAA-DDF0-5486E455C1D3}"/>
             </a:ext>
           </a:extLst>
         </p:cNvPr>
@@ -1659,7 +1352,7 @@
           <p:cNvPr id="2" name="Slide Image Placeholder 1">
             <a:extLst>
               <a:ext uri="{FF2B5EF4-FFF2-40B4-BE49-F238E27FC236}">
-                <a16:creationId xmlns:a16="http://schemas.microsoft.com/office/drawing/2014/main" id="{0E1F087D-1482-E11C-D816-69FF8933C8F0}"/>
+                <a16:creationId xmlns:a16="http://schemas.microsoft.com/office/drawing/2014/main" id="{AD0C7683-7D11-99D6-63BF-E8B73A58A58F}"/>
               </a:ext>
             </a:extLst>
           </p:cNvPr>
@@ -1677,7 +1370,7 @@
           <p:cNvPr id="3" name="Notes Placeholder 2">
             <a:extLst>
               <a:ext uri="{FF2B5EF4-FFF2-40B4-BE49-F238E27FC236}">
-                <a16:creationId xmlns:a16="http://schemas.microsoft.com/office/drawing/2014/main" id="{241C2CEB-0220-1509-749F-2DE5A82AB2DD}"/>
+                <a16:creationId xmlns:a16="http://schemas.microsoft.com/office/drawing/2014/main" id="{37839883-5CDC-65C1-FEE3-EAD8732DE7A3}"/>
               </a:ext>
             </a:extLst>
           </p:cNvPr>
@@ -1702,7 +1395,7 @@
           <p:cNvPr id="4" name="Slide Number Placeholder 3">
             <a:extLst>
               <a:ext uri="{FF2B5EF4-FFF2-40B4-BE49-F238E27FC236}">
-                <a16:creationId xmlns:a16="http://schemas.microsoft.com/office/drawing/2014/main" id="{75B613A4-0089-56E7-5F4F-73DEC863C68E}"/>
+                <a16:creationId xmlns:a16="http://schemas.microsoft.com/office/drawing/2014/main" id="{734A5727-7E88-654A-1ACE-64CF538CB673}"/>
               </a:ext>
             </a:extLst>
           </p:cNvPr>
@@ -1720,7 +1413,7 @@
           <a:p>
             <a:fld id="{032F2F96-FB4F-4FE3-9775-2EE627221D70}" type="slidenum">
               <a:rPr lang="en-US" smtClean="0"/>
-              <a:t>15</a:t>
+              <a:t>14</a:t>
             </a:fld>
             <a:endParaRPr lang="en-US"/>
           </a:p>
@@ -1729,7 +1422,331 @@
     </p:spTree>
     <p:extLst>
       <p:ext uri="{BB962C8B-B14F-4D97-AF65-F5344CB8AC3E}">
-        <p14:creationId xmlns:p14="http://schemas.microsoft.com/office/powerpoint/2010/main" val="3296645423"/>
+        <p14:creationId xmlns:p14="http://schemas.microsoft.com/office/powerpoint/2010/main" val="2393110583"/>
+      </p:ext>
+    </p:extLst>
+  </p:cSld>
+  <p:clrMapOvr>
+    <a:masterClrMapping/>
+  </p:clrMapOvr>
+</p:notes>
+</file>
+
+<file path=ppt/notesSlides/notesSlide11.xml><?xml version="1.0" encoding="utf-8"?>
+<p:notes xmlns:a="http://schemas.openxmlformats.org/drawingml/2006/main" xmlns:r="http://schemas.openxmlformats.org/officeDocument/2006/relationships" xmlns:p="http://schemas.openxmlformats.org/presentationml/2006/main">
+  <p:cSld>
+    <p:spTree>
+      <p:nvGrpSpPr>
+        <p:cNvPr id="1" name="">
+          <a:extLst>
+            <a:ext uri="{FF2B5EF4-FFF2-40B4-BE49-F238E27FC236}">
+              <a16:creationId xmlns:a16="http://schemas.microsoft.com/office/drawing/2014/main" id="{2DCD6DB7-345B-1F96-9596-5F61A790289F}"/>
+            </a:ext>
+          </a:extLst>
+        </p:cNvPr>
+        <p:cNvGrpSpPr/>
+        <p:nvPr/>
+      </p:nvGrpSpPr>
+      <p:grpSpPr>
+        <a:xfrm>
+          <a:off x="0" y="0"/>
+          <a:ext cx="0" cy="0"/>
+          <a:chOff x="0" y="0"/>
+          <a:chExt cx="0" cy="0"/>
+        </a:xfrm>
+      </p:grpSpPr>
+      <p:sp>
+        <p:nvSpPr>
+          <p:cNvPr id="2" name="Slide Image Placeholder 1">
+            <a:extLst>
+              <a:ext uri="{FF2B5EF4-FFF2-40B4-BE49-F238E27FC236}">
+                <a16:creationId xmlns:a16="http://schemas.microsoft.com/office/drawing/2014/main" id="{AF8045C1-E130-6549-8F0D-B597AAEEAEFF}"/>
+              </a:ext>
+            </a:extLst>
+          </p:cNvPr>
+          <p:cNvSpPr>
+            <a:spLocks noGrp="1" noRot="1" noChangeAspect="1"/>
+          </p:cNvSpPr>
+          <p:nvPr>
+            <p:ph type="sldImg"/>
+          </p:nvPr>
+        </p:nvSpPr>
+        <p:spPr/>
+      </p:sp>
+      <p:sp>
+        <p:nvSpPr>
+          <p:cNvPr id="3" name="Notes Placeholder 2">
+            <a:extLst>
+              <a:ext uri="{FF2B5EF4-FFF2-40B4-BE49-F238E27FC236}">
+                <a16:creationId xmlns:a16="http://schemas.microsoft.com/office/drawing/2014/main" id="{B3CED211-A17D-4212-891F-A467E7947B6C}"/>
+              </a:ext>
+            </a:extLst>
+          </p:cNvPr>
+          <p:cNvSpPr>
+            <a:spLocks noGrp="1"/>
+          </p:cNvSpPr>
+          <p:nvPr>
+            <p:ph type="body" idx="1"/>
+          </p:nvPr>
+        </p:nvSpPr>
+        <p:spPr/>
+        <p:txBody>
+          <a:bodyPr/>
+          <a:lstStyle/>
+          <a:p>
+            <a:endParaRPr lang="en-US" dirty="0"/>
+          </a:p>
+        </p:txBody>
+      </p:sp>
+      <p:sp>
+        <p:nvSpPr>
+          <p:cNvPr id="4" name="Slide Number Placeholder 3">
+            <a:extLst>
+              <a:ext uri="{FF2B5EF4-FFF2-40B4-BE49-F238E27FC236}">
+                <a16:creationId xmlns:a16="http://schemas.microsoft.com/office/drawing/2014/main" id="{9A50048D-0C21-F7B2-80F7-64A4BCB23745}"/>
+              </a:ext>
+            </a:extLst>
+          </p:cNvPr>
+          <p:cNvSpPr>
+            <a:spLocks noGrp="1"/>
+          </p:cNvSpPr>
+          <p:nvPr>
+            <p:ph type="sldNum" sz="quarter" idx="5"/>
+          </p:nvPr>
+        </p:nvSpPr>
+        <p:spPr/>
+        <p:txBody>
+          <a:bodyPr/>
+          <a:lstStyle/>
+          <a:p>
+            <a:fld id="{032F2F96-FB4F-4FE3-9775-2EE627221D70}" type="slidenum">
+              <a:rPr lang="en-US" smtClean="0"/>
+              <a:t>15</a:t>
+            </a:fld>
+            <a:endParaRPr lang="en-US"/>
+          </a:p>
+        </p:txBody>
+      </p:sp>
+    </p:spTree>
+    <p:extLst>
+      <p:ext uri="{BB962C8B-B14F-4D97-AF65-F5344CB8AC3E}">
+        <p14:creationId xmlns:p14="http://schemas.microsoft.com/office/powerpoint/2010/main" val="3545759817"/>
+      </p:ext>
+    </p:extLst>
+  </p:cSld>
+  <p:clrMapOvr>
+    <a:masterClrMapping/>
+  </p:clrMapOvr>
+</p:notes>
+</file>
+
+<file path=ppt/notesSlides/notesSlide12.xml><?xml version="1.0" encoding="utf-8"?>
+<p:notes xmlns:a="http://schemas.openxmlformats.org/drawingml/2006/main" xmlns:r="http://schemas.openxmlformats.org/officeDocument/2006/relationships" xmlns:p="http://schemas.openxmlformats.org/presentationml/2006/main">
+  <p:cSld>
+    <p:spTree>
+      <p:nvGrpSpPr>
+        <p:cNvPr id="1" name="">
+          <a:extLst>
+            <a:ext uri="{FF2B5EF4-FFF2-40B4-BE49-F238E27FC236}">
+              <a16:creationId xmlns:a16="http://schemas.microsoft.com/office/drawing/2014/main" id="{720399AE-E440-7260-0D3E-E9FCB0C3F861}"/>
+            </a:ext>
+          </a:extLst>
+        </p:cNvPr>
+        <p:cNvGrpSpPr/>
+        <p:nvPr/>
+      </p:nvGrpSpPr>
+      <p:grpSpPr>
+        <a:xfrm>
+          <a:off x="0" y="0"/>
+          <a:ext cx="0" cy="0"/>
+          <a:chOff x="0" y="0"/>
+          <a:chExt cx="0" cy="0"/>
+        </a:xfrm>
+      </p:grpSpPr>
+      <p:sp>
+        <p:nvSpPr>
+          <p:cNvPr id="2" name="Slide Image Placeholder 1">
+            <a:extLst>
+              <a:ext uri="{FF2B5EF4-FFF2-40B4-BE49-F238E27FC236}">
+                <a16:creationId xmlns:a16="http://schemas.microsoft.com/office/drawing/2014/main" id="{BAFEAFE7-AB00-9872-D5EB-03E7EFC79ED0}"/>
+              </a:ext>
+            </a:extLst>
+          </p:cNvPr>
+          <p:cNvSpPr>
+            <a:spLocks noGrp="1" noRot="1" noChangeAspect="1"/>
+          </p:cNvSpPr>
+          <p:nvPr>
+            <p:ph type="sldImg"/>
+          </p:nvPr>
+        </p:nvSpPr>
+        <p:spPr/>
+      </p:sp>
+      <p:sp>
+        <p:nvSpPr>
+          <p:cNvPr id="3" name="Notes Placeholder 2">
+            <a:extLst>
+              <a:ext uri="{FF2B5EF4-FFF2-40B4-BE49-F238E27FC236}">
+                <a16:creationId xmlns:a16="http://schemas.microsoft.com/office/drawing/2014/main" id="{6E0CBBF1-3B22-275E-DEE0-065E5CF07025}"/>
+              </a:ext>
+            </a:extLst>
+          </p:cNvPr>
+          <p:cNvSpPr>
+            <a:spLocks noGrp="1"/>
+          </p:cNvSpPr>
+          <p:nvPr>
+            <p:ph type="body" idx="1"/>
+          </p:nvPr>
+        </p:nvSpPr>
+        <p:spPr/>
+        <p:txBody>
+          <a:bodyPr/>
+          <a:lstStyle/>
+          <a:p>
+            <a:endParaRPr lang="en-US" dirty="0"/>
+          </a:p>
+        </p:txBody>
+      </p:sp>
+      <p:sp>
+        <p:nvSpPr>
+          <p:cNvPr id="4" name="Slide Number Placeholder 3">
+            <a:extLst>
+              <a:ext uri="{FF2B5EF4-FFF2-40B4-BE49-F238E27FC236}">
+                <a16:creationId xmlns:a16="http://schemas.microsoft.com/office/drawing/2014/main" id="{DB9762E7-9272-51D7-5F37-E495287C1826}"/>
+              </a:ext>
+            </a:extLst>
+          </p:cNvPr>
+          <p:cNvSpPr>
+            <a:spLocks noGrp="1"/>
+          </p:cNvSpPr>
+          <p:nvPr>
+            <p:ph type="sldNum" sz="quarter" idx="5"/>
+          </p:nvPr>
+        </p:nvSpPr>
+        <p:spPr/>
+        <p:txBody>
+          <a:bodyPr/>
+          <a:lstStyle/>
+          <a:p>
+            <a:fld id="{032F2F96-FB4F-4FE3-9775-2EE627221D70}" type="slidenum">
+              <a:rPr lang="en-US" smtClean="0"/>
+              <a:t>16</a:t>
+            </a:fld>
+            <a:endParaRPr lang="en-US"/>
+          </a:p>
+        </p:txBody>
+      </p:sp>
+    </p:spTree>
+    <p:extLst>
+      <p:ext uri="{BB962C8B-B14F-4D97-AF65-F5344CB8AC3E}">
+        <p14:creationId xmlns:p14="http://schemas.microsoft.com/office/powerpoint/2010/main" val="2886131934"/>
+      </p:ext>
+    </p:extLst>
+  </p:cSld>
+  <p:clrMapOvr>
+    <a:masterClrMapping/>
+  </p:clrMapOvr>
+</p:notes>
+</file>
+
+<file path=ppt/notesSlides/notesSlide13.xml><?xml version="1.0" encoding="utf-8"?>
+<p:notes xmlns:a="http://schemas.openxmlformats.org/drawingml/2006/main" xmlns:r="http://schemas.openxmlformats.org/officeDocument/2006/relationships" xmlns:p="http://schemas.openxmlformats.org/presentationml/2006/main">
+  <p:cSld>
+    <p:spTree>
+      <p:nvGrpSpPr>
+        <p:cNvPr id="1" name="">
+          <a:extLst>
+            <a:ext uri="{FF2B5EF4-FFF2-40B4-BE49-F238E27FC236}">
+              <a16:creationId xmlns:a16="http://schemas.microsoft.com/office/drawing/2014/main" id="{4DBF21A6-6229-67AC-B443-EEFFADF238AD}"/>
+            </a:ext>
+          </a:extLst>
+        </p:cNvPr>
+        <p:cNvGrpSpPr/>
+        <p:nvPr/>
+      </p:nvGrpSpPr>
+      <p:grpSpPr>
+        <a:xfrm>
+          <a:off x="0" y="0"/>
+          <a:ext cx="0" cy="0"/>
+          <a:chOff x="0" y="0"/>
+          <a:chExt cx="0" cy="0"/>
+        </a:xfrm>
+      </p:grpSpPr>
+      <p:sp>
+        <p:nvSpPr>
+          <p:cNvPr id="2" name="Slide Image Placeholder 1">
+            <a:extLst>
+              <a:ext uri="{FF2B5EF4-FFF2-40B4-BE49-F238E27FC236}">
+                <a16:creationId xmlns:a16="http://schemas.microsoft.com/office/drawing/2014/main" id="{F1FA96E1-CD8D-8E25-4ACB-4B0D8CA25542}"/>
+              </a:ext>
+            </a:extLst>
+          </p:cNvPr>
+          <p:cNvSpPr>
+            <a:spLocks noGrp="1" noRot="1" noChangeAspect="1"/>
+          </p:cNvSpPr>
+          <p:nvPr>
+            <p:ph type="sldImg"/>
+          </p:nvPr>
+        </p:nvSpPr>
+        <p:spPr/>
+      </p:sp>
+      <p:sp>
+        <p:nvSpPr>
+          <p:cNvPr id="3" name="Notes Placeholder 2">
+            <a:extLst>
+              <a:ext uri="{FF2B5EF4-FFF2-40B4-BE49-F238E27FC236}">
+                <a16:creationId xmlns:a16="http://schemas.microsoft.com/office/drawing/2014/main" id="{38FCEC29-B49A-7814-9896-AF8416BBF4BF}"/>
+              </a:ext>
+            </a:extLst>
+          </p:cNvPr>
+          <p:cNvSpPr>
+            <a:spLocks noGrp="1"/>
+          </p:cNvSpPr>
+          <p:nvPr>
+            <p:ph type="body" idx="1"/>
+          </p:nvPr>
+        </p:nvSpPr>
+        <p:spPr/>
+        <p:txBody>
+          <a:bodyPr/>
+          <a:lstStyle/>
+          <a:p>
+            <a:endParaRPr lang="en-US" dirty="0"/>
+          </a:p>
+        </p:txBody>
+      </p:sp>
+      <p:sp>
+        <p:nvSpPr>
+          <p:cNvPr id="4" name="Slide Number Placeholder 3">
+            <a:extLst>
+              <a:ext uri="{FF2B5EF4-FFF2-40B4-BE49-F238E27FC236}">
+                <a16:creationId xmlns:a16="http://schemas.microsoft.com/office/drawing/2014/main" id="{BFBE8E1F-7336-5139-CF7E-CB20C53A8C72}"/>
+              </a:ext>
+            </a:extLst>
+          </p:cNvPr>
+          <p:cNvSpPr>
+            <a:spLocks noGrp="1"/>
+          </p:cNvSpPr>
+          <p:nvPr>
+            <p:ph type="sldNum" sz="quarter" idx="5"/>
+          </p:nvPr>
+        </p:nvSpPr>
+        <p:spPr/>
+        <p:txBody>
+          <a:bodyPr/>
+          <a:lstStyle/>
+          <a:p>
+            <a:fld id="{032F2F96-FB4F-4FE3-9775-2EE627221D70}" type="slidenum">
+              <a:rPr lang="en-US" smtClean="0"/>
+              <a:t>17</a:t>
+            </a:fld>
+            <a:endParaRPr lang="en-US"/>
+          </a:p>
+        </p:txBody>
+      </p:sp>
+    </p:spTree>
+    <p:extLst>
+      <p:ext uri="{BB962C8B-B14F-4D97-AF65-F5344CB8AC3E}">
+        <p14:creationId xmlns:p14="http://schemas.microsoft.com/office/powerpoint/2010/main" val="3399511706"/>
       </p:ext>
     </p:extLst>
   </p:cSld>
@@ -2287,6 +2304,114 @@
         <p:cNvPr id="1" name="">
           <a:extLst>
             <a:ext uri="{FF2B5EF4-FFF2-40B4-BE49-F238E27FC236}">
+              <a16:creationId xmlns:a16="http://schemas.microsoft.com/office/drawing/2014/main" id="{EDDCC84A-5DB9-2AC2-DDDE-99D050CEA6CA}"/>
+            </a:ext>
+          </a:extLst>
+        </p:cNvPr>
+        <p:cNvGrpSpPr/>
+        <p:nvPr/>
+      </p:nvGrpSpPr>
+      <p:grpSpPr>
+        <a:xfrm>
+          <a:off x="0" y="0"/>
+          <a:ext cx="0" cy="0"/>
+          <a:chOff x="0" y="0"/>
+          <a:chExt cx="0" cy="0"/>
+        </a:xfrm>
+      </p:grpSpPr>
+      <p:sp>
+        <p:nvSpPr>
+          <p:cNvPr id="2" name="Slide Image Placeholder 1">
+            <a:extLst>
+              <a:ext uri="{FF2B5EF4-FFF2-40B4-BE49-F238E27FC236}">
+                <a16:creationId xmlns:a16="http://schemas.microsoft.com/office/drawing/2014/main" id="{37368646-174C-687F-9586-E597DE39FEC1}"/>
+              </a:ext>
+            </a:extLst>
+          </p:cNvPr>
+          <p:cNvSpPr>
+            <a:spLocks noGrp="1" noRot="1" noChangeAspect="1"/>
+          </p:cNvSpPr>
+          <p:nvPr>
+            <p:ph type="sldImg"/>
+          </p:nvPr>
+        </p:nvSpPr>
+        <p:spPr/>
+      </p:sp>
+      <p:sp>
+        <p:nvSpPr>
+          <p:cNvPr id="3" name="Notes Placeholder 2">
+            <a:extLst>
+              <a:ext uri="{FF2B5EF4-FFF2-40B4-BE49-F238E27FC236}">
+                <a16:creationId xmlns:a16="http://schemas.microsoft.com/office/drawing/2014/main" id="{CBB1E302-D9EB-8E03-894F-B385529071F2}"/>
+              </a:ext>
+            </a:extLst>
+          </p:cNvPr>
+          <p:cNvSpPr>
+            <a:spLocks noGrp="1"/>
+          </p:cNvSpPr>
+          <p:nvPr>
+            <p:ph type="body" idx="1"/>
+          </p:nvPr>
+        </p:nvSpPr>
+        <p:spPr/>
+        <p:txBody>
+          <a:bodyPr/>
+          <a:lstStyle/>
+          <a:p>
+            <a:endParaRPr lang="en-US" dirty="0"/>
+          </a:p>
+        </p:txBody>
+      </p:sp>
+      <p:sp>
+        <p:nvSpPr>
+          <p:cNvPr id="4" name="Slide Number Placeholder 3">
+            <a:extLst>
+              <a:ext uri="{FF2B5EF4-FFF2-40B4-BE49-F238E27FC236}">
+                <a16:creationId xmlns:a16="http://schemas.microsoft.com/office/drawing/2014/main" id="{86AE2497-6AA7-BE11-C737-7E38277AD225}"/>
+              </a:ext>
+            </a:extLst>
+          </p:cNvPr>
+          <p:cNvSpPr>
+            <a:spLocks noGrp="1"/>
+          </p:cNvSpPr>
+          <p:nvPr>
+            <p:ph type="sldNum" sz="quarter" idx="5"/>
+          </p:nvPr>
+        </p:nvSpPr>
+        <p:spPr/>
+        <p:txBody>
+          <a:bodyPr/>
+          <a:lstStyle/>
+          <a:p>
+            <a:fld id="{032F2F96-FB4F-4FE3-9775-2EE627221D70}" type="slidenum">
+              <a:rPr lang="en-US" smtClean="0"/>
+              <a:t>11</a:t>
+            </a:fld>
+            <a:endParaRPr lang="en-US"/>
+          </a:p>
+        </p:txBody>
+      </p:sp>
+    </p:spTree>
+    <p:extLst>
+      <p:ext uri="{BB962C8B-B14F-4D97-AF65-F5344CB8AC3E}">
+        <p14:creationId xmlns:p14="http://schemas.microsoft.com/office/powerpoint/2010/main" val="1935725659"/>
+      </p:ext>
+    </p:extLst>
+  </p:cSld>
+  <p:clrMapOvr>
+    <a:masterClrMapping/>
+  </p:clrMapOvr>
+</p:notes>
+</file>
+
+<file path=ppt/notesSlides/notesSlide8.xml><?xml version="1.0" encoding="utf-8"?>
+<p:notes xmlns:a="http://schemas.openxmlformats.org/drawingml/2006/main" xmlns:r="http://schemas.openxmlformats.org/officeDocument/2006/relationships" xmlns:p="http://schemas.openxmlformats.org/presentationml/2006/main">
+  <p:cSld>
+    <p:spTree>
+      <p:nvGrpSpPr>
+        <p:cNvPr id="1" name="">
+          <a:extLst>
+            <a:ext uri="{FF2B5EF4-FFF2-40B4-BE49-F238E27FC236}">
               <a16:creationId xmlns:a16="http://schemas.microsoft.com/office/drawing/2014/main" id="{ED3A1477-0123-42A0-0A83-E19DB7DAF690}"/>
             </a:ext>
           </a:extLst>
@@ -2387,7 +2512,7 @@
 </p:notes>
 </file>
 
-<file path=ppt/notesSlides/notesSlide8.xml><?xml version="1.0" encoding="utf-8"?>
+<file path=ppt/notesSlides/notesSlide9.xml><?xml version="1.0" encoding="utf-8"?>
 <p:notes xmlns:a="http://schemas.openxmlformats.org/drawingml/2006/main" xmlns:r="http://schemas.openxmlformats.org/officeDocument/2006/relationships" xmlns:p="http://schemas.openxmlformats.org/presentationml/2006/main">
   <p:cSld>
     <p:spTree>
@@ -2395,7 +2520,7 @@
         <p:cNvPr id="1" name="">
           <a:extLst>
             <a:ext uri="{FF2B5EF4-FFF2-40B4-BE49-F238E27FC236}">
-              <a16:creationId xmlns:a16="http://schemas.microsoft.com/office/drawing/2014/main" id="{2DCD6DB7-345B-1F96-9596-5F61A790289F}"/>
+              <a16:creationId xmlns:a16="http://schemas.microsoft.com/office/drawing/2014/main" id="{54968A5E-BFA6-6B90-64D9-3B72DC2A45B7}"/>
             </a:ext>
           </a:extLst>
         </p:cNvPr>
@@ -2415,7 +2540,7 @@
           <p:cNvPr id="2" name="Slide Image Placeholder 1">
             <a:extLst>
               <a:ext uri="{FF2B5EF4-FFF2-40B4-BE49-F238E27FC236}">
-                <a16:creationId xmlns:a16="http://schemas.microsoft.com/office/drawing/2014/main" id="{AF8045C1-E130-6549-8F0D-B597AAEEAEFF}"/>
+                <a16:creationId xmlns:a16="http://schemas.microsoft.com/office/drawing/2014/main" id="{C2431837-5763-272D-12E8-056B45EFEF33}"/>
               </a:ext>
             </a:extLst>
           </p:cNvPr>
@@ -2433,7 +2558,7 @@
           <p:cNvPr id="3" name="Notes Placeholder 2">
             <a:extLst>
               <a:ext uri="{FF2B5EF4-FFF2-40B4-BE49-F238E27FC236}">
-                <a16:creationId xmlns:a16="http://schemas.microsoft.com/office/drawing/2014/main" id="{B3CED211-A17D-4212-891F-A467E7947B6C}"/>
+                <a16:creationId xmlns:a16="http://schemas.microsoft.com/office/drawing/2014/main" id="{884C2DAF-F38E-FD14-438E-679CB2CC7E6D}"/>
               </a:ext>
             </a:extLst>
           </p:cNvPr>
@@ -2458,7 +2583,7 @@
           <p:cNvPr id="4" name="Slide Number Placeholder 3">
             <a:extLst>
               <a:ext uri="{FF2B5EF4-FFF2-40B4-BE49-F238E27FC236}">
-                <a16:creationId xmlns:a16="http://schemas.microsoft.com/office/drawing/2014/main" id="{9A50048D-0C21-F7B2-80F7-64A4BCB23745}"/>
+                <a16:creationId xmlns:a16="http://schemas.microsoft.com/office/drawing/2014/main" id="{1B1B12B7-6FB8-4EDC-0BC6-F352807C4535}"/>
               </a:ext>
             </a:extLst>
           </p:cNvPr>
@@ -2485,115 +2610,7 @@
     </p:spTree>
     <p:extLst>
       <p:ext uri="{BB962C8B-B14F-4D97-AF65-F5344CB8AC3E}">
-        <p14:creationId xmlns:p14="http://schemas.microsoft.com/office/powerpoint/2010/main" val="3545759817"/>
-      </p:ext>
-    </p:extLst>
-  </p:cSld>
-  <p:clrMapOvr>
-    <a:masterClrMapping/>
-  </p:clrMapOvr>
-</p:notes>
-</file>
-
-<file path=ppt/notesSlides/notesSlide9.xml><?xml version="1.0" encoding="utf-8"?>
-<p:notes xmlns:a="http://schemas.openxmlformats.org/drawingml/2006/main" xmlns:r="http://schemas.openxmlformats.org/officeDocument/2006/relationships" xmlns:p="http://schemas.openxmlformats.org/presentationml/2006/main">
-  <p:cSld>
-    <p:spTree>
-      <p:nvGrpSpPr>
-        <p:cNvPr id="1" name="">
-          <a:extLst>
-            <a:ext uri="{FF2B5EF4-FFF2-40B4-BE49-F238E27FC236}">
-              <a16:creationId xmlns:a16="http://schemas.microsoft.com/office/drawing/2014/main" id="{720399AE-E440-7260-0D3E-E9FCB0C3F861}"/>
-            </a:ext>
-          </a:extLst>
-        </p:cNvPr>
-        <p:cNvGrpSpPr/>
-        <p:nvPr/>
-      </p:nvGrpSpPr>
-      <p:grpSpPr>
-        <a:xfrm>
-          <a:off x="0" y="0"/>
-          <a:ext cx="0" cy="0"/>
-          <a:chOff x="0" y="0"/>
-          <a:chExt cx="0" cy="0"/>
-        </a:xfrm>
-      </p:grpSpPr>
-      <p:sp>
-        <p:nvSpPr>
-          <p:cNvPr id="2" name="Slide Image Placeholder 1">
-            <a:extLst>
-              <a:ext uri="{FF2B5EF4-FFF2-40B4-BE49-F238E27FC236}">
-                <a16:creationId xmlns:a16="http://schemas.microsoft.com/office/drawing/2014/main" id="{BAFEAFE7-AB00-9872-D5EB-03E7EFC79ED0}"/>
-              </a:ext>
-            </a:extLst>
-          </p:cNvPr>
-          <p:cNvSpPr>
-            <a:spLocks noGrp="1" noRot="1" noChangeAspect="1"/>
-          </p:cNvSpPr>
-          <p:nvPr>
-            <p:ph type="sldImg"/>
-          </p:nvPr>
-        </p:nvSpPr>
-        <p:spPr/>
-      </p:sp>
-      <p:sp>
-        <p:nvSpPr>
-          <p:cNvPr id="3" name="Notes Placeholder 2">
-            <a:extLst>
-              <a:ext uri="{FF2B5EF4-FFF2-40B4-BE49-F238E27FC236}">
-                <a16:creationId xmlns:a16="http://schemas.microsoft.com/office/drawing/2014/main" id="{6E0CBBF1-3B22-275E-DEE0-065E5CF07025}"/>
-              </a:ext>
-            </a:extLst>
-          </p:cNvPr>
-          <p:cNvSpPr>
-            <a:spLocks noGrp="1"/>
-          </p:cNvSpPr>
-          <p:nvPr>
-            <p:ph type="body" idx="1"/>
-          </p:nvPr>
-        </p:nvSpPr>
-        <p:spPr/>
-        <p:txBody>
-          <a:bodyPr/>
-          <a:lstStyle/>
-          <a:p>
-            <a:endParaRPr lang="en-US" dirty="0"/>
-          </a:p>
-        </p:txBody>
-      </p:sp>
-      <p:sp>
-        <p:nvSpPr>
-          <p:cNvPr id="4" name="Slide Number Placeholder 3">
-            <a:extLst>
-              <a:ext uri="{FF2B5EF4-FFF2-40B4-BE49-F238E27FC236}">
-                <a16:creationId xmlns:a16="http://schemas.microsoft.com/office/drawing/2014/main" id="{DB9762E7-9272-51D7-5F37-E495287C1826}"/>
-              </a:ext>
-            </a:extLst>
-          </p:cNvPr>
-          <p:cNvSpPr>
-            <a:spLocks noGrp="1"/>
-          </p:cNvSpPr>
-          <p:nvPr>
-            <p:ph type="sldNum" sz="quarter" idx="5"/>
-          </p:nvPr>
-        </p:nvSpPr>
-        <p:spPr/>
-        <p:txBody>
-          <a:bodyPr/>
-          <a:lstStyle/>
-          <a:p>
-            <a:fld id="{032F2F96-FB4F-4FE3-9775-2EE627221D70}" type="slidenum">
-              <a:rPr lang="en-US" smtClean="0"/>
-              <a:t>14</a:t>
-            </a:fld>
-            <a:endParaRPr lang="en-US"/>
-          </a:p>
-        </p:txBody>
-      </p:sp>
-    </p:spTree>
-    <p:extLst>
-      <p:ext uri="{BB962C8B-B14F-4D97-AF65-F5344CB8AC3E}">
-        <p14:creationId xmlns:p14="http://schemas.microsoft.com/office/powerpoint/2010/main" val="2886131934"/>
+        <p14:creationId xmlns:p14="http://schemas.microsoft.com/office/powerpoint/2010/main" val="4240313904"/>
       </p:ext>
     </p:extLst>
   </p:cSld>
@@ -2771,7 +2788,7 @@
           </a:ln>
           <a:extLst>
             <a:ext uri="{C572A759-6A51-4108-AA02-DFA0A04FC94B}">
-              <ma14:wrappingTextBoxFlag xmlns="" xmlns:ma14="http://schemas.microsoft.com/office/mac/drawingml/2011/main" xmlns:a14="http://schemas.microsoft.com/office/drawing/2010/main" xmlns:m="http://schemas.openxmlformats.org/officeDocument/2006/math" val="1"/>
+              <ma14:wrappingTextBoxFlag xmlns:m="http://schemas.openxmlformats.org/officeDocument/2006/math" xmlns:a14="http://schemas.microsoft.com/office/drawing/2010/main" xmlns:ma14="http://schemas.microsoft.com/office/mac/drawingml/2011/main" xmlns="" val="1"/>
             </a:ext>
           </a:extLst>
         </p:spPr>
@@ -2889,7 +2906,7 @@
           </a:ln>
           <a:extLst>
             <a:ext uri="{C572A759-6A51-4108-AA02-DFA0A04FC94B}">
-              <ma14:wrappingTextBoxFlag xmlns="" xmlns:ma14="http://schemas.microsoft.com/office/mac/drawingml/2011/main" xmlns:a14="http://schemas.microsoft.com/office/drawing/2010/main" xmlns:m="http://schemas.openxmlformats.org/officeDocument/2006/math" val="1"/>
+              <ma14:wrappingTextBoxFlag xmlns:m="http://schemas.openxmlformats.org/officeDocument/2006/math" xmlns:a14="http://schemas.microsoft.com/office/drawing/2010/main" xmlns:ma14="http://schemas.microsoft.com/office/mac/drawingml/2011/main" xmlns="" val="1"/>
             </a:ext>
           </a:extLst>
         </p:spPr>
@@ -2995,7 +3012,7 @@
           </a:ln>
           <a:extLst>
             <a:ext uri="{C572A759-6A51-4108-AA02-DFA0A04FC94B}">
-              <ma14:wrappingTextBoxFlag xmlns="" xmlns:m="http://schemas.openxmlformats.org/officeDocument/2006/math" xmlns:a14="http://schemas.microsoft.com/office/drawing/2010/main" xmlns:ma14="http://schemas.microsoft.com/office/mac/drawingml/2011/main" val="1"/>
+              <ma14:wrappingTextBoxFlag xmlns:ma14="http://schemas.microsoft.com/office/mac/drawingml/2011/main" xmlns:a14="http://schemas.microsoft.com/office/drawing/2010/main" xmlns:m="http://schemas.openxmlformats.org/officeDocument/2006/math" xmlns="" val="1"/>
             </a:ext>
           </a:extLst>
         </p:spPr>
@@ -3111,7 +3128,7 @@
           </a:ln>
           <a:extLst>
             <a:ext uri="{C572A759-6A51-4108-AA02-DFA0A04FC94B}">
-              <ma14:wrappingTextBoxFlag xmlns="" xmlns:m="http://schemas.openxmlformats.org/officeDocument/2006/math" xmlns:a14="http://schemas.microsoft.com/office/drawing/2010/main" xmlns:ma14="http://schemas.microsoft.com/office/mac/drawingml/2011/main" val="1"/>
+              <ma14:wrappingTextBoxFlag xmlns:ma14="http://schemas.microsoft.com/office/mac/drawingml/2011/main" xmlns:a14="http://schemas.microsoft.com/office/drawing/2010/main" xmlns:m="http://schemas.openxmlformats.org/officeDocument/2006/math" xmlns="" val="1"/>
             </a:ext>
           </a:extLst>
         </p:spPr>
@@ -3982,7 +3999,7 @@
           </a:ln>
           <a:extLst>
             <a:ext uri="{C572A759-6A51-4108-AA02-DFA0A04FC94B}">
-              <ma14:wrappingTextBoxFlag xmlns="" xmlns:ma14="http://schemas.microsoft.com/office/mac/drawingml/2011/main" xmlns:a14="http://schemas.microsoft.com/office/drawing/2010/main" xmlns:m="http://schemas.openxmlformats.org/officeDocument/2006/math" val="1"/>
+              <ma14:wrappingTextBoxFlag xmlns:m="http://schemas.openxmlformats.org/officeDocument/2006/math" xmlns:a14="http://schemas.microsoft.com/office/drawing/2010/main" xmlns:ma14="http://schemas.microsoft.com/office/mac/drawingml/2011/main" xmlns="" val="1"/>
             </a:ext>
           </a:extLst>
         </p:spPr>
@@ -4491,7 +4508,7 @@
           </a:ln>
           <a:extLst>
             <a:ext uri="{C572A759-6A51-4108-AA02-DFA0A04FC94B}">
-              <ma14:wrappingTextBoxFlag xmlns="" xmlns:ma14="http://schemas.microsoft.com/office/mac/drawingml/2011/main" xmlns:a14="http://schemas.microsoft.com/office/drawing/2010/main" xmlns:m="http://schemas.openxmlformats.org/officeDocument/2006/math" val="1"/>
+              <ma14:wrappingTextBoxFlag xmlns:m="http://schemas.openxmlformats.org/officeDocument/2006/math" xmlns:a14="http://schemas.microsoft.com/office/drawing/2010/main" xmlns:ma14="http://schemas.microsoft.com/office/mac/drawingml/2011/main" xmlns="" val="1"/>
             </a:ext>
           </a:extLst>
         </p:spPr>
@@ -4610,7 +4627,7 @@
           </a:ln>
           <a:extLst>
             <a:ext uri="{C572A759-6A51-4108-AA02-DFA0A04FC94B}">
-              <ma14:wrappingTextBoxFlag xmlns="" xmlns:ma14="http://schemas.microsoft.com/office/mac/drawingml/2011/main" xmlns:a14="http://schemas.microsoft.com/office/drawing/2010/main" xmlns:m="http://schemas.openxmlformats.org/officeDocument/2006/math" val="1"/>
+              <ma14:wrappingTextBoxFlag xmlns:m="http://schemas.openxmlformats.org/officeDocument/2006/math" xmlns:a14="http://schemas.microsoft.com/office/drawing/2010/main" xmlns:ma14="http://schemas.microsoft.com/office/mac/drawingml/2011/main" xmlns="" val="1"/>
             </a:ext>
           </a:extLst>
         </p:spPr>
@@ -4894,7 +4911,7 @@
           </a:ln>
           <a:extLst>
             <a:ext uri="{C572A759-6A51-4108-AA02-DFA0A04FC94B}">
-              <ma14:wrappingTextBoxFlag xmlns="" xmlns:ma14="http://schemas.microsoft.com/office/mac/drawingml/2011/main" xmlns:a14="http://schemas.microsoft.com/office/drawing/2010/main" xmlns:m="http://schemas.openxmlformats.org/officeDocument/2006/math" val="1"/>
+              <ma14:wrappingTextBoxFlag xmlns:m="http://schemas.openxmlformats.org/officeDocument/2006/math" xmlns:a14="http://schemas.microsoft.com/office/drawing/2010/main" xmlns:ma14="http://schemas.microsoft.com/office/mac/drawingml/2011/main" xmlns="" val="1"/>
             </a:ext>
           </a:extLst>
         </p:spPr>
@@ -5135,7 +5152,7 @@
           </a:ln>
           <a:extLst>
             <a:ext uri="{C572A759-6A51-4108-AA02-DFA0A04FC94B}">
-              <ma14:wrappingTextBoxFlag xmlns="" xmlns:ma14="http://schemas.microsoft.com/office/mac/drawingml/2011/main" xmlns:a14="http://schemas.microsoft.com/office/drawing/2010/main" xmlns:m="http://schemas.openxmlformats.org/officeDocument/2006/math" val="1"/>
+              <ma14:wrappingTextBoxFlag xmlns:m="http://schemas.openxmlformats.org/officeDocument/2006/math" xmlns:a14="http://schemas.microsoft.com/office/drawing/2010/main" xmlns:ma14="http://schemas.microsoft.com/office/mac/drawingml/2011/main" xmlns="" val="1"/>
             </a:ext>
           </a:extLst>
         </p:spPr>
@@ -5321,7 +5338,7 @@
           </a:ln>
           <a:extLst>
             <a:ext uri="{C572A759-6A51-4108-AA02-DFA0A04FC94B}">
-              <ma14:wrappingTextBoxFlag xmlns="" xmlns:ma14="http://schemas.microsoft.com/office/mac/drawingml/2011/main" xmlns:a14="http://schemas.microsoft.com/office/drawing/2010/main" xmlns:m="http://schemas.openxmlformats.org/officeDocument/2006/math" val="1"/>
+              <ma14:wrappingTextBoxFlag xmlns:m="http://schemas.openxmlformats.org/officeDocument/2006/math" xmlns:a14="http://schemas.microsoft.com/office/drawing/2010/main" xmlns:ma14="http://schemas.microsoft.com/office/mac/drawingml/2011/main" xmlns="" val="1"/>
             </a:ext>
           </a:extLst>
         </p:spPr>
@@ -5439,7 +5456,7 @@
           </a:ln>
           <a:extLst>
             <a:ext uri="{C572A759-6A51-4108-AA02-DFA0A04FC94B}">
-              <ma14:wrappingTextBoxFlag xmlns="" xmlns:ma14="http://schemas.microsoft.com/office/mac/drawingml/2011/main" xmlns:a14="http://schemas.microsoft.com/office/drawing/2010/main" xmlns:m="http://schemas.openxmlformats.org/officeDocument/2006/math" val="1"/>
+              <ma14:wrappingTextBoxFlag xmlns:m="http://schemas.openxmlformats.org/officeDocument/2006/math" xmlns:a14="http://schemas.microsoft.com/office/drawing/2010/main" xmlns:ma14="http://schemas.microsoft.com/office/mac/drawingml/2011/main" xmlns="" val="1"/>
             </a:ext>
           </a:extLst>
         </p:spPr>
@@ -5489,7 +5506,7 @@
           </a:ln>
           <a:extLst>
             <a:ext uri="{C572A759-6A51-4108-AA02-DFA0A04FC94B}">
-              <ma14:wrappingTextBoxFlag xmlns="" xmlns:ma14="http://schemas.microsoft.com/office/mac/drawingml/2011/main" xmlns:a14="http://schemas.microsoft.com/office/drawing/2010/main" xmlns:m="http://schemas.openxmlformats.org/officeDocument/2006/math" val="1"/>
+              <ma14:wrappingTextBoxFlag xmlns:m="http://schemas.openxmlformats.org/officeDocument/2006/math" xmlns:a14="http://schemas.microsoft.com/office/drawing/2010/main" xmlns:ma14="http://schemas.microsoft.com/office/mac/drawingml/2011/main" xmlns="" val="1"/>
             </a:ext>
           </a:extLst>
         </p:spPr>
@@ -5809,7 +5826,7 @@
           </a:ln>
           <a:extLst>
             <a:ext uri="{C572A759-6A51-4108-AA02-DFA0A04FC94B}">
-              <ma14:wrappingTextBoxFlag xmlns="" xmlns:ma14="http://schemas.microsoft.com/office/mac/drawingml/2011/main" xmlns:a14="http://schemas.microsoft.com/office/drawing/2010/main" xmlns:m="http://schemas.openxmlformats.org/officeDocument/2006/math" val="1"/>
+              <ma14:wrappingTextBoxFlag xmlns:m="http://schemas.openxmlformats.org/officeDocument/2006/math" xmlns:a14="http://schemas.microsoft.com/office/drawing/2010/main" xmlns:ma14="http://schemas.microsoft.com/office/mac/drawingml/2011/main" xmlns="" val="1"/>
             </a:ext>
           </a:extLst>
         </p:spPr>
@@ -5927,7 +5944,7 @@
           </a:ln>
           <a:extLst>
             <a:ext uri="{C572A759-6A51-4108-AA02-DFA0A04FC94B}">
-              <ma14:wrappingTextBoxFlag xmlns="" xmlns:ma14="http://schemas.microsoft.com/office/mac/drawingml/2011/main" xmlns:a14="http://schemas.microsoft.com/office/drawing/2010/main" xmlns:m="http://schemas.openxmlformats.org/officeDocument/2006/math" val="1"/>
+              <ma14:wrappingTextBoxFlag xmlns:m="http://schemas.openxmlformats.org/officeDocument/2006/math" xmlns:a14="http://schemas.microsoft.com/office/drawing/2010/main" xmlns:ma14="http://schemas.microsoft.com/office/mac/drawingml/2011/main" xmlns="" val="1"/>
             </a:ext>
           </a:extLst>
         </p:spPr>
@@ -6179,7 +6196,7 @@
           </a:ln>
           <a:extLst>
             <a:ext uri="{C572A759-6A51-4108-AA02-DFA0A04FC94B}">
-              <ma14:wrappingTextBoxFlag xmlns="" xmlns:ma14="http://schemas.microsoft.com/office/mac/drawingml/2011/main" xmlns:a14="http://schemas.microsoft.com/office/drawing/2010/main" xmlns:m="http://schemas.openxmlformats.org/officeDocument/2006/math" val="1"/>
+              <ma14:wrappingTextBoxFlag xmlns:m="http://schemas.openxmlformats.org/officeDocument/2006/math" xmlns:a14="http://schemas.microsoft.com/office/drawing/2010/main" xmlns:ma14="http://schemas.microsoft.com/office/mac/drawingml/2011/main" xmlns="" val="1"/>
             </a:ext>
           </a:extLst>
         </p:spPr>
@@ -6297,7 +6314,7 @@
           </a:ln>
           <a:extLst>
             <a:ext uri="{C572A759-6A51-4108-AA02-DFA0A04FC94B}">
-              <ma14:wrappingTextBoxFlag xmlns="" xmlns:ma14="http://schemas.microsoft.com/office/mac/drawingml/2011/main" xmlns:a14="http://schemas.microsoft.com/office/drawing/2010/main" xmlns:m="http://schemas.openxmlformats.org/officeDocument/2006/math" val="1"/>
+              <ma14:wrappingTextBoxFlag xmlns:m="http://schemas.openxmlformats.org/officeDocument/2006/math" xmlns:a14="http://schemas.microsoft.com/office/drawing/2010/main" xmlns:ma14="http://schemas.microsoft.com/office/mac/drawingml/2011/main" xmlns="" val="1"/>
             </a:ext>
           </a:extLst>
         </p:spPr>
@@ -6403,7 +6420,7 @@
           </a:ln>
           <a:extLst>
             <a:ext uri="{C572A759-6A51-4108-AA02-DFA0A04FC94B}">
-              <ma14:wrappingTextBoxFlag xmlns="" xmlns:m="http://schemas.openxmlformats.org/officeDocument/2006/math" xmlns:a14="http://schemas.microsoft.com/office/drawing/2010/main" xmlns:ma14="http://schemas.microsoft.com/office/mac/drawingml/2011/main" val="1"/>
+              <ma14:wrappingTextBoxFlag xmlns:ma14="http://schemas.microsoft.com/office/mac/drawingml/2011/main" xmlns:a14="http://schemas.microsoft.com/office/drawing/2010/main" xmlns:m="http://schemas.openxmlformats.org/officeDocument/2006/math" xmlns="" val="1"/>
             </a:ext>
           </a:extLst>
         </p:spPr>
@@ -6636,7 +6653,7 @@
           </a:ln>
           <a:extLst>
             <a:ext uri="{C572A759-6A51-4108-AA02-DFA0A04FC94B}">
-              <ma14:wrappingTextBoxFlag xmlns="" xmlns:m="http://schemas.openxmlformats.org/officeDocument/2006/math" xmlns:a14="http://schemas.microsoft.com/office/drawing/2010/main" xmlns:ma14="http://schemas.microsoft.com/office/mac/drawingml/2011/main" val="1"/>
+              <ma14:wrappingTextBoxFlag xmlns:ma14="http://schemas.microsoft.com/office/mac/drawingml/2011/main" xmlns:a14="http://schemas.microsoft.com/office/drawing/2010/main" xmlns:m="http://schemas.openxmlformats.org/officeDocument/2006/math" xmlns="" val="1"/>
             </a:ext>
           </a:extLst>
         </p:spPr>
@@ -7367,7 +7384,7 @@
           </a:ln>
           <a:extLst>
             <a:ext uri="{C572A759-6A51-4108-AA02-DFA0A04FC94B}">
-              <ma14:wrappingTextBoxFlag xmlns="" xmlns:ma14="http://schemas.microsoft.com/office/mac/drawingml/2011/main" xmlns:a14="http://schemas.microsoft.com/office/drawing/2010/main" xmlns:m="http://schemas.openxmlformats.org/officeDocument/2006/math" val="1"/>
+              <ma14:wrappingTextBoxFlag xmlns:m="http://schemas.openxmlformats.org/officeDocument/2006/math" xmlns:a14="http://schemas.microsoft.com/office/drawing/2010/main" xmlns:ma14="http://schemas.microsoft.com/office/mac/drawingml/2011/main" xmlns="" val="1"/>
             </a:ext>
           </a:extLst>
         </p:spPr>
@@ -7837,7 +7854,7 @@
           </a:ln>
           <a:extLst>
             <a:ext uri="{C572A759-6A51-4108-AA02-DFA0A04FC94B}">
-              <ma14:wrappingTextBoxFlag xmlns="" xmlns:ma14="http://schemas.microsoft.com/office/mac/drawingml/2011/main" xmlns:a14="http://schemas.microsoft.com/office/drawing/2010/main" xmlns:m="http://schemas.openxmlformats.org/officeDocument/2006/math" val="1"/>
+              <ma14:wrappingTextBoxFlag xmlns:m="http://schemas.openxmlformats.org/officeDocument/2006/math" xmlns:a14="http://schemas.microsoft.com/office/drawing/2010/main" xmlns:ma14="http://schemas.microsoft.com/office/mac/drawingml/2011/main" xmlns="" val="1"/>
             </a:ext>
           </a:extLst>
         </p:spPr>
@@ -7956,7 +7973,7 @@
           </a:ln>
           <a:extLst>
             <a:ext uri="{C572A759-6A51-4108-AA02-DFA0A04FC94B}">
-              <ma14:wrappingTextBoxFlag xmlns="" xmlns:ma14="http://schemas.microsoft.com/office/mac/drawingml/2011/main" xmlns:a14="http://schemas.microsoft.com/office/drawing/2010/main" xmlns:m="http://schemas.openxmlformats.org/officeDocument/2006/math" val="1"/>
+              <ma14:wrappingTextBoxFlag xmlns:m="http://schemas.openxmlformats.org/officeDocument/2006/math" xmlns:a14="http://schemas.microsoft.com/office/drawing/2010/main" xmlns:ma14="http://schemas.microsoft.com/office/mac/drawingml/2011/main" xmlns="" val="1"/>
             </a:ext>
           </a:extLst>
         </p:spPr>
@@ -8239,7 +8256,7 @@
           </a:ln>
           <a:extLst>
             <a:ext uri="{C572A759-6A51-4108-AA02-DFA0A04FC94B}">
-              <ma14:wrappingTextBoxFlag xmlns="" xmlns:ma14="http://schemas.microsoft.com/office/mac/drawingml/2011/main" xmlns:a14="http://schemas.microsoft.com/office/drawing/2010/main" xmlns:m="http://schemas.openxmlformats.org/officeDocument/2006/math" val="1"/>
+              <ma14:wrappingTextBoxFlag xmlns:m="http://schemas.openxmlformats.org/officeDocument/2006/math" xmlns:a14="http://schemas.microsoft.com/office/drawing/2010/main" xmlns:ma14="http://schemas.microsoft.com/office/mac/drawingml/2011/main" xmlns="" val="1"/>
             </a:ext>
           </a:extLst>
         </p:spPr>
@@ -8523,7 +8540,7 @@
           </a:ln>
           <a:extLst>
             <a:ext uri="{C572A759-6A51-4108-AA02-DFA0A04FC94B}">
-              <ma14:wrappingTextBoxFlag xmlns="" xmlns:ma14="http://schemas.microsoft.com/office/mac/drawingml/2011/main" xmlns:a14="http://schemas.microsoft.com/office/drawing/2010/main" xmlns:m="http://schemas.openxmlformats.org/officeDocument/2006/math" val="1"/>
+              <ma14:wrappingTextBoxFlag xmlns:m="http://schemas.openxmlformats.org/officeDocument/2006/math" xmlns:a14="http://schemas.microsoft.com/office/drawing/2010/main" xmlns:ma14="http://schemas.microsoft.com/office/mac/drawingml/2011/main" xmlns="" val="1"/>
             </a:ext>
           </a:extLst>
         </p:spPr>
@@ -8752,7 +8769,7 @@
           </a:ln>
           <a:extLst>
             <a:ext uri="{C572A759-6A51-4108-AA02-DFA0A04FC94B}">
-              <ma14:wrappingTextBoxFlag xmlns="" xmlns:ma14="http://schemas.microsoft.com/office/mac/drawingml/2011/main" xmlns:a14="http://schemas.microsoft.com/office/drawing/2010/main" xmlns:m="http://schemas.openxmlformats.org/officeDocument/2006/math" val="1"/>
+              <ma14:wrappingTextBoxFlag xmlns:m="http://schemas.openxmlformats.org/officeDocument/2006/math" xmlns:a14="http://schemas.microsoft.com/office/drawing/2010/main" xmlns:ma14="http://schemas.microsoft.com/office/mac/drawingml/2011/main" xmlns="" val="1"/>
             </a:ext>
           </a:extLst>
         </p:spPr>
@@ -8937,7 +8954,7 @@
           </a:ln>
           <a:extLst>
             <a:ext uri="{C572A759-6A51-4108-AA02-DFA0A04FC94B}">
-              <ma14:wrappingTextBoxFlag xmlns="" xmlns:ma14="http://schemas.microsoft.com/office/mac/drawingml/2011/main" xmlns:a14="http://schemas.microsoft.com/office/drawing/2010/main" xmlns:m="http://schemas.openxmlformats.org/officeDocument/2006/math" val="1"/>
+              <ma14:wrappingTextBoxFlag xmlns:m="http://schemas.openxmlformats.org/officeDocument/2006/math" xmlns:a14="http://schemas.microsoft.com/office/drawing/2010/main" xmlns:ma14="http://schemas.microsoft.com/office/mac/drawingml/2011/main" xmlns="" val="1"/>
             </a:ext>
           </a:extLst>
         </p:spPr>
@@ -9154,7 +9171,7 @@
           </a:ln>
           <a:extLst>
             <a:ext uri="{C572A759-6A51-4108-AA02-DFA0A04FC94B}">
-              <ma14:wrappingTextBoxFlag xmlns="" xmlns:ma14="http://schemas.microsoft.com/office/mac/drawingml/2011/main" xmlns:a14="http://schemas.microsoft.com/office/drawing/2010/main" xmlns:m="http://schemas.openxmlformats.org/officeDocument/2006/math" val="1"/>
+              <ma14:wrappingTextBoxFlag xmlns:m="http://schemas.openxmlformats.org/officeDocument/2006/math" xmlns:a14="http://schemas.microsoft.com/office/drawing/2010/main" xmlns:ma14="http://schemas.microsoft.com/office/mac/drawingml/2011/main" xmlns="" val="1"/>
             </a:ext>
           </a:extLst>
         </p:spPr>
@@ -9272,7 +9289,7 @@
           </a:ln>
           <a:extLst>
             <a:ext uri="{C572A759-6A51-4108-AA02-DFA0A04FC94B}">
-              <ma14:wrappingTextBoxFlag xmlns="" xmlns:ma14="http://schemas.microsoft.com/office/mac/drawingml/2011/main" xmlns:a14="http://schemas.microsoft.com/office/drawing/2010/main" xmlns:m="http://schemas.openxmlformats.org/officeDocument/2006/math" val="1"/>
+              <ma14:wrappingTextBoxFlag xmlns:m="http://schemas.openxmlformats.org/officeDocument/2006/math" xmlns:a14="http://schemas.microsoft.com/office/drawing/2010/main" xmlns:ma14="http://schemas.microsoft.com/office/mac/drawingml/2011/main" xmlns="" val="1"/>
             </a:ext>
           </a:extLst>
         </p:spPr>
@@ -9524,7 +9541,7 @@
           </a:ln>
           <a:extLst>
             <a:ext uri="{C572A759-6A51-4108-AA02-DFA0A04FC94B}">
-              <ma14:wrappingTextBoxFlag xmlns="" xmlns:ma14="http://schemas.microsoft.com/office/mac/drawingml/2011/main" xmlns:a14="http://schemas.microsoft.com/office/drawing/2010/main" xmlns:m="http://schemas.openxmlformats.org/officeDocument/2006/math" val="1"/>
+              <ma14:wrappingTextBoxFlag xmlns:m="http://schemas.openxmlformats.org/officeDocument/2006/math" xmlns:a14="http://schemas.microsoft.com/office/drawing/2010/main" xmlns:ma14="http://schemas.microsoft.com/office/mac/drawingml/2011/main" xmlns="" val="1"/>
             </a:ext>
           </a:extLst>
         </p:spPr>
@@ -9642,7 +9659,7 @@
           </a:ln>
           <a:extLst>
             <a:ext uri="{C572A759-6A51-4108-AA02-DFA0A04FC94B}">
-              <ma14:wrappingTextBoxFlag xmlns="" xmlns:ma14="http://schemas.microsoft.com/office/mac/drawingml/2011/main" xmlns:a14="http://schemas.microsoft.com/office/drawing/2010/main" xmlns:m="http://schemas.openxmlformats.org/officeDocument/2006/math" val="1"/>
+              <ma14:wrappingTextBoxFlag xmlns:m="http://schemas.openxmlformats.org/officeDocument/2006/math" xmlns:a14="http://schemas.microsoft.com/office/drawing/2010/main" xmlns:ma14="http://schemas.microsoft.com/office/mac/drawingml/2011/main" xmlns="" val="1"/>
             </a:ext>
           </a:extLst>
         </p:spPr>
@@ -9748,7 +9765,7 @@
           </a:ln>
           <a:extLst>
             <a:ext uri="{C572A759-6A51-4108-AA02-DFA0A04FC94B}">
-              <ma14:wrappingTextBoxFlag xmlns="" xmlns:m="http://schemas.openxmlformats.org/officeDocument/2006/math" xmlns:a14="http://schemas.microsoft.com/office/drawing/2010/main" xmlns:ma14="http://schemas.microsoft.com/office/mac/drawingml/2011/main" val="1"/>
+              <ma14:wrappingTextBoxFlag xmlns:ma14="http://schemas.microsoft.com/office/mac/drawingml/2011/main" xmlns:a14="http://schemas.microsoft.com/office/drawing/2010/main" xmlns:m="http://schemas.openxmlformats.org/officeDocument/2006/math" xmlns="" val="1"/>
             </a:ext>
           </a:extLst>
         </p:spPr>
@@ -9864,7 +9881,7 @@
           </a:ln>
           <a:extLst>
             <a:ext uri="{C572A759-6A51-4108-AA02-DFA0A04FC94B}">
-              <ma14:wrappingTextBoxFlag xmlns="" xmlns:m="http://schemas.openxmlformats.org/officeDocument/2006/math" xmlns:a14="http://schemas.microsoft.com/office/drawing/2010/main" xmlns:ma14="http://schemas.microsoft.com/office/mac/drawingml/2011/main" val="1"/>
+              <ma14:wrappingTextBoxFlag xmlns:ma14="http://schemas.microsoft.com/office/mac/drawingml/2011/main" xmlns:a14="http://schemas.microsoft.com/office/drawing/2010/main" xmlns:m="http://schemas.openxmlformats.org/officeDocument/2006/math" xmlns="" val="1"/>
             </a:ext>
           </a:extLst>
         </p:spPr>
@@ -10151,7 +10168,7 @@
           </a:ln>
           <a:extLst>
             <a:ext uri="{C572A759-6A51-4108-AA02-DFA0A04FC94B}">
-              <ma14:wrappingTextBoxFlag xmlns="" xmlns:ma14="http://schemas.microsoft.com/office/mac/drawingml/2011/main" xmlns:a14="http://schemas.microsoft.com/office/drawing/2010/main" xmlns:m="http://schemas.openxmlformats.org/officeDocument/2006/math" val="1"/>
+              <ma14:wrappingTextBoxFlag xmlns:m="http://schemas.openxmlformats.org/officeDocument/2006/math" xmlns:a14="http://schemas.microsoft.com/office/drawing/2010/main" xmlns:ma14="http://schemas.microsoft.com/office/mac/drawingml/2011/main" xmlns="" val="1"/>
             </a:ext>
           </a:extLst>
         </p:spPr>
@@ -10392,7 +10409,7 @@
           </a:ln>
           <a:extLst>
             <a:ext uri="{C572A759-6A51-4108-AA02-DFA0A04FC94B}">
-              <ma14:wrappingTextBoxFlag xmlns="" xmlns:ma14="http://schemas.microsoft.com/office/mac/drawingml/2011/main" xmlns:a14="http://schemas.microsoft.com/office/drawing/2010/main" xmlns:m="http://schemas.openxmlformats.org/officeDocument/2006/math" val="1"/>
+              <ma14:wrappingTextBoxFlag xmlns:m="http://schemas.openxmlformats.org/officeDocument/2006/math" xmlns:a14="http://schemas.microsoft.com/office/drawing/2010/main" xmlns:ma14="http://schemas.microsoft.com/office/mac/drawingml/2011/main" xmlns="" val="1"/>
             </a:ext>
           </a:extLst>
         </p:spPr>
@@ -10578,7 +10595,7 @@
           </a:ln>
           <a:extLst>
             <a:ext uri="{C572A759-6A51-4108-AA02-DFA0A04FC94B}">
-              <ma14:wrappingTextBoxFlag xmlns="" xmlns:ma14="http://schemas.microsoft.com/office/mac/drawingml/2011/main" xmlns:a14="http://schemas.microsoft.com/office/drawing/2010/main" xmlns:m="http://schemas.openxmlformats.org/officeDocument/2006/math" val="1"/>
+              <ma14:wrappingTextBoxFlag xmlns:m="http://schemas.openxmlformats.org/officeDocument/2006/math" xmlns:a14="http://schemas.microsoft.com/office/drawing/2010/main" xmlns:ma14="http://schemas.microsoft.com/office/mac/drawingml/2011/main" xmlns="" val="1"/>
             </a:ext>
           </a:extLst>
         </p:spPr>
@@ -10696,7 +10713,7 @@
           </a:ln>
           <a:extLst>
             <a:ext uri="{C572A759-6A51-4108-AA02-DFA0A04FC94B}">
-              <ma14:wrappingTextBoxFlag xmlns="" xmlns:ma14="http://schemas.microsoft.com/office/mac/drawingml/2011/main" xmlns:a14="http://schemas.microsoft.com/office/drawing/2010/main" xmlns:m="http://schemas.openxmlformats.org/officeDocument/2006/math" val="1"/>
+              <ma14:wrappingTextBoxFlag xmlns:m="http://schemas.openxmlformats.org/officeDocument/2006/math" xmlns:a14="http://schemas.microsoft.com/office/drawing/2010/main" xmlns:ma14="http://schemas.microsoft.com/office/mac/drawingml/2011/main" xmlns="" val="1"/>
             </a:ext>
           </a:extLst>
         </p:spPr>
@@ -10746,7 +10763,7 @@
           </a:ln>
           <a:extLst>
             <a:ext uri="{C572A759-6A51-4108-AA02-DFA0A04FC94B}">
-              <ma14:wrappingTextBoxFlag xmlns="" xmlns:ma14="http://schemas.microsoft.com/office/mac/drawingml/2011/main" xmlns:a14="http://schemas.microsoft.com/office/drawing/2010/main" xmlns:m="http://schemas.openxmlformats.org/officeDocument/2006/math" val="1"/>
+              <ma14:wrappingTextBoxFlag xmlns:m="http://schemas.openxmlformats.org/officeDocument/2006/math" xmlns:a14="http://schemas.microsoft.com/office/drawing/2010/main" xmlns:ma14="http://schemas.microsoft.com/office/mac/drawingml/2011/main" xmlns="" val="1"/>
             </a:ext>
           </a:extLst>
         </p:spPr>
@@ -11066,7 +11083,7 @@
           </a:ln>
           <a:extLst>
             <a:ext uri="{C572A759-6A51-4108-AA02-DFA0A04FC94B}">
-              <ma14:wrappingTextBoxFlag xmlns="" xmlns:ma14="http://schemas.microsoft.com/office/mac/drawingml/2011/main" xmlns:a14="http://schemas.microsoft.com/office/drawing/2010/main" xmlns:m="http://schemas.openxmlformats.org/officeDocument/2006/math" val="1"/>
+              <ma14:wrappingTextBoxFlag xmlns:m="http://schemas.openxmlformats.org/officeDocument/2006/math" xmlns:a14="http://schemas.microsoft.com/office/drawing/2010/main" xmlns:ma14="http://schemas.microsoft.com/office/mac/drawingml/2011/main" xmlns="" val="1"/>
             </a:ext>
           </a:extLst>
         </p:spPr>
@@ -11184,7 +11201,7 @@
           </a:ln>
           <a:extLst>
             <a:ext uri="{C572A759-6A51-4108-AA02-DFA0A04FC94B}">
-              <ma14:wrappingTextBoxFlag xmlns="" xmlns:ma14="http://schemas.microsoft.com/office/mac/drawingml/2011/main" xmlns:a14="http://schemas.microsoft.com/office/drawing/2010/main" xmlns:m="http://schemas.openxmlformats.org/officeDocument/2006/math" val="1"/>
+              <ma14:wrappingTextBoxFlag xmlns:m="http://schemas.openxmlformats.org/officeDocument/2006/math" xmlns:a14="http://schemas.microsoft.com/office/drawing/2010/main" xmlns:ma14="http://schemas.microsoft.com/office/mac/drawingml/2011/main" xmlns="" val="1"/>
             </a:ext>
           </a:extLst>
         </p:spPr>
@@ -11374,7 +11391,7 @@
           </a:ln>
           <a:extLst>
             <a:ext uri="{C572A759-6A51-4108-AA02-DFA0A04FC94B}">
-              <ma14:wrappingTextBoxFlag xmlns="" xmlns:ma14="http://schemas.microsoft.com/office/mac/drawingml/2011/main" xmlns:a14="http://schemas.microsoft.com/office/drawing/2010/main" xmlns:m="http://schemas.openxmlformats.org/officeDocument/2006/math" val="1"/>
+              <ma14:wrappingTextBoxFlag xmlns:m="http://schemas.openxmlformats.org/officeDocument/2006/math" xmlns:a14="http://schemas.microsoft.com/office/drawing/2010/main" xmlns:ma14="http://schemas.microsoft.com/office/mac/drawingml/2011/main" xmlns="" val="1"/>
             </a:ext>
           </a:extLst>
         </p:spPr>
@@ -11414,7 +11431,7 @@
           </a:ln>
           <a:extLst>
             <a:ext uri="{C572A759-6A51-4108-AA02-DFA0A04FC94B}">
-              <ma14:wrappingTextBoxFlag xmlns="" xmlns:ma14="http://schemas.microsoft.com/office/mac/drawingml/2011/main" xmlns:a14="http://schemas.microsoft.com/office/drawing/2010/main" xmlns:m="http://schemas.openxmlformats.org/officeDocument/2006/math" val="1"/>
+              <ma14:wrappingTextBoxFlag xmlns:m="http://schemas.openxmlformats.org/officeDocument/2006/math" xmlns:a14="http://schemas.microsoft.com/office/drawing/2010/main" xmlns:ma14="http://schemas.microsoft.com/office/mac/drawingml/2011/main" xmlns="" val="1"/>
             </a:ext>
           </a:extLst>
         </p:spPr>
@@ -12317,7 +12334,7 @@
           </a:ln>
           <a:extLst>
             <a:ext uri="{C572A759-6A51-4108-AA02-DFA0A04FC94B}">
-              <ma14:wrappingTextBoxFlag xmlns="" xmlns:ma14="http://schemas.microsoft.com/office/mac/drawingml/2011/main" xmlns:a14="http://schemas.microsoft.com/office/drawing/2010/main" xmlns:m="http://schemas.openxmlformats.org/officeDocument/2006/math" val="1"/>
+              <ma14:wrappingTextBoxFlag xmlns:m="http://schemas.openxmlformats.org/officeDocument/2006/math" xmlns:a14="http://schemas.microsoft.com/office/drawing/2010/main" xmlns:ma14="http://schemas.microsoft.com/office/mac/drawingml/2011/main" xmlns="" val="1"/>
             </a:ext>
           </a:extLst>
         </p:spPr>
@@ -12357,7 +12374,7 @@
           </a:ln>
           <a:extLst>
             <a:ext uri="{C572A759-6A51-4108-AA02-DFA0A04FC94B}">
-              <ma14:wrappingTextBoxFlag xmlns="" xmlns:ma14="http://schemas.microsoft.com/office/mac/drawingml/2011/main" xmlns:a14="http://schemas.microsoft.com/office/drawing/2010/main" xmlns:m="http://schemas.openxmlformats.org/officeDocument/2006/math" val="1"/>
+              <ma14:wrappingTextBoxFlag xmlns:m="http://schemas.openxmlformats.org/officeDocument/2006/math" xmlns:a14="http://schemas.microsoft.com/office/drawing/2010/main" xmlns:ma14="http://schemas.microsoft.com/office/mac/drawingml/2011/main" xmlns="" val="1"/>
             </a:ext>
           </a:extLst>
         </p:spPr>
@@ -13262,7 +13279,7 @@
           </a:ln>
           <a:extLst>
             <a:ext uri="{C572A759-6A51-4108-AA02-DFA0A04FC94B}">
-              <ma14:wrappingTextBoxFlag xmlns="" xmlns:ma14="http://schemas.microsoft.com/office/mac/drawingml/2011/main" xmlns:a14="http://schemas.microsoft.com/office/drawing/2010/main" xmlns:m="http://schemas.openxmlformats.org/officeDocument/2006/math" val="1"/>
+              <ma14:wrappingTextBoxFlag xmlns:m="http://schemas.openxmlformats.org/officeDocument/2006/math" xmlns:a14="http://schemas.microsoft.com/office/drawing/2010/main" xmlns:ma14="http://schemas.microsoft.com/office/mac/drawingml/2011/main" xmlns="" val="1"/>
             </a:ext>
           </a:extLst>
         </p:spPr>
@@ -13302,7 +13319,7 @@
           </a:ln>
           <a:extLst>
             <a:ext uri="{C572A759-6A51-4108-AA02-DFA0A04FC94B}">
-              <ma14:wrappingTextBoxFlag xmlns="" xmlns:ma14="http://schemas.microsoft.com/office/mac/drawingml/2011/main" xmlns:a14="http://schemas.microsoft.com/office/drawing/2010/main" xmlns:m="http://schemas.openxmlformats.org/officeDocument/2006/math" val="1"/>
+              <ma14:wrappingTextBoxFlag xmlns:m="http://schemas.openxmlformats.org/officeDocument/2006/math" xmlns:a14="http://schemas.microsoft.com/office/drawing/2010/main" xmlns:ma14="http://schemas.microsoft.com/office/mac/drawingml/2011/main" xmlns="" val="1"/>
             </a:ext>
           </a:extLst>
         </p:spPr>
@@ -14299,7 +14316,7 @@
           </a:ln>
           <a:extLst>
             <a:ext uri="{C572A759-6A51-4108-AA02-DFA0A04FC94B}">
-              <ma14:wrappingTextBoxFlag xmlns="" xmlns:ma14="http://schemas.microsoft.com/office/mac/drawingml/2011/main" xmlns:a14="http://schemas.microsoft.com/office/drawing/2010/main" xmlns:m="http://schemas.openxmlformats.org/officeDocument/2006/math" val="1"/>
+              <ma14:wrappingTextBoxFlag xmlns:m="http://schemas.openxmlformats.org/officeDocument/2006/math" xmlns:a14="http://schemas.microsoft.com/office/drawing/2010/main" xmlns:ma14="http://schemas.microsoft.com/office/mac/drawingml/2011/main" xmlns="" val="1"/>
             </a:ext>
           </a:extLst>
         </p:spPr>
@@ -14659,7 +14676,13 @@
   <p:cSld>
     <p:spTree>
       <p:nvGrpSpPr>
-        <p:cNvPr id="1" name=""/>
+        <p:cNvPr id="1" name="">
+          <a:extLst>
+            <a:ext uri="{FF2B5EF4-FFF2-40B4-BE49-F238E27FC236}">
+              <a16:creationId xmlns:a16="http://schemas.microsoft.com/office/drawing/2014/main" id="{67B82CAE-536A-1241-85D1-307774376F6D}"/>
+            </a:ext>
+          </a:extLst>
+        </p:cNvPr>
         <p:cNvGrpSpPr/>
         <p:nvPr/>
       </p:nvGrpSpPr>
@@ -14673,10 +14696,10 @@
       </p:grpSpPr>
       <p:sp>
         <p:nvSpPr>
-          <p:cNvPr id="2" name="Title 1">
+          <p:cNvPr id="6" name="Title 1">
             <a:extLst>
               <a:ext uri="{FF2B5EF4-FFF2-40B4-BE49-F238E27FC236}">
-                <a16:creationId xmlns:a16="http://schemas.microsoft.com/office/drawing/2014/main" id="{6FB4FCDC-A302-3F53-2EF3-AD4ABC1FA2D9}"/>
+                <a16:creationId xmlns:a16="http://schemas.microsoft.com/office/drawing/2014/main" id="{4AED4F56-7195-E0D7-D522-4BB262165ED5}"/>
               </a:ext>
             </a:extLst>
           </p:cNvPr>
@@ -14687,19 +14710,168 @@
             <p:ph type="title"/>
           </p:nvPr>
         </p:nvSpPr>
-        <p:spPr/>
+        <p:spPr>
+          <a:xfrm>
+            <a:off x="1006004" y="1255829"/>
+            <a:ext cx="21120232" cy="1452004"/>
+          </a:xfrm>
+        </p:spPr>
         <p:txBody>
           <a:bodyPr/>
           <a:lstStyle/>
           <a:p>
-            <a:endParaRPr lang="en-US"/>
+            <a:r>
+              <a:rPr lang="en-US" dirty="0"/>
+              <a:t>Bridge</a:t>
+            </a:r>
+          </a:p>
+        </p:txBody>
+      </p:sp>
+      <p:sp>
+        <p:nvSpPr>
+          <p:cNvPr id="3" name="TextBox 2">
+            <a:extLst>
+              <a:ext uri="{FF2B5EF4-FFF2-40B4-BE49-F238E27FC236}">
+                <a16:creationId xmlns:a16="http://schemas.microsoft.com/office/drawing/2014/main" id="{1F1C976F-2A3E-AE4E-B9C6-89565BCC1937}"/>
+              </a:ext>
+            </a:extLst>
+          </p:cNvPr>
+          <p:cNvSpPr txBox="1"/>
+          <p:nvPr/>
+        </p:nvSpPr>
+        <p:spPr>
+          <a:xfrm>
+            <a:off x="1006004" y="2707833"/>
+            <a:ext cx="13811965" cy="1402948"/>
+          </a:xfrm>
+          <a:prstGeom prst="rect">
+            <a:avLst/>
+          </a:prstGeom>
+        </p:spPr>
+        <p:style>
+          <a:lnRef idx="0">
+            <a:scrgbClr r="0" g="0" b="0"/>
+          </a:lnRef>
+          <a:fillRef idx="0">
+            <a:scrgbClr r="0" g="0" b="0"/>
+          </a:fillRef>
+          <a:effectRef idx="0">
+            <a:scrgbClr r="0" g="0" b="0"/>
+          </a:effectRef>
+          <a:fontRef idx="none"/>
+        </p:style>
+        <p:txBody>
+          <a:bodyPr rot="0" spcFirstLastPara="1" vertOverflow="overflow" horzOverflow="overflow" vert="horz" wrap="square" lIns="50800" tIns="50800" rIns="50800" bIns="50800" numCol="1" spcCol="38100" rtlCol="0" anchor="ctr">
+            <a:spAutoFit/>
+          </a:bodyPr>
+          <a:lstStyle/>
+          <a:p>
+            <a:pPr marL="0" marR="0" indent="0" algn="l" defTabSz="821531" rtl="0" fontAlgn="auto" latinLnBrk="0" hangingPunct="0">
+              <a:lnSpc>
+                <a:spcPct val="120000"/>
+              </a:lnSpc>
+              <a:spcBef>
+                <a:spcPts val="1500"/>
+              </a:spcBef>
+              <a:spcAft>
+                <a:spcPts val="0"/>
+              </a:spcAft>
+              <a:buClrTx/>
+              <a:buSzTx/>
+              <a:buFontTx/>
+              <a:buNone/>
+              <a:tabLst/>
+            </a:pPr>
+            <a:r>
+              <a:rPr lang="en-US" sz="6000" dirty="0">
+                <a:solidFill>
+                  <a:schemeClr val="bg2"/>
+                </a:solidFill>
+              </a:rPr>
+              <a:t>Implementation</a:t>
+            </a:r>
+          </a:p>
+        </p:txBody>
+      </p:sp>
+      <p:sp>
+        <p:nvSpPr>
+          <p:cNvPr id="4" name="TextBox 3">
+            <a:extLst>
+              <a:ext uri="{FF2B5EF4-FFF2-40B4-BE49-F238E27FC236}">
+                <a16:creationId xmlns:a16="http://schemas.microsoft.com/office/drawing/2014/main" id="{21793812-83EB-98F9-C1AA-5DDDF9E51F50}"/>
+              </a:ext>
+            </a:extLst>
+          </p:cNvPr>
+          <p:cNvSpPr txBox="1"/>
+          <p:nvPr/>
+        </p:nvSpPr>
+        <p:spPr>
+          <a:xfrm>
+            <a:off x="1006004" y="4971883"/>
+            <a:ext cx="19927572" cy="885884"/>
+          </a:xfrm>
+          <a:prstGeom prst="rect">
+            <a:avLst/>
+          </a:prstGeom>
+        </p:spPr>
+        <p:style>
+          <a:lnRef idx="0">
+            <a:scrgbClr r="0" g="0" b="0"/>
+          </a:lnRef>
+          <a:fillRef idx="0">
+            <a:scrgbClr r="0" g="0" b="0"/>
+          </a:fillRef>
+          <a:effectRef idx="0">
+            <a:scrgbClr r="0" g="0" b="0"/>
+          </a:effectRef>
+          <a:fontRef idx="none"/>
+        </p:style>
+        <p:txBody>
+          <a:bodyPr rot="0" spcFirstLastPara="1" vertOverflow="overflow" horzOverflow="overflow" vert="horz" wrap="square" lIns="50800" tIns="50800" rIns="50800" bIns="50800" numCol="1" spcCol="38100" rtlCol="0" anchor="ctr">
+            <a:spAutoFit/>
+          </a:bodyPr>
+          <a:lstStyle/>
+          <a:p>
+            <a:pPr marL="457200" marR="0" indent="-457200" algn="l" defTabSz="821531" rtl="0" fontAlgn="auto" latinLnBrk="0" hangingPunct="0">
+              <a:lnSpc>
+                <a:spcPct val="120000"/>
+              </a:lnSpc>
+              <a:spcBef>
+                <a:spcPts val="1500"/>
+              </a:spcBef>
+              <a:spcAft>
+                <a:spcPts val="0"/>
+              </a:spcAft>
+              <a:buClrTx/>
+              <a:buSzTx/>
+              <a:buFont typeface="Arial" panose="020B0604020202020204" pitchFamily="34" charset="0"/>
+              <a:buChar char="•"/>
+              <a:tabLst/>
+            </a:pPr>
+            <a:r>
+              <a:rPr kumimoji="0" lang="en-US" sz="3200" b="0" i="0" u="none" strike="noStrike" cap="none" spc="0" normalizeH="0" baseline="0" dirty="0">
+                <a:ln>
+                  <a:noFill/>
+                </a:ln>
+                <a:solidFill>
+                  <a:schemeClr val="bg2"/>
+                </a:solidFill>
+                <a:effectLst/>
+                <a:uFillTx/>
+                <a:latin typeface="+mn-lt"/>
+                <a:ea typeface="+mn-ea"/>
+                <a:cs typeface="+mn-cs"/>
+                <a:sym typeface="Poppins Regular"/>
+              </a:rPr>
+              <a:t>https://github.com/Iamsdl/Endava-DesignPatterns/tree/main/Bridge</a:t>
+            </a:r>
           </a:p>
         </p:txBody>
       </p:sp>
     </p:spTree>
     <p:extLst>
       <p:ext uri="{BB962C8B-B14F-4D97-AF65-F5344CB8AC3E}">
-        <p14:creationId xmlns:p14="http://schemas.microsoft.com/office/powerpoint/2010/main" val="3772312407"/>
+        <p14:creationId xmlns:p14="http://schemas.microsoft.com/office/powerpoint/2010/main" val="3803058074"/>
       </p:ext>
     </p:extLst>
   </p:cSld>
@@ -15166,6 +15338,563 @@
         <p:cNvPr id="1" name="">
           <a:extLst>
             <a:ext uri="{FF2B5EF4-FFF2-40B4-BE49-F238E27FC236}">
+              <a16:creationId xmlns:a16="http://schemas.microsoft.com/office/drawing/2014/main" id="{AF8E2BE5-6E96-711D-9970-4A215AEB0B74}"/>
+            </a:ext>
+          </a:extLst>
+        </p:cNvPr>
+        <p:cNvGrpSpPr/>
+        <p:nvPr/>
+      </p:nvGrpSpPr>
+      <p:grpSpPr>
+        <a:xfrm>
+          <a:off x="0" y="0"/>
+          <a:ext cx="0" cy="0"/>
+          <a:chOff x="0" y="0"/>
+          <a:chExt cx="0" cy="0"/>
+        </a:xfrm>
+      </p:grpSpPr>
+      <p:sp>
+        <p:nvSpPr>
+          <p:cNvPr id="6" name="Title 1">
+            <a:extLst>
+              <a:ext uri="{FF2B5EF4-FFF2-40B4-BE49-F238E27FC236}">
+                <a16:creationId xmlns:a16="http://schemas.microsoft.com/office/drawing/2014/main" id="{B29F58BD-E68B-8200-F803-1BF6500FFDE7}"/>
+              </a:ext>
+            </a:extLst>
+          </p:cNvPr>
+          <p:cNvSpPr>
+            <a:spLocks noGrp="1"/>
+          </p:cNvSpPr>
+          <p:nvPr>
+            <p:ph type="title"/>
+          </p:nvPr>
+        </p:nvSpPr>
+        <p:spPr>
+          <a:xfrm>
+            <a:off x="1006004" y="1255829"/>
+            <a:ext cx="21120232" cy="1452004"/>
+          </a:xfrm>
+        </p:spPr>
+        <p:txBody>
+          <a:bodyPr/>
+          <a:lstStyle/>
+          <a:p>
+            <a:r>
+              <a:rPr lang="en-US" dirty="0"/>
+              <a:t>Prototype</a:t>
+            </a:r>
+          </a:p>
+        </p:txBody>
+      </p:sp>
+      <p:sp>
+        <p:nvSpPr>
+          <p:cNvPr id="3" name="TextBox 2">
+            <a:extLst>
+              <a:ext uri="{FF2B5EF4-FFF2-40B4-BE49-F238E27FC236}">
+                <a16:creationId xmlns:a16="http://schemas.microsoft.com/office/drawing/2014/main" id="{DABDC26A-B17C-8699-1662-5AA51128F5E4}"/>
+              </a:ext>
+            </a:extLst>
+          </p:cNvPr>
+          <p:cNvSpPr txBox="1"/>
+          <p:nvPr/>
+        </p:nvSpPr>
+        <p:spPr>
+          <a:xfrm>
+            <a:off x="1006004" y="2707833"/>
+            <a:ext cx="13811965" cy="1402948"/>
+          </a:xfrm>
+          <a:prstGeom prst="rect">
+            <a:avLst/>
+          </a:prstGeom>
+        </p:spPr>
+        <p:style>
+          <a:lnRef idx="0">
+            <a:scrgbClr r="0" g="0" b="0"/>
+          </a:lnRef>
+          <a:fillRef idx="0">
+            <a:scrgbClr r="0" g="0" b="0"/>
+          </a:fillRef>
+          <a:effectRef idx="0">
+            <a:scrgbClr r="0" g="0" b="0"/>
+          </a:effectRef>
+          <a:fontRef idx="none"/>
+        </p:style>
+        <p:txBody>
+          <a:bodyPr rot="0" spcFirstLastPara="1" vertOverflow="overflow" horzOverflow="overflow" vert="horz" wrap="square" lIns="50800" tIns="50800" rIns="50800" bIns="50800" numCol="1" spcCol="38100" rtlCol="0" anchor="ctr">
+            <a:spAutoFit/>
+          </a:bodyPr>
+          <a:lstStyle/>
+          <a:p>
+            <a:pPr marL="0" marR="0" indent="0" algn="l" defTabSz="821531" rtl="0" fontAlgn="auto" latinLnBrk="0" hangingPunct="0">
+              <a:lnSpc>
+                <a:spcPct val="120000"/>
+              </a:lnSpc>
+              <a:spcBef>
+                <a:spcPts val="1500"/>
+              </a:spcBef>
+              <a:spcAft>
+                <a:spcPts val="0"/>
+              </a:spcAft>
+              <a:buClrTx/>
+              <a:buSzTx/>
+              <a:buFontTx/>
+              <a:buNone/>
+              <a:tabLst/>
+            </a:pPr>
+            <a:r>
+              <a:rPr lang="en-US" sz="6000" dirty="0">
+                <a:solidFill>
+                  <a:schemeClr val="bg2"/>
+                </a:solidFill>
+              </a:rPr>
+              <a:t>Real life application context:</a:t>
+            </a:r>
+          </a:p>
+        </p:txBody>
+      </p:sp>
+      <p:sp>
+        <p:nvSpPr>
+          <p:cNvPr id="2" name="TextBox 1">
+            <a:extLst>
+              <a:ext uri="{FF2B5EF4-FFF2-40B4-BE49-F238E27FC236}">
+                <a16:creationId xmlns:a16="http://schemas.microsoft.com/office/drawing/2014/main" id="{66FDA351-0C36-CE1B-05BB-EE80B892548C}"/>
+              </a:ext>
+            </a:extLst>
+          </p:cNvPr>
+          <p:cNvSpPr txBox="1"/>
+          <p:nvPr/>
+        </p:nvSpPr>
+        <p:spPr>
+          <a:xfrm>
+            <a:off x="1006004" y="4257547"/>
+            <a:ext cx="22371992" cy="5200911"/>
+          </a:xfrm>
+          <a:prstGeom prst="rect">
+            <a:avLst/>
+          </a:prstGeom>
+          <a:noFill/>
+          <a:ln w="12700" cap="flat">
+            <a:noFill/>
+            <a:miter lim="400000"/>
+          </a:ln>
+          <a:effectLst/>
+          <a:sp3d/>
+        </p:spPr>
+        <p:style>
+          <a:lnRef idx="0">
+            <a:scrgbClr r="0" g="0" b="0"/>
+          </a:lnRef>
+          <a:fillRef idx="0">
+            <a:scrgbClr r="0" g="0" b="0"/>
+          </a:fillRef>
+          <a:effectRef idx="0">
+            <a:scrgbClr r="0" g="0" b="0"/>
+          </a:effectRef>
+          <a:fontRef idx="none"/>
+        </p:style>
+        <p:txBody>
+          <a:bodyPr rot="0" spcFirstLastPara="1" vertOverflow="overflow" horzOverflow="overflow" vert="horz" wrap="square" lIns="50800" tIns="50800" rIns="50800" bIns="50800" numCol="1" spcCol="38100" rtlCol="0" anchor="ctr">
+            <a:spAutoFit/>
+          </a:bodyPr>
+          <a:lstStyle/>
+          <a:p>
+            <a:pPr marL="457200" marR="0" indent="-457200" algn="l" defTabSz="821531" rtl="0" fontAlgn="auto" latinLnBrk="0" hangingPunct="0">
+              <a:lnSpc>
+                <a:spcPct val="120000"/>
+              </a:lnSpc>
+              <a:spcBef>
+                <a:spcPts val="1500"/>
+              </a:spcBef>
+              <a:spcAft>
+                <a:spcPts val="0"/>
+              </a:spcAft>
+              <a:buClrTx/>
+              <a:buSzTx/>
+              <a:buFont typeface="Arial" panose="020B0604020202020204" pitchFamily="34" charset="0"/>
+              <a:buChar char="•"/>
+              <a:tabLst/>
+            </a:pPr>
+            <a:r>
+              <a:rPr kumimoji="0" lang="en-US" sz="3200" b="0" i="0" u="none" strike="noStrike" cap="none" spc="0" normalizeH="0" baseline="0" dirty="0">
+                <a:ln>
+                  <a:noFill/>
+                </a:ln>
+                <a:solidFill>
+                  <a:schemeClr val="bg2"/>
+                </a:solidFill>
+                <a:effectLst/>
+                <a:uFillTx/>
+                <a:latin typeface="+mn-lt"/>
+                <a:ea typeface="+mn-ea"/>
+                <a:cs typeface="+mn-cs"/>
+                <a:sym typeface="Poppins Regular"/>
+              </a:rPr>
+              <a:t>A medical booth for remote consultations equipped with medical devices for performing various </a:t>
+            </a:r>
+          </a:p>
+          <a:p>
+            <a:pPr marL="0" marR="0" indent="0" algn="l" defTabSz="821531" rtl="0" fontAlgn="auto" latinLnBrk="0" hangingPunct="0">
+              <a:lnSpc>
+                <a:spcPct val="120000"/>
+              </a:lnSpc>
+              <a:spcBef>
+                <a:spcPts val="1500"/>
+              </a:spcBef>
+              <a:spcAft>
+                <a:spcPts val="0"/>
+              </a:spcAft>
+              <a:buClrTx/>
+              <a:buSzTx/>
+              <a:buFontTx/>
+              <a:buNone/>
+              <a:tabLst/>
+            </a:pPr>
+            <a:r>
+              <a:rPr kumimoji="0" lang="en-US" sz="3200" b="0" i="0" u="none" strike="noStrike" cap="none" spc="0" normalizeH="0" baseline="0" dirty="0">
+                <a:ln>
+                  <a:noFill/>
+                </a:ln>
+                <a:solidFill>
+                  <a:schemeClr val="bg2"/>
+                </a:solidFill>
+                <a:effectLst/>
+                <a:uFillTx/>
+                <a:latin typeface="+mn-lt"/>
+                <a:ea typeface="+mn-ea"/>
+                <a:cs typeface="+mn-cs"/>
+                <a:sym typeface="Poppins Regular"/>
+              </a:rPr>
+              <a:t>measurements (blood pressure, oximetry, weight).</a:t>
+            </a:r>
+          </a:p>
+          <a:p>
+            <a:pPr marL="457200" marR="0" indent="-457200" algn="l" defTabSz="821531" rtl="0" fontAlgn="auto" latinLnBrk="0" hangingPunct="0">
+              <a:lnSpc>
+                <a:spcPct val="120000"/>
+              </a:lnSpc>
+              <a:spcBef>
+                <a:spcPts val="1500"/>
+              </a:spcBef>
+              <a:spcAft>
+                <a:spcPts val="0"/>
+              </a:spcAft>
+              <a:buClrTx/>
+              <a:buSzTx/>
+              <a:buFont typeface="Arial" panose="020B0604020202020204" pitchFamily="34" charset="0"/>
+              <a:buChar char="•"/>
+              <a:tabLst/>
+            </a:pPr>
+            <a:r>
+              <a:rPr kumimoji="0" lang="en-US" sz="3200" b="0" i="0" u="none" strike="noStrike" cap="none" spc="0" normalizeH="0" baseline="0" dirty="0">
+                <a:ln>
+                  <a:noFill/>
+                </a:ln>
+                <a:solidFill>
+                  <a:schemeClr val="bg2"/>
+                </a:solidFill>
+                <a:effectLst/>
+                <a:uFillTx/>
+                <a:latin typeface="+mn-lt"/>
+                <a:ea typeface="+mn-ea"/>
+                <a:cs typeface="+mn-cs"/>
+                <a:sym typeface="Poppins Regular"/>
+              </a:rPr>
+              <a:t>The patient is making an appointment at a specific time, for a cabin and a doctor.</a:t>
+            </a:r>
+          </a:p>
+          <a:p>
+            <a:pPr marL="457200" marR="0" indent="-457200" algn="l" defTabSz="821531" rtl="0" fontAlgn="auto" latinLnBrk="0" hangingPunct="0">
+              <a:lnSpc>
+                <a:spcPct val="120000"/>
+              </a:lnSpc>
+              <a:spcBef>
+                <a:spcPts val="1500"/>
+              </a:spcBef>
+              <a:spcAft>
+                <a:spcPts val="0"/>
+              </a:spcAft>
+              <a:buClrTx/>
+              <a:buSzTx/>
+              <a:buFont typeface="Arial" panose="020B0604020202020204" pitchFamily="34" charset="0"/>
+              <a:buChar char="•"/>
+              <a:tabLst/>
+            </a:pPr>
+            <a:r>
+              <a:rPr lang="en-US" sz="3200" dirty="0">
+                <a:solidFill>
+                  <a:schemeClr val="bg2"/>
+                </a:solidFill>
+                <a:sym typeface="Poppins Regular"/>
+              </a:rPr>
+              <a:t>An admin application displays these appointments in a calendar.</a:t>
+            </a:r>
+            <a:endParaRPr kumimoji="0" lang="en-US" sz="3200" b="0" i="0" u="none" strike="noStrike" cap="none" spc="0" normalizeH="0" baseline="0" dirty="0">
+              <a:ln>
+                <a:noFill/>
+              </a:ln>
+              <a:solidFill>
+                <a:schemeClr val="bg2"/>
+              </a:solidFill>
+              <a:effectLst/>
+              <a:uFillTx/>
+              <a:latin typeface="+mn-lt"/>
+              <a:ea typeface="+mn-ea"/>
+              <a:cs typeface="+mn-cs"/>
+              <a:sym typeface="Poppins Regular"/>
+            </a:endParaRPr>
+          </a:p>
+          <a:p>
+            <a:pPr marL="457200" indent="-457200" defTabSz="821531" hangingPunct="0">
+              <a:lnSpc>
+                <a:spcPct val="120000"/>
+              </a:lnSpc>
+              <a:spcBef>
+                <a:spcPts val="1500"/>
+              </a:spcBef>
+              <a:buFont typeface="Arial" panose="020B0604020202020204" pitchFamily="34" charset="0"/>
+              <a:buChar char="•"/>
+            </a:pPr>
+            <a:r>
+              <a:rPr kumimoji="0" lang="en-US" sz="3200" b="0" i="0" u="none" strike="noStrike" cap="none" spc="0" normalizeH="0" baseline="0" dirty="0">
+                <a:ln>
+                  <a:noFill/>
+                </a:ln>
+                <a:solidFill>
+                  <a:schemeClr val="bg2"/>
+                </a:solidFill>
+                <a:effectLst/>
+                <a:uFillTx/>
+                <a:latin typeface="+mn-lt"/>
+                <a:ea typeface="+mn-ea"/>
+                <a:cs typeface="+mn-cs"/>
+                <a:sym typeface="Poppins Regular"/>
+              </a:rPr>
+              <a:t>The problem: </a:t>
+            </a:r>
+            <a:r>
+              <a:rPr lang="en-US" sz="3200" dirty="0">
+                <a:solidFill>
+                  <a:schemeClr val="bg2"/>
+                </a:solidFill>
+                <a:sym typeface="Poppins Regular"/>
+              </a:rPr>
+              <a:t>The same appointment needed to be shown twice, once for the cabin and once for the doctor. The cabin and doctor serving that appointment could be in different time zones. The backend needed to duplicate the appointment in order to set the correct </a:t>
+            </a:r>
+            <a:r>
+              <a:rPr lang="en-US" sz="3200" dirty="0" err="1">
+                <a:solidFill>
+                  <a:schemeClr val="bg2"/>
+                </a:solidFill>
+                <a:sym typeface="Poppins Regular"/>
+              </a:rPr>
+              <a:t>timezone</a:t>
+            </a:r>
+            <a:r>
+              <a:rPr lang="en-US" sz="3200" dirty="0">
+                <a:solidFill>
+                  <a:schemeClr val="bg2"/>
+                </a:solidFill>
+                <a:sym typeface="Poppins Regular"/>
+              </a:rPr>
+              <a:t> information for each instance.</a:t>
+            </a:r>
+          </a:p>
+        </p:txBody>
+      </p:sp>
+    </p:spTree>
+    <p:extLst>
+      <p:ext uri="{BB962C8B-B14F-4D97-AF65-F5344CB8AC3E}">
+        <p14:creationId xmlns:p14="http://schemas.microsoft.com/office/powerpoint/2010/main" val="1510368498"/>
+      </p:ext>
+    </p:extLst>
+  </p:cSld>
+  <p:clrMapOvr>
+    <a:masterClrMapping/>
+  </p:clrMapOvr>
+  <p:transition spd="med"/>
+</p:sld>
+</file>
+
+<file path=ppt/slides/slide14.xml><?xml version="1.0" encoding="utf-8"?>
+<p:sld xmlns:a="http://schemas.openxmlformats.org/drawingml/2006/main" xmlns:r="http://schemas.openxmlformats.org/officeDocument/2006/relationships" xmlns:p="http://schemas.openxmlformats.org/presentationml/2006/main">
+  <p:cSld>
+    <p:spTree>
+      <p:nvGrpSpPr>
+        <p:cNvPr id="1" name="">
+          <a:extLst>
+            <a:ext uri="{FF2B5EF4-FFF2-40B4-BE49-F238E27FC236}">
+              <a16:creationId xmlns:a16="http://schemas.microsoft.com/office/drawing/2014/main" id="{9CD676AB-4496-7AC8-FCFA-8A223B7BD759}"/>
+            </a:ext>
+          </a:extLst>
+        </p:cNvPr>
+        <p:cNvGrpSpPr/>
+        <p:nvPr/>
+      </p:nvGrpSpPr>
+      <p:grpSpPr>
+        <a:xfrm>
+          <a:off x="0" y="0"/>
+          <a:ext cx="0" cy="0"/>
+          <a:chOff x="0" y="0"/>
+          <a:chExt cx="0" cy="0"/>
+        </a:xfrm>
+      </p:grpSpPr>
+      <p:sp>
+        <p:nvSpPr>
+          <p:cNvPr id="6" name="Title 1">
+            <a:extLst>
+              <a:ext uri="{FF2B5EF4-FFF2-40B4-BE49-F238E27FC236}">
+                <a16:creationId xmlns:a16="http://schemas.microsoft.com/office/drawing/2014/main" id="{9A73F275-46C1-0232-23CD-0594E20FA1B6}"/>
+              </a:ext>
+            </a:extLst>
+          </p:cNvPr>
+          <p:cNvSpPr>
+            <a:spLocks noGrp="1"/>
+          </p:cNvSpPr>
+          <p:nvPr>
+            <p:ph type="title"/>
+          </p:nvPr>
+        </p:nvSpPr>
+        <p:spPr>
+          <a:xfrm>
+            <a:off x="1006004" y="1255829"/>
+            <a:ext cx="21120232" cy="1452004"/>
+          </a:xfrm>
+        </p:spPr>
+        <p:txBody>
+          <a:bodyPr/>
+          <a:lstStyle/>
+          <a:p>
+            <a:r>
+              <a:rPr lang="en-US" dirty="0"/>
+              <a:t>Prototype</a:t>
+            </a:r>
+          </a:p>
+        </p:txBody>
+      </p:sp>
+      <p:sp>
+        <p:nvSpPr>
+          <p:cNvPr id="3" name="TextBox 2">
+            <a:extLst>
+              <a:ext uri="{FF2B5EF4-FFF2-40B4-BE49-F238E27FC236}">
+                <a16:creationId xmlns:a16="http://schemas.microsoft.com/office/drawing/2014/main" id="{AB439B9D-2C34-504B-C576-61E655E0DF3C}"/>
+              </a:ext>
+            </a:extLst>
+          </p:cNvPr>
+          <p:cNvSpPr txBox="1"/>
+          <p:nvPr/>
+        </p:nvSpPr>
+        <p:spPr>
+          <a:xfrm>
+            <a:off x="1006004" y="2707833"/>
+            <a:ext cx="13811965" cy="1402948"/>
+          </a:xfrm>
+          <a:prstGeom prst="rect">
+            <a:avLst/>
+          </a:prstGeom>
+        </p:spPr>
+        <p:style>
+          <a:lnRef idx="0">
+            <a:scrgbClr r="0" g="0" b="0"/>
+          </a:lnRef>
+          <a:fillRef idx="0">
+            <a:scrgbClr r="0" g="0" b="0"/>
+          </a:fillRef>
+          <a:effectRef idx="0">
+            <a:scrgbClr r="0" g="0" b="0"/>
+          </a:effectRef>
+          <a:fontRef idx="none"/>
+        </p:style>
+        <p:txBody>
+          <a:bodyPr rot="0" spcFirstLastPara="1" vertOverflow="overflow" horzOverflow="overflow" vert="horz" wrap="square" lIns="50800" tIns="50800" rIns="50800" bIns="50800" numCol="1" spcCol="38100" rtlCol="0" anchor="ctr">
+            <a:spAutoFit/>
+          </a:bodyPr>
+          <a:lstStyle/>
+          <a:p>
+            <a:pPr marL="0" marR="0" indent="0" algn="l" defTabSz="821531" rtl="0" fontAlgn="auto" latinLnBrk="0" hangingPunct="0">
+              <a:lnSpc>
+                <a:spcPct val="120000"/>
+              </a:lnSpc>
+              <a:spcBef>
+                <a:spcPts val="1500"/>
+              </a:spcBef>
+              <a:spcAft>
+                <a:spcPts val="0"/>
+              </a:spcAft>
+              <a:buClrTx/>
+              <a:buSzTx/>
+              <a:buFontTx/>
+              <a:buNone/>
+              <a:tabLst/>
+            </a:pPr>
+            <a:r>
+              <a:rPr lang="en-US" sz="6000" dirty="0">
+                <a:solidFill>
+                  <a:schemeClr val="bg2"/>
+                </a:solidFill>
+              </a:rPr>
+              <a:t>Real life application context:</a:t>
+            </a:r>
+          </a:p>
+        </p:txBody>
+      </p:sp>
+      <p:pic>
+        <p:nvPicPr>
+          <p:cNvPr id="5" name="Picture 4" descr="A schedule of appointment time&#10;&#10;AI-generated content may be incorrect.">
+            <a:extLst>
+              <a:ext uri="{FF2B5EF4-FFF2-40B4-BE49-F238E27FC236}">
+                <a16:creationId xmlns:a16="http://schemas.microsoft.com/office/drawing/2014/main" id="{25FAD399-C65F-C235-7B42-860886FC2112}"/>
+              </a:ext>
+            </a:extLst>
+          </p:cNvPr>
+          <p:cNvPicPr>
+            <a:picLocks noChangeAspect="1"/>
+          </p:cNvPicPr>
+          <p:nvPr/>
+        </p:nvPicPr>
+        <p:blipFill>
+          <a:blip r:embed="rId3">
+            <a:extLst>
+              <a:ext uri="{28A0092B-C50C-407E-A947-70E740481C1C}">
+                <a14:useLocalDpi xmlns:a14="http://schemas.microsoft.com/office/drawing/2010/main" val="0"/>
+              </a:ext>
+            </a:extLst>
+          </a:blip>
+          <a:stretch>
+            <a:fillRect/>
+          </a:stretch>
+        </p:blipFill>
+        <p:spPr>
+          <a:xfrm>
+            <a:off x="5648070" y="4110781"/>
+            <a:ext cx="11836100" cy="8683982"/>
+          </a:xfrm>
+          <a:prstGeom prst="rect">
+            <a:avLst/>
+          </a:prstGeom>
+        </p:spPr>
+      </p:pic>
+    </p:spTree>
+    <p:extLst>
+      <p:ext uri="{BB962C8B-B14F-4D97-AF65-F5344CB8AC3E}">
+        <p14:creationId xmlns:p14="http://schemas.microsoft.com/office/powerpoint/2010/main" val="4086353399"/>
+      </p:ext>
+    </p:extLst>
+  </p:cSld>
+  <p:clrMapOvr>
+    <a:masterClrMapping/>
+  </p:clrMapOvr>
+  <p:transition spd="med"/>
+</p:sld>
+</file>
+
+<file path=ppt/slides/slide15.xml><?xml version="1.0" encoding="utf-8"?>
+<p:sld xmlns:a="http://schemas.openxmlformats.org/drawingml/2006/main" xmlns:r="http://schemas.openxmlformats.org/officeDocument/2006/relationships" xmlns:p="http://schemas.openxmlformats.org/presentationml/2006/main">
+  <p:cSld>
+    <p:spTree>
+      <p:nvGrpSpPr>
+        <p:cNvPr id="1" name="">
+          <a:extLst>
+            <a:ext uri="{FF2B5EF4-FFF2-40B4-BE49-F238E27FC236}">
               <a16:creationId xmlns:a16="http://schemas.microsoft.com/office/drawing/2014/main" id="{200F4AE3-885A-AAFC-E910-DD251B2F4DCC}"/>
             </a:ext>
           </a:extLst>
@@ -15229,7 +15958,7 @@
         <p:spPr>
           <a:xfrm>
             <a:off x="1006004" y="2707833"/>
-            <a:ext cx="13811965" cy="1402948"/>
+            <a:ext cx="15626191" cy="1402948"/>
           </a:xfrm>
           <a:prstGeom prst="rect">
             <a:avLst/>
@@ -15275,8 +16004,37 @@
                   <a:schemeClr val="bg2"/>
                 </a:solidFill>
               </a:rPr>
-              <a:t>The problems</a:t>
-            </a:r>
+              <a:t>The problems (with new-</a:t>
+            </a:r>
+            <a:r>
+              <a:rPr lang="en-US" sz="6000" dirty="0" err="1">
+                <a:solidFill>
+                  <a:schemeClr val="bg2"/>
+                </a:solidFill>
+              </a:rPr>
+              <a:t>ing</a:t>
+            </a:r>
+            <a:r>
+              <a:rPr lang="en-US" sz="6000" dirty="0">
+                <a:solidFill>
+                  <a:schemeClr val="bg2"/>
+                </a:solidFill>
+              </a:rPr>
+              <a:t> </a:t>
+            </a:r>
+            <a:r>
+              <a:rPr lang="en-US" sz="6000">
+                <a:solidFill>
+                  <a:schemeClr val="bg2"/>
+                </a:solidFill>
+              </a:rPr>
+              <a:t>up directly)</a:t>
+            </a:r>
+            <a:endParaRPr lang="en-US" sz="6000" dirty="0">
+              <a:solidFill>
+                <a:schemeClr val="bg2"/>
+              </a:solidFill>
+            </a:endParaRPr>
           </a:p>
         </p:txBody>
       </p:sp>
@@ -15652,7 +16410,7 @@
 </p:sld>
 </file>
 
-<file path=ppt/slides/slide14.xml><?xml version="1.0" encoding="utf-8"?>
+<file path=ppt/slides/slide16.xml><?xml version="1.0" encoding="utf-8"?>
 <p:sld xmlns:a="http://schemas.openxmlformats.org/drawingml/2006/main" xmlns:r="http://schemas.openxmlformats.org/officeDocument/2006/relationships" xmlns:p="http://schemas.openxmlformats.org/presentationml/2006/main">
   <p:cSld>
     <p:spTree>
@@ -16086,7 +16844,7 @@
 </p:sld>
 </file>
 
-<file path=ppt/slides/slide15.xml><?xml version="1.0" encoding="utf-8"?>
+<file path=ppt/slides/slide17.xml><?xml version="1.0" encoding="utf-8"?>
 <p:sld xmlns:a="http://schemas.openxmlformats.org/drawingml/2006/main" xmlns:r="http://schemas.openxmlformats.org/officeDocument/2006/relationships" xmlns:p="http://schemas.openxmlformats.org/presentationml/2006/main">
   <p:cSld>
     <p:spTree>
@@ -16094,7 +16852,7 @@
         <p:cNvPr id="1" name="">
           <a:extLst>
             <a:ext uri="{FF2B5EF4-FFF2-40B4-BE49-F238E27FC236}">
-              <a16:creationId xmlns:a16="http://schemas.microsoft.com/office/drawing/2014/main" id="{23AFCCB4-FAD6-8BCA-37B8-DF3C03301A8B}"/>
+              <a16:creationId xmlns:a16="http://schemas.microsoft.com/office/drawing/2014/main" id="{51483855-5C5F-AA9A-565A-0CF7C69E0DD5}"/>
             </a:ext>
           </a:extLst>
         </p:cNvPr>
@@ -16111,10 +16869,10 @@
       </p:grpSpPr>
       <p:sp>
         <p:nvSpPr>
-          <p:cNvPr id="5" name="Title 4">
+          <p:cNvPr id="6" name="Title 1">
             <a:extLst>
               <a:ext uri="{FF2B5EF4-FFF2-40B4-BE49-F238E27FC236}">
-                <a16:creationId xmlns:a16="http://schemas.microsoft.com/office/drawing/2014/main" id="{36C170B6-A7B9-F491-43BB-A27B9BAA1F8E}"/>
+                <a16:creationId xmlns:a16="http://schemas.microsoft.com/office/drawing/2014/main" id="{FE5F7E66-8DA2-25AB-BC88-E55837F038F7}"/>
               </a:ext>
             </a:extLst>
           </p:cNvPr>
@@ -16125,19 +16883,168 @@
             <p:ph type="title"/>
           </p:nvPr>
         </p:nvSpPr>
-        <p:spPr/>
+        <p:spPr>
+          <a:xfrm>
+            <a:off x="1006004" y="1255829"/>
+            <a:ext cx="21120232" cy="1452004"/>
+          </a:xfrm>
+        </p:spPr>
         <p:txBody>
           <a:bodyPr/>
           <a:lstStyle/>
           <a:p>
-            <a:endParaRPr lang="en-US"/>
+            <a:r>
+              <a:rPr lang="en-US" dirty="0"/>
+              <a:t>Prototype</a:t>
+            </a:r>
+          </a:p>
+        </p:txBody>
+      </p:sp>
+      <p:sp>
+        <p:nvSpPr>
+          <p:cNvPr id="3" name="TextBox 2">
+            <a:extLst>
+              <a:ext uri="{FF2B5EF4-FFF2-40B4-BE49-F238E27FC236}">
+                <a16:creationId xmlns:a16="http://schemas.microsoft.com/office/drawing/2014/main" id="{50F80A3C-C3A9-41F9-C4FE-3AC4F1C67E37}"/>
+              </a:ext>
+            </a:extLst>
+          </p:cNvPr>
+          <p:cNvSpPr txBox="1"/>
+          <p:nvPr/>
+        </p:nvSpPr>
+        <p:spPr>
+          <a:xfrm>
+            <a:off x="1006004" y="2707833"/>
+            <a:ext cx="13811965" cy="1402948"/>
+          </a:xfrm>
+          <a:prstGeom prst="rect">
+            <a:avLst/>
+          </a:prstGeom>
+        </p:spPr>
+        <p:style>
+          <a:lnRef idx="0">
+            <a:scrgbClr r="0" g="0" b="0"/>
+          </a:lnRef>
+          <a:fillRef idx="0">
+            <a:scrgbClr r="0" g="0" b="0"/>
+          </a:fillRef>
+          <a:effectRef idx="0">
+            <a:scrgbClr r="0" g="0" b="0"/>
+          </a:effectRef>
+          <a:fontRef idx="none"/>
+        </p:style>
+        <p:txBody>
+          <a:bodyPr rot="0" spcFirstLastPara="1" vertOverflow="overflow" horzOverflow="overflow" vert="horz" wrap="square" lIns="50800" tIns="50800" rIns="50800" bIns="50800" numCol="1" spcCol="38100" rtlCol="0" anchor="ctr">
+            <a:spAutoFit/>
+          </a:bodyPr>
+          <a:lstStyle/>
+          <a:p>
+            <a:pPr marL="0" marR="0" indent="0" algn="l" defTabSz="821531" rtl="0" fontAlgn="auto" latinLnBrk="0" hangingPunct="0">
+              <a:lnSpc>
+                <a:spcPct val="120000"/>
+              </a:lnSpc>
+              <a:spcBef>
+                <a:spcPts val="1500"/>
+              </a:spcBef>
+              <a:spcAft>
+                <a:spcPts val="0"/>
+              </a:spcAft>
+              <a:buClrTx/>
+              <a:buSzTx/>
+              <a:buFontTx/>
+              <a:buNone/>
+              <a:tabLst/>
+            </a:pPr>
+            <a:r>
+              <a:rPr lang="en-US" sz="6000" dirty="0">
+                <a:solidFill>
+                  <a:schemeClr val="bg2"/>
+                </a:solidFill>
+              </a:rPr>
+              <a:t>Implementation</a:t>
+            </a:r>
+          </a:p>
+        </p:txBody>
+      </p:sp>
+      <p:sp>
+        <p:nvSpPr>
+          <p:cNvPr id="4" name="TextBox 3">
+            <a:extLst>
+              <a:ext uri="{FF2B5EF4-FFF2-40B4-BE49-F238E27FC236}">
+                <a16:creationId xmlns:a16="http://schemas.microsoft.com/office/drawing/2014/main" id="{5C7F35E6-AB7E-931E-6AC9-32962D1F5DCA}"/>
+              </a:ext>
+            </a:extLst>
+          </p:cNvPr>
+          <p:cNvSpPr txBox="1"/>
+          <p:nvPr/>
+        </p:nvSpPr>
+        <p:spPr>
+          <a:xfrm>
+            <a:off x="1006004" y="4971883"/>
+            <a:ext cx="19927572" cy="885884"/>
+          </a:xfrm>
+          <a:prstGeom prst="rect">
+            <a:avLst/>
+          </a:prstGeom>
+        </p:spPr>
+        <p:style>
+          <a:lnRef idx="0">
+            <a:scrgbClr r="0" g="0" b="0"/>
+          </a:lnRef>
+          <a:fillRef idx="0">
+            <a:scrgbClr r="0" g="0" b="0"/>
+          </a:fillRef>
+          <a:effectRef idx="0">
+            <a:scrgbClr r="0" g="0" b="0"/>
+          </a:effectRef>
+          <a:fontRef idx="none"/>
+        </p:style>
+        <p:txBody>
+          <a:bodyPr rot="0" spcFirstLastPara="1" vertOverflow="overflow" horzOverflow="overflow" vert="horz" wrap="square" lIns="50800" tIns="50800" rIns="50800" bIns="50800" numCol="1" spcCol="38100" rtlCol="0" anchor="ctr">
+            <a:spAutoFit/>
+          </a:bodyPr>
+          <a:lstStyle/>
+          <a:p>
+            <a:pPr marL="457200" marR="0" indent="-457200" algn="l" defTabSz="821531" rtl="0" fontAlgn="auto" latinLnBrk="0" hangingPunct="0">
+              <a:lnSpc>
+                <a:spcPct val="120000"/>
+              </a:lnSpc>
+              <a:spcBef>
+                <a:spcPts val="1500"/>
+              </a:spcBef>
+              <a:spcAft>
+                <a:spcPts val="0"/>
+              </a:spcAft>
+              <a:buClrTx/>
+              <a:buSzTx/>
+              <a:buFont typeface="Arial" panose="020B0604020202020204" pitchFamily="34" charset="0"/>
+              <a:buChar char="•"/>
+              <a:tabLst/>
+            </a:pPr>
+            <a:r>
+              <a:rPr kumimoji="0" lang="en-US" sz="3200" b="0" i="0" u="none" strike="noStrike" cap="none" spc="0" normalizeH="0" baseline="0" dirty="0">
+                <a:ln>
+                  <a:noFill/>
+                </a:ln>
+                <a:solidFill>
+                  <a:schemeClr val="bg2"/>
+                </a:solidFill>
+                <a:effectLst/>
+                <a:uFillTx/>
+                <a:latin typeface="+mn-lt"/>
+                <a:ea typeface="+mn-ea"/>
+                <a:cs typeface="+mn-cs"/>
+                <a:sym typeface="Poppins Regular"/>
+              </a:rPr>
+              <a:t>https://github.com/Iamsdl/Endava-DesignPatterns/tree/main/Prototype</a:t>
+            </a:r>
           </a:p>
         </p:txBody>
       </p:sp>
     </p:spTree>
     <p:extLst>
       <p:ext uri="{BB962C8B-B14F-4D97-AF65-F5344CB8AC3E}">
-        <p14:creationId xmlns:p14="http://schemas.microsoft.com/office/powerpoint/2010/main" val="2601877011"/>
+        <p14:creationId xmlns:p14="http://schemas.microsoft.com/office/powerpoint/2010/main" val="1457509898"/>
       </p:ext>
     </p:extLst>
   </p:cSld>

</xml_diff>

<commit_message>
Code adjustments and PPT
</commit_message>
<xml_diff>
--- a/PPT/Back to the basics, explaining design patterns with real life examples - Bridge & Prototype.pptx
+++ b/PPT/Back to the basics, explaining design patterns with real life examples - Bridge & Prototype.pptx
@@ -7,26 +7,31 @@
     <p:sldMasterId id="2147483698" r:id="rId3"/>
   </p:sldMasterIdLst>
   <p:notesMasterIdLst>
-    <p:notesMasterId r:id="rId21"/>
+    <p:notesMasterId r:id="rId26"/>
   </p:notesMasterIdLst>
   <p:sldIdLst>
     <p:sldId id="266" r:id="rId4"/>
     <p:sldId id="267" r:id="rId5"/>
-    <p:sldId id="269" r:id="rId6"/>
-    <p:sldId id="270" r:id="rId7"/>
-    <p:sldId id="271" r:id="rId8"/>
-    <p:sldId id="272" r:id="rId9"/>
-    <p:sldId id="273" r:id="rId10"/>
-    <p:sldId id="274" r:id="rId11"/>
-    <p:sldId id="275" r:id="rId12"/>
-    <p:sldId id="276" r:id="rId13"/>
-    <p:sldId id="281" r:id="rId14"/>
-    <p:sldId id="277" r:id="rId15"/>
-    <p:sldId id="283" r:id="rId16"/>
-    <p:sldId id="284" r:id="rId17"/>
-    <p:sldId id="278" r:id="rId18"/>
-    <p:sldId id="279" r:id="rId19"/>
-    <p:sldId id="285" r:id="rId20"/>
+    <p:sldId id="287" r:id="rId6"/>
+    <p:sldId id="286" r:id="rId7"/>
+    <p:sldId id="269" r:id="rId8"/>
+    <p:sldId id="270" r:id="rId9"/>
+    <p:sldId id="271" r:id="rId10"/>
+    <p:sldId id="272" r:id="rId11"/>
+    <p:sldId id="273" r:id="rId12"/>
+    <p:sldId id="274" r:id="rId13"/>
+    <p:sldId id="275" r:id="rId14"/>
+    <p:sldId id="276" r:id="rId15"/>
+    <p:sldId id="281" r:id="rId16"/>
+    <p:sldId id="277" r:id="rId17"/>
+    <p:sldId id="283" r:id="rId18"/>
+    <p:sldId id="284" r:id="rId19"/>
+    <p:sldId id="278" r:id="rId20"/>
+    <p:sldId id="279" r:id="rId21"/>
+    <p:sldId id="285" r:id="rId22"/>
+    <p:sldId id="288" r:id="rId23"/>
+    <p:sldId id="289" r:id="rId24"/>
+    <p:sldId id="290" r:id="rId25"/>
   </p:sldIdLst>
   <p:sldSz cx="24384000" cy="13716000"/>
   <p:notesSz cx="6858000" cy="9144000"/>
@@ -136,7 +141,7 @@
 <file path=ppt/revisionInfo.xml><?xml version="1.0" encoding="utf-8"?>
 <p1510:revInfo xmlns:a="http://schemas.openxmlformats.org/drawingml/2006/main" xmlns:r="http://schemas.openxmlformats.org/officeDocument/2006/relationships" xmlns:p1510="http://schemas.microsoft.com/office/powerpoint/2015/10/main">
   <p1510:revLst>
-    <p1510:client id="{D80A0EBD-EE11-445B-8AB6-F630743B4943}" v="126" dt="2025-06-23T12:56:43.312"/>
+    <p1510:client id="{D80A0EBD-EE11-445B-8AB6-F630743B4943}" v="150" dt="2025-06-24T20:31:21.899"/>
   </p1510:revLst>
 </p1510:revInfo>
 </file>
@@ -146,7 +151,7 @@
   <pc:docChgLst>
     <pc:chgData name="Daniel Laurentiu Schmidt" userId="9ab8f5a0-558d-473f-8210-f04e6f74bedf" providerId="ADAL" clId="{D80A0EBD-EE11-445B-8AB6-F630743B4943}"/>
     <pc:docChg chg="undo redo custSel addSld delSld modSld sldOrd delMainMaster">
-      <pc:chgData name="Daniel Laurentiu Schmidt" userId="9ab8f5a0-558d-473f-8210-f04e6f74bedf" providerId="ADAL" clId="{D80A0EBD-EE11-445B-8AB6-F630743B4943}" dt="2025-06-23T12:58:01.786" v="1906" actId="20577"/>
+      <pc:chgData name="Daniel Laurentiu Schmidt" userId="9ab8f5a0-558d-473f-8210-f04e6f74bedf" providerId="ADAL" clId="{D80A0EBD-EE11-445B-8AB6-F630743B4943}" dt="2025-06-24T20:43:19.765" v="2316" actId="20577"/>
       <pc:docMkLst>
         <pc:docMk/>
       </pc:docMkLst>
@@ -223,13 +228,13 @@
         </pc:sldMkLst>
       </pc:sldChg>
       <pc:sldChg chg="addSp delSp modSp new mod modClrScheme chgLayout">
-        <pc:chgData name="Daniel Laurentiu Schmidt" userId="9ab8f5a0-558d-473f-8210-f04e6f74bedf" providerId="ADAL" clId="{D80A0EBD-EE11-445B-8AB6-F630743B4943}" dt="2025-06-15T16:04:51.379" v="275" actId="1076"/>
+        <pc:chgData name="Daniel Laurentiu Schmidt" userId="9ab8f5a0-558d-473f-8210-f04e6f74bedf" providerId="ADAL" clId="{D80A0EBD-EE11-445B-8AB6-F630743B4943}" dt="2025-06-24T20:34:04.577" v="2208" actId="1076"/>
         <pc:sldMkLst>
           <pc:docMk/>
           <pc:sldMk cId="2370860523" sldId="267"/>
         </pc:sldMkLst>
         <pc:spChg chg="add mod">
-          <ac:chgData name="Daniel Laurentiu Schmidt" userId="9ab8f5a0-558d-473f-8210-f04e6f74bedf" providerId="ADAL" clId="{D80A0EBD-EE11-445B-8AB6-F630743B4943}" dt="2025-06-15T16:04:11.805" v="272" actId="14100"/>
+          <ac:chgData name="Daniel Laurentiu Schmidt" userId="9ab8f5a0-558d-473f-8210-f04e6f74bedf" providerId="ADAL" clId="{D80A0EBD-EE11-445B-8AB6-F630743B4943}" dt="2025-06-24T20:18:03.416" v="2026" actId="1076"/>
           <ac:spMkLst>
             <pc:docMk/>
             <pc:sldMk cId="2370860523" sldId="267"/>
@@ -237,21 +242,61 @@
           </ac:spMkLst>
         </pc:spChg>
         <pc:spChg chg="add mod">
-          <ac:chgData name="Daniel Laurentiu Schmidt" userId="9ab8f5a0-558d-473f-8210-f04e6f74bedf" providerId="ADAL" clId="{D80A0EBD-EE11-445B-8AB6-F630743B4943}" dt="2025-06-15T16:04:51.379" v="275" actId="1076"/>
+          <ac:chgData name="Daniel Laurentiu Schmidt" userId="9ab8f5a0-558d-473f-8210-f04e6f74bedf" providerId="ADAL" clId="{D80A0EBD-EE11-445B-8AB6-F630743B4943}" dt="2025-06-24T20:11:17.997" v="1937" actId="120"/>
           <ac:spMkLst>
             <pc:docMk/>
             <pc:sldMk cId="2370860523" sldId="267"/>
             <ac:spMk id="4" creationId="{D8ECD6E7-0E54-BCF2-09CA-FCA7772CA821}"/>
           </ac:spMkLst>
         </pc:spChg>
-        <pc:spChg chg="add mod">
-          <ac:chgData name="Daniel Laurentiu Schmidt" userId="9ab8f5a0-558d-473f-8210-f04e6f74bedf" providerId="ADAL" clId="{D80A0EBD-EE11-445B-8AB6-F630743B4943}" dt="2025-06-15T16:04:17.825" v="273" actId="1076"/>
+        <pc:spChg chg="add mod ord">
+          <ac:chgData name="Daniel Laurentiu Schmidt" userId="9ab8f5a0-558d-473f-8210-f04e6f74bedf" providerId="ADAL" clId="{D80A0EBD-EE11-445B-8AB6-F630743B4943}" dt="2025-06-24T20:34:04.577" v="2208" actId="1076"/>
           <ac:spMkLst>
             <pc:docMk/>
             <pc:sldMk cId="2370860523" sldId="267"/>
             <ac:spMk id="6" creationId="{2859F236-A75B-5943-251C-16B07557E927}"/>
           </ac:spMkLst>
         </pc:spChg>
+        <pc:spChg chg="add del mod ord">
+          <ac:chgData name="Daniel Laurentiu Schmidt" userId="9ab8f5a0-558d-473f-8210-f04e6f74bedf" providerId="ADAL" clId="{D80A0EBD-EE11-445B-8AB6-F630743B4943}" dt="2025-06-24T20:33:38.683" v="2202" actId="700"/>
+          <ac:spMkLst>
+            <pc:docMk/>
+            <pc:sldMk cId="2370860523" sldId="267"/>
+            <ac:spMk id="7" creationId="{F39B5B02-15E2-CFD1-DA02-CDF3DD0D865D}"/>
+          </ac:spMkLst>
+        </pc:spChg>
+        <pc:spChg chg="add del mod ord">
+          <ac:chgData name="Daniel Laurentiu Schmidt" userId="9ab8f5a0-558d-473f-8210-f04e6f74bedf" providerId="ADAL" clId="{D80A0EBD-EE11-445B-8AB6-F630743B4943}" dt="2025-06-24T20:33:47.772" v="2204" actId="700"/>
+          <ac:spMkLst>
+            <pc:docMk/>
+            <pc:sldMk cId="2370860523" sldId="267"/>
+            <ac:spMk id="8" creationId="{EE6690AC-D9BC-58C5-A9E9-AB4C11A2C2E2}"/>
+          </ac:spMkLst>
+        </pc:spChg>
+        <pc:spChg chg="add del mod ord">
+          <ac:chgData name="Daniel Laurentiu Schmidt" userId="9ab8f5a0-558d-473f-8210-f04e6f74bedf" providerId="ADAL" clId="{D80A0EBD-EE11-445B-8AB6-F630743B4943}" dt="2025-06-24T20:33:47.772" v="2204" actId="700"/>
+          <ac:spMkLst>
+            <pc:docMk/>
+            <pc:sldMk cId="2370860523" sldId="267"/>
+            <ac:spMk id="9" creationId="{F012D1BE-2430-C0D4-414D-3B5867F3C208}"/>
+          </ac:spMkLst>
+        </pc:spChg>
+        <pc:picChg chg="add mod">
+          <ac:chgData name="Daniel Laurentiu Schmidt" userId="9ab8f5a0-558d-473f-8210-f04e6f74bedf" providerId="ADAL" clId="{D80A0EBD-EE11-445B-8AB6-F630743B4943}" dt="2025-06-24T20:18:08.009" v="2027" actId="1076"/>
+          <ac:picMkLst>
+            <pc:docMk/>
+            <pc:sldMk cId="2370860523" sldId="267"/>
+            <ac:picMk id="5" creationId="{E00D265B-D4B2-46FD-4198-84F6C2604817}"/>
+          </ac:picMkLst>
+        </pc:picChg>
+        <pc:picChg chg="add del mod">
+          <ac:chgData name="Daniel Laurentiu Schmidt" userId="9ab8f5a0-558d-473f-8210-f04e6f74bedf" providerId="ADAL" clId="{D80A0EBD-EE11-445B-8AB6-F630743B4943}" dt="2025-06-24T20:13:03.814" v="1970" actId="478"/>
+          <ac:picMkLst>
+            <pc:docMk/>
+            <pc:sldMk cId="2370860523" sldId="267"/>
+            <ac:picMk id="1026" creationId="{8CFB9353-404C-06EE-4F1B-2D8F6DB52900}"/>
+          </ac:picMkLst>
+        </pc:picChg>
       </pc:sldChg>
       <pc:sldChg chg="add del">
         <pc:chgData name="Daniel Laurentiu Schmidt" userId="9ab8f5a0-558d-473f-8210-f04e6f74bedf" providerId="ADAL" clId="{D80A0EBD-EE11-445B-8AB6-F630743B4943}" dt="2025-06-15T11:49:14.376" v="71" actId="2696"/>
@@ -267,8 +312,8 @@
           <pc:sldMk cId="3772312407" sldId="268"/>
         </pc:sldMkLst>
       </pc:sldChg>
-      <pc:sldChg chg="modSp add mod">
-        <pc:chgData name="Daniel Laurentiu Schmidt" userId="9ab8f5a0-558d-473f-8210-f04e6f74bedf" providerId="ADAL" clId="{D80A0EBD-EE11-445B-8AB6-F630743B4943}" dt="2025-06-15T16:08:06.274" v="320" actId="1076"/>
+      <pc:sldChg chg="modSp add mod modClrScheme chgLayout">
+        <pc:chgData name="Daniel Laurentiu Schmidt" userId="9ab8f5a0-558d-473f-8210-f04e6f74bedf" providerId="ADAL" clId="{D80A0EBD-EE11-445B-8AB6-F630743B4943}" dt="2025-06-24T20:37:59.129" v="2240" actId="1076"/>
         <pc:sldMkLst>
           <pc:docMk/>
           <pc:sldMk cId="280009781" sldId="269"/>
@@ -289,9 +334,17 @@
             <ac:spMk id="4" creationId="{15DDD5E3-ACCD-1D5C-2748-F57C24350788}"/>
           </ac:spMkLst>
         </pc:spChg>
+        <pc:spChg chg="mod ord">
+          <ac:chgData name="Daniel Laurentiu Schmidt" userId="9ab8f5a0-558d-473f-8210-f04e6f74bedf" providerId="ADAL" clId="{D80A0EBD-EE11-445B-8AB6-F630743B4943}" dt="2025-06-24T20:37:59.129" v="2240" actId="1076"/>
+          <ac:spMkLst>
+            <pc:docMk/>
+            <pc:sldMk cId="280009781" sldId="269"/>
+            <ac:spMk id="6" creationId="{D630E883-C319-3767-4DFA-1725EC299DC9}"/>
+          </ac:spMkLst>
+        </pc:spChg>
       </pc:sldChg>
-      <pc:sldChg chg="addSp delSp modSp add mod">
-        <pc:chgData name="Daniel Laurentiu Schmidt" userId="9ab8f5a0-558d-473f-8210-f04e6f74bedf" providerId="ADAL" clId="{D80A0EBD-EE11-445B-8AB6-F630743B4943}" dt="2025-06-15T19:56:24.719" v="626"/>
+      <pc:sldChg chg="addSp delSp modSp add mod modClrScheme chgLayout">
+        <pc:chgData name="Daniel Laurentiu Schmidt" userId="9ab8f5a0-558d-473f-8210-f04e6f74bedf" providerId="ADAL" clId="{D80A0EBD-EE11-445B-8AB6-F630743B4943}" dt="2025-06-24T20:37:54.401" v="2239" actId="1076"/>
         <pc:sldMkLst>
           <pc:docMk/>
           <pc:sldMk cId="3445509486" sldId="270"/>
@@ -310,6 +363,14 @@
             <pc:docMk/>
             <pc:sldMk cId="3445509486" sldId="270"/>
             <ac:spMk id="4" creationId="{A1AE92E2-EFC2-411F-FCBB-B8E2A7165C61}"/>
+          </ac:spMkLst>
+        </pc:spChg>
+        <pc:spChg chg="mod ord">
+          <ac:chgData name="Daniel Laurentiu Schmidt" userId="9ab8f5a0-558d-473f-8210-f04e6f74bedf" providerId="ADAL" clId="{D80A0EBD-EE11-445B-8AB6-F630743B4943}" dt="2025-06-24T20:37:54.401" v="2239" actId="1076"/>
+          <ac:spMkLst>
+            <pc:docMk/>
+            <pc:sldMk cId="3445509486" sldId="270"/>
+            <ac:spMk id="6" creationId="{827A3596-B749-34C7-5866-8F0936E6197D}"/>
           </ac:spMkLst>
         </pc:spChg>
         <pc:picChg chg="add mod">
@@ -337,8 +398,8 @@
           </ac:picMkLst>
         </pc:picChg>
       </pc:sldChg>
-      <pc:sldChg chg="addSp modSp add mod">
-        <pc:chgData name="Daniel Laurentiu Schmidt" userId="9ab8f5a0-558d-473f-8210-f04e6f74bedf" providerId="ADAL" clId="{D80A0EBD-EE11-445B-8AB6-F630743B4943}" dt="2025-06-15T19:56:41.148" v="628" actId="1076"/>
+      <pc:sldChg chg="addSp modSp add mod modClrScheme chgLayout">
+        <pc:chgData name="Daniel Laurentiu Schmidt" userId="9ab8f5a0-558d-473f-8210-f04e6f74bedf" providerId="ADAL" clId="{D80A0EBD-EE11-445B-8AB6-F630743B4943}" dt="2025-06-24T20:37:41.462" v="2237" actId="1076"/>
         <pc:sldMkLst>
           <pc:docMk/>
           <pc:sldMk cId="2710007919" sldId="271"/>
@@ -352,11 +413,19 @@
           </ac:spMkLst>
         </pc:spChg>
         <pc:spChg chg="mod">
-          <ac:chgData name="Daniel Laurentiu Schmidt" userId="9ab8f5a0-558d-473f-8210-f04e6f74bedf" providerId="ADAL" clId="{D80A0EBD-EE11-445B-8AB6-F630743B4943}" dt="2025-06-15T16:11:05.915" v="359" actId="1076"/>
+          <ac:chgData name="Daniel Laurentiu Schmidt" userId="9ab8f5a0-558d-473f-8210-f04e6f74bedf" providerId="ADAL" clId="{D80A0EBD-EE11-445B-8AB6-F630743B4943}" dt="2025-06-24T20:36:29.940" v="2230" actId="20577"/>
           <ac:spMkLst>
             <pc:docMk/>
             <pc:sldMk cId="2710007919" sldId="271"/>
             <ac:spMk id="4" creationId="{1FE94DAC-5937-57D4-FB1B-677312132390}"/>
+          </ac:spMkLst>
+        </pc:spChg>
+        <pc:spChg chg="mod ord">
+          <ac:chgData name="Daniel Laurentiu Schmidt" userId="9ab8f5a0-558d-473f-8210-f04e6f74bedf" providerId="ADAL" clId="{D80A0EBD-EE11-445B-8AB6-F630743B4943}" dt="2025-06-24T20:37:41.462" v="2237" actId="1076"/>
+          <ac:spMkLst>
+            <pc:docMk/>
+            <pc:sldMk cId="2710007919" sldId="271"/>
+            <ac:spMk id="6" creationId="{ABBCA33E-784D-979D-CCF7-8CFFBE13AD90}"/>
           </ac:spMkLst>
         </pc:spChg>
         <pc:picChg chg="add mod">
@@ -368,8 +437,8 @@
           </ac:picMkLst>
         </pc:picChg>
       </pc:sldChg>
-      <pc:sldChg chg="modSp add mod">
-        <pc:chgData name="Daniel Laurentiu Schmidt" userId="9ab8f5a0-558d-473f-8210-f04e6f74bedf" providerId="ADAL" clId="{D80A0EBD-EE11-445B-8AB6-F630743B4943}" dt="2025-06-15T16:12:08.225" v="365" actId="20577"/>
+      <pc:sldChg chg="modSp add mod modClrScheme chgLayout">
+        <pc:chgData name="Daniel Laurentiu Schmidt" userId="9ab8f5a0-558d-473f-8210-f04e6f74bedf" providerId="ADAL" clId="{D80A0EBD-EE11-445B-8AB6-F630743B4943}" dt="2025-06-24T20:37:34.886" v="2236" actId="14100"/>
         <pc:sldMkLst>
           <pc:docMk/>
           <pc:sldMk cId="1716428159" sldId="272"/>
@@ -390,9 +459,17 @@
             <ac:spMk id="4" creationId="{8A7ECE28-2F05-7A42-875B-230E4F852BF2}"/>
           </ac:spMkLst>
         </pc:spChg>
+        <pc:spChg chg="mod ord">
+          <ac:chgData name="Daniel Laurentiu Schmidt" userId="9ab8f5a0-558d-473f-8210-f04e6f74bedf" providerId="ADAL" clId="{D80A0EBD-EE11-445B-8AB6-F630743B4943}" dt="2025-06-24T20:37:34.886" v="2236" actId="14100"/>
+          <ac:spMkLst>
+            <pc:docMk/>
+            <pc:sldMk cId="1716428159" sldId="272"/>
+            <ac:spMk id="6" creationId="{0DA6F348-D4E4-CA75-23C9-30A6D0950395}"/>
+          </ac:spMkLst>
+        </pc:spChg>
       </pc:sldChg>
-      <pc:sldChg chg="addSp delSp modSp add mod">
-        <pc:chgData name="Daniel Laurentiu Schmidt" userId="9ab8f5a0-558d-473f-8210-f04e6f74bedf" providerId="ADAL" clId="{D80A0EBD-EE11-445B-8AB6-F630743B4943}" dt="2025-06-15T16:49:03.059" v="520" actId="1076"/>
+      <pc:sldChg chg="addSp delSp modSp add mod modClrScheme chgLayout">
+        <pc:chgData name="Daniel Laurentiu Schmidt" userId="9ab8f5a0-558d-473f-8210-f04e6f74bedf" providerId="ADAL" clId="{D80A0EBD-EE11-445B-8AB6-F630743B4943}" dt="2025-06-24T20:38:17.546" v="2245" actId="14100"/>
         <pc:sldMkLst>
           <pc:docMk/>
           <pc:sldMk cId="1656584900" sldId="273"/>
@@ -414,15 +491,15 @@
           </ac:spMkLst>
         </pc:spChg>
         <pc:spChg chg="add mod">
-          <ac:chgData name="Daniel Laurentiu Schmidt" userId="9ab8f5a0-558d-473f-8210-f04e6f74bedf" providerId="ADAL" clId="{D80A0EBD-EE11-445B-8AB6-F630743B4943}" dt="2025-06-15T16:49:03.059" v="520" actId="1076"/>
+          <ac:chgData name="Daniel Laurentiu Schmidt" userId="9ab8f5a0-558d-473f-8210-f04e6f74bedf" providerId="ADAL" clId="{D80A0EBD-EE11-445B-8AB6-F630743B4943}" dt="2025-06-24T20:38:09.157" v="2243" actId="1076"/>
           <ac:spMkLst>
             <pc:docMk/>
             <pc:sldMk cId="1656584900" sldId="273"/>
             <ac:spMk id="5" creationId="{9B596C4E-3C62-3307-6DBD-0D2B112586A0}"/>
           </ac:spMkLst>
         </pc:spChg>
-        <pc:spChg chg="mod">
-          <ac:chgData name="Daniel Laurentiu Schmidt" userId="9ab8f5a0-558d-473f-8210-f04e6f74bedf" providerId="ADAL" clId="{D80A0EBD-EE11-445B-8AB6-F630743B4943}" dt="2025-06-15T16:12:34.925" v="372" actId="20577"/>
+        <pc:spChg chg="mod ord">
+          <ac:chgData name="Daniel Laurentiu Schmidt" userId="9ab8f5a0-558d-473f-8210-f04e6f74bedf" providerId="ADAL" clId="{D80A0EBD-EE11-445B-8AB6-F630743B4943}" dt="2025-06-24T20:38:17.546" v="2245" actId="14100"/>
           <ac:spMkLst>
             <pc:docMk/>
             <pc:sldMk cId="1656584900" sldId="273"/>
@@ -438,8 +515,8 @@
           </ac:spMkLst>
         </pc:spChg>
       </pc:sldChg>
-      <pc:sldChg chg="addSp delSp modSp add mod">
-        <pc:chgData name="Daniel Laurentiu Schmidt" userId="9ab8f5a0-558d-473f-8210-f04e6f74bedf" providerId="ADAL" clId="{D80A0EBD-EE11-445B-8AB6-F630743B4943}" dt="2025-06-16T18:43:10.342" v="839" actId="20577"/>
+      <pc:sldChg chg="addSp delSp modSp add mod modClrScheme chgLayout">
+        <pc:chgData name="Daniel Laurentiu Schmidt" userId="9ab8f5a0-558d-473f-8210-f04e6f74bedf" providerId="ADAL" clId="{D80A0EBD-EE11-445B-8AB6-F630743B4943}" dt="2025-06-24T20:39:04.346" v="2253" actId="1076"/>
         <pc:sldMkLst>
           <pc:docMk/>
           <pc:sldMk cId="3767381252" sldId="274"/>
@@ -460,9 +537,17 @@
             <ac:spMk id="3" creationId="{1626B9A1-5239-6F2E-FE25-89AA3967ED7B}"/>
           </ac:spMkLst>
         </pc:spChg>
+        <pc:spChg chg="mod ord">
+          <ac:chgData name="Daniel Laurentiu Schmidt" userId="9ab8f5a0-558d-473f-8210-f04e6f74bedf" providerId="ADAL" clId="{D80A0EBD-EE11-445B-8AB6-F630743B4943}" dt="2025-06-24T20:39:04.346" v="2253" actId="1076"/>
+          <ac:spMkLst>
+            <pc:docMk/>
+            <pc:sldMk cId="3767381252" sldId="274"/>
+            <ac:spMk id="6" creationId="{E015503E-6998-4268-C1F5-6AFA2187BC5F}"/>
+          </ac:spMkLst>
+        </pc:spChg>
       </pc:sldChg>
-      <pc:sldChg chg="addSp delSp modSp add mod">
-        <pc:chgData name="Daniel Laurentiu Schmidt" userId="9ab8f5a0-558d-473f-8210-f04e6f74bedf" providerId="ADAL" clId="{D80A0EBD-EE11-445B-8AB6-F630743B4943}" dt="2025-06-15T20:15:21.368" v="781" actId="1076"/>
+      <pc:sldChg chg="addSp delSp modSp add mod modClrScheme chgLayout">
+        <pc:chgData name="Daniel Laurentiu Schmidt" userId="9ab8f5a0-558d-473f-8210-f04e6f74bedf" providerId="ADAL" clId="{D80A0EBD-EE11-445B-8AB6-F630743B4943}" dt="2025-06-24T20:38:52.584" v="2252" actId="14100"/>
         <pc:sldMkLst>
           <pc:docMk/>
           <pc:sldMk cId="3640432184" sldId="275"/>
@@ -475,6 +560,14 @@
             <ac:spMk id="3" creationId="{708520F1-5CB1-3E72-1463-566343371991}"/>
           </ac:spMkLst>
         </pc:spChg>
+        <pc:spChg chg="mod ord">
+          <ac:chgData name="Daniel Laurentiu Schmidt" userId="9ab8f5a0-558d-473f-8210-f04e6f74bedf" providerId="ADAL" clId="{D80A0EBD-EE11-445B-8AB6-F630743B4943}" dt="2025-06-24T20:38:52.584" v="2252" actId="14100"/>
+          <ac:spMkLst>
+            <pc:docMk/>
+            <pc:sldMk cId="3640432184" sldId="275"/>
+            <ac:spMk id="6" creationId="{EA9FF163-2E35-9F16-6224-D4C5E670A89F}"/>
+          </ac:spMkLst>
+        </pc:spChg>
         <pc:picChg chg="add mod">
           <ac:chgData name="Daniel Laurentiu Schmidt" userId="9ab8f5a0-558d-473f-8210-f04e6f74bedf" providerId="ADAL" clId="{D80A0EBD-EE11-445B-8AB6-F630743B4943}" dt="2025-06-15T20:15:21.368" v="781" actId="1076"/>
           <ac:picMkLst>
@@ -484,8 +577,8 @@
           </ac:picMkLst>
         </pc:picChg>
       </pc:sldChg>
-      <pc:sldChg chg="addSp delSp modSp add mod">
-        <pc:chgData name="Daniel Laurentiu Schmidt" userId="9ab8f5a0-558d-473f-8210-f04e6f74bedf" providerId="ADAL" clId="{D80A0EBD-EE11-445B-8AB6-F630743B4943}" dt="2025-06-15T20:16:40.472" v="812" actId="1076"/>
+      <pc:sldChg chg="addSp delSp modSp add mod modClrScheme chgLayout">
+        <pc:chgData name="Daniel Laurentiu Schmidt" userId="9ab8f5a0-558d-473f-8210-f04e6f74bedf" providerId="ADAL" clId="{D80A0EBD-EE11-445B-8AB6-F630743B4943}" dt="2025-06-24T20:39:24.771" v="2257" actId="1076"/>
         <pc:sldMkLst>
           <pc:docMk/>
           <pc:sldMk cId="461529983" sldId="276"/>
@@ -506,6 +599,14 @@
             <ac:spMk id="4" creationId="{5E222A1E-4BEB-3F11-F1B8-12D2F2429707}"/>
           </ac:spMkLst>
         </pc:spChg>
+        <pc:spChg chg="mod ord">
+          <ac:chgData name="Daniel Laurentiu Schmidt" userId="9ab8f5a0-558d-473f-8210-f04e6f74bedf" providerId="ADAL" clId="{D80A0EBD-EE11-445B-8AB6-F630743B4943}" dt="2025-06-24T20:39:24.771" v="2257" actId="1076"/>
+          <ac:spMkLst>
+            <pc:docMk/>
+            <pc:sldMk cId="461529983" sldId="276"/>
+            <ac:spMk id="6" creationId="{E09151F1-770D-04B3-4CE8-069D1F678563}"/>
+          </ac:spMkLst>
+        </pc:spChg>
         <pc:picChg chg="add mod">
           <ac:chgData name="Daniel Laurentiu Schmidt" userId="9ab8f5a0-558d-473f-8210-f04e6f74bedf" providerId="ADAL" clId="{D80A0EBD-EE11-445B-8AB6-F630743B4943}" dt="2025-06-15T20:15:42.195" v="799" actId="1076"/>
           <ac:picMkLst>
@@ -515,8 +616,8 @@
           </ac:picMkLst>
         </pc:picChg>
       </pc:sldChg>
-      <pc:sldChg chg="addSp modSp add mod ord">
-        <pc:chgData name="Daniel Laurentiu Schmidt" userId="9ab8f5a0-558d-473f-8210-f04e6f74bedf" providerId="ADAL" clId="{D80A0EBD-EE11-445B-8AB6-F630743B4943}" dt="2025-06-16T18:55:29.035" v="865" actId="1076"/>
+      <pc:sldChg chg="addSp modSp add mod ord modClrScheme chgLayout">
+        <pc:chgData name="Daniel Laurentiu Schmidt" userId="9ab8f5a0-558d-473f-8210-f04e6f74bedf" providerId="ADAL" clId="{D80A0EBD-EE11-445B-8AB6-F630743B4943}" dt="2025-06-24T20:39:58.802" v="2263" actId="14100"/>
         <pc:sldMkLst>
           <pc:docMk/>
           <pc:sldMk cId="3184352506" sldId="277"/>
@@ -529,8 +630,8 @@
             <ac:spMk id="2" creationId="{D42E4777-6320-484D-35B8-4FC90A20ACE2}"/>
           </ac:spMkLst>
         </pc:spChg>
-        <pc:spChg chg="mod">
-          <ac:chgData name="Daniel Laurentiu Schmidt" userId="9ab8f5a0-558d-473f-8210-f04e6f74bedf" providerId="ADAL" clId="{D80A0EBD-EE11-445B-8AB6-F630743B4943}" dt="2025-06-16T18:37:46.956" v="828" actId="20577"/>
+        <pc:spChg chg="mod ord">
+          <ac:chgData name="Daniel Laurentiu Schmidt" userId="9ab8f5a0-558d-473f-8210-f04e6f74bedf" providerId="ADAL" clId="{D80A0EBD-EE11-445B-8AB6-F630743B4943}" dt="2025-06-24T20:39:58.802" v="2263" actId="14100"/>
           <ac:spMkLst>
             <pc:docMk/>
             <pc:sldMk cId="3184352506" sldId="277"/>
@@ -546,8 +647,8 @@
           </ac:spMkLst>
         </pc:spChg>
       </pc:sldChg>
-      <pc:sldChg chg="addSp delSp modSp add mod">
-        <pc:chgData name="Daniel Laurentiu Schmidt" userId="9ab8f5a0-558d-473f-8210-f04e6f74bedf" providerId="ADAL" clId="{D80A0EBD-EE11-445B-8AB6-F630743B4943}" dt="2025-06-23T12:58:01.786" v="1906" actId="20577"/>
+      <pc:sldChg chg="addSp delSp modSp add mod modClrScheme chgLayout">
+        <pc:chgData name="Daniel Laurentiu Schmidt" userId="9ab8f5a0-558d-473f-8210-f04e6f74bedf" providerId="ADAL" clId="{D80A0EBD-EE11-445B-8AB6-F630743B4943}" dt="2025-06-24T20:41:26.842" v="2279" actId="1035"/>
         <pc:sldMkLst>
           <pc:docMk/>
           <pc:sldMk cId="2893984340" sldId="278"/>
@@ -568,9 +669,17 @@
             <ac:spMk id="4" creationId="{7BD96063-02C3-5E2D-7C84-051C0ADE8839}"/>
           </ac:spMkLst>
         </pc:spChg>
+        <pc:spChg chg="mod ord">
+          <ac:chgData name="Daniel Laurentiu Schmidt" userId="9ab8f5a0-558d-473f-8210-f04e6f74bedf" providerId="ADAL" clId="{D80A0EBD-EE11-445B-8AB6-F630743B4943}" dt="2025-06-24T20:41:26.842" v="2279" actId="1035"/>
+          <ac:spMkLst>
+            <pc:docMk/>
+            <pc:sldMk cId="2893984340" sldId="278"/>
+            <ac:spMk id="6" creationId="{B2D48B61-D1ED-AAD8-AB8E-D7E1B8B9B52D}"/>
+          </ac:spMkLst>
+        </pc:spChg>
       </pc:sldChg>
-      <pc:sldChg chg="addSp delSp modSp add del mod">
-        <pc:chgData name="Daniel Laurentiu Schmidt" userId="9ab8f5a0-558d-473f-8210-f04e6f74bedf" providerId="ADAL" clId="{D80A0EBD-EE11-445B-8AB6-F630743B4943}" dt="2025-06-16T19:16:24.315" v="939" actId="20577"/>
+      <pc:sldChg chg="addSp delSp modSp add del mod modClrScheme chgLayout">
+        <pc:chgData name="Daniel Laurentiu Schmidt" userId="9ab8f5a0-558d-473f-8210-f04e6f74bedf" providerId="ADAL" clId="{D80A0EBD-EE11-445B-8AB6-F630743B4943}" dt="2025-06-24T20:41:54.076" v="2287" actId="1035"/>
         <pc:sldMkLst>
           <pc:docMk/>
           <pc:sldMk cId="1667982708" sldId="279"/>
@@ -591,6 +700,14 @@
             <ac:spMk id="4" creationId="{99A145CF-A727-429B-0396-E9FA4AB03608}"/>
           </ac:spMkLst>
         </pc:spChg>
+        <pc:spChg chg="mod ord">
+          <ac:chgData name="Daniel Laurentiu Schmidt" userId="9ab8f5a0-558d-473f-8210-f04e6f74bedf" providerId="ADAL" clId="{D80A0EBD-EE11-445B-8AB6-F630743B4943}" dt="2025-06-24T20:41:54.076" v="2287" actId="1035"/>
+          <ac:spMkLst>
+            <pc:docMk/>
+            <pc:sldMk cId="1667982708" sldId="279"/>
+            <ac:spMk id="6" creationId="{D2F0546C-AAFE-7E85-77F9-DC36665345F7}"/>
+          </ac:spMkLst>
+        </pc:spChg>
       </pc:sldChg>
       <pc:sldChg chg="addSp delSp modSp add del mod">
         <pc:chgData name="Daniel Laurentiu Schmidt" userId="9ab8f5a0-558d-473f-8210-f04e6f74bedf" providerId="ADAL" clId="{D80A0EBD-EE11-445B-8AB6-F630743B4943}" dt="2025-06-23T12:56:18.785" v="1845" actId="47"/>
@@ -598,17 +715,9 @@
           <pc:docMk/>
           <pc:sldMk cId="2601877011" sldId="280"/>
         </pc:sldMkLst>
-        <pc:spChg chg="add mod">
-          <ac:chgData name="Daniel Laurentiu Schmidt" userId="9ab8f5a0-558d-473f-8210-f04e6f74bedf" providerId="ADAL" clId="{D80A0EBD-EE11-445B-8AB6-F630743B4943}" dt="2025-06-16T19:19:50.029" v="941" actId="478"/>
-          <ac:spMkLst>
-            <pc:docMk/>
-            <pc:sldMk cId="2601877011" sldId="280"/>
-            <ac:spMk id="5" creationId="{36C170B6-A7B9-F491-43BB-A27B9BAA1F8E}"/>
-          </ac:spMkLst>
-        </pc:spChg>
       </pc:sldChg>
-      <pc:sldChg chg="delSp modSp add mod">
-        <pc:chgData name="Daniel Laurentiu Schmidt" userId="9ab8f5a0-558d-473f-8210-f04e6f74bedf" providerId="ADAL" clId="{D80A0EBD-EE11-445B-8AB6-F630743B4943}" dt="2025-06-23T08:01:01.756" v="971"/>
+      <pc:sldChg chg="delSp modSp add mod modClrScheme chgLayout">
+        <pc:chgData name="Daniel Laurentiu Schmidt" userId="9ab8f5a0-558d-473f-8210-f04e6f74bedf" providerId="ADAL" clId="{D80A0EBD-EE11-445B-8AB6-F630743B4943}" dt="2025-06-24T20:39:41.127" v="2260" actId="14100"/>
         <pc:sldMkLst>
           <pc:docMk/>
           <pc:sldMk cId="3803058074" sldId="281"/>
@@ -622,11 +731,19 @@
           </ac:spMkLst>
         </pc:spChg>
         <pc:spChg chg="mod">
-          <ac:chgData name="Daniel Laurentiu Schmidt" userId="9ab8f5a0-558d-473f-8210-f04e6f74bedf" providerId="ADAL" clId="{D80A0EBD-EE11-445B-8AB6-F630743B4943}" dt="2025-06-23T08:01:01.756" v="971"/>
+          <ac:chgData name="Daniel Laurentiu Schmidt" userId="9ab8f5a0-558d-473f-8210-f04e6f74bedf" providerId="ADAL" clId="{D80A0EBD-EE11-445B-8AB6-F630743B4943}" dt="2025-06-24T20:31:34.015" v="2177" actId="403"/>
           <ac:spMkLst>
             <pc:docMk/>
             <pc:sldMk cId="3803058074" sldId="281"/>
             <ac:spMk id="4" creationId="{21793812-83EB-98F9-C1AA-5DDDF9E51F50}"/>
+          </ac:spMkLst>
+        </pc:spChg>
+        <pc:spChg chg="mod ord">
+          <ac:chgData name="Daniel Laurentiu Schmidt" userId="9ab8f5a0-558d-473f-8210-f04e6f74bedf" providerId="ADAL" clId="{D80A0EBD-EE11-445B-8AB6-F630743B4943}" dt="2025-06-24T20:39:41.127" v="2260" actId="14100"/>
+          <ac:spMkLst>
+            <pc:docMk/>
+            <pc:sldMk cId="3803058074" sldId="281"/>
+            <ac:spMk id="6" creationId="{4AED4F56-7195-E0D7-D522-4BB262165ED5}"/>
           </ac:spMkLst>
         </pc:spChg>
         <pc:picChg chg="del">
@@ -645,8 +762,8 @@
           <pc:sldMk cId="692081194" sldId="282"/>
         </pc:sldMkLst>
       </pc:sldChg>
-      <pc:sldChg chg="modSp add mod ord">
-        <pc:chgData name="Daniel Laurentiu Schmidt" userId="9ab8f5a0-558d-473f-8210-f04e6f74bedf" providerId="ADAL" clId="{D80A0EBD-EE11-445B-8AB6-F630743B4943}" dt="2025-06-23T12:55:59.031" v="1832" actId="20577"/>
+      <pc:sldChg chg="modSp add mod ord modClrScheme chgLayout">
+        <pc:chgData name="Daniel Laurentiu Schmidt" userId="9ab8f5a0-558d-473f-8210-f04e6f74bedf" providerId="ADAL" clId="{D80A0EBD-EE11-445B-8AB6-F630743B4943}" dt="2025-06-24T20:40:17.293" v="2266" actId="14100"/>
         <pc:sldMkLst>
           <pc:docMk/>
           <pc:sldMk cId="1510368498" sldId="283"/>
@@ -659,8 +776,8 @@
             <ac:spMk id="2" creationId="{66FDA351-0C36-CE1B-05BB-EE80B892548C}"/>
           </ac:spMkLst>
         </pc:spChg>
-        <pc:spChg chg="mod">
-          <ac:chgData name="Daniel Laurentiu Schmidt" userId="9ab8f5a0-558d-473f-8210-f04e6f74bedf" providerId="ADAL" clId="{D80A0EBD-EE11-445B-8AB6-F630743B4943}" dt="2025-06-23T12:55:59.031" v="1832" actId="20577"/>
+        <pc:spChg chg="mod ord">
+          <ac:chgData name="Daniel Laurentiu Schmidt" userId="9ab8f5a0-558d-473f-8210-f04e6f74bedf" providerId="ADAL" clId="{D80A0EBD-EE11-445B-8AB6-F630743B4943}" dt="2025-06-24T20:40:17.293" v="2266" actId="14100"/>
           <ac:spMkLst>
             <pc:docMk/>
             <pc:sldMk cId="1510368498" sldId="283"/>
@@ -668,8 +785,8 @@
           </ac:spMkLst>
         </pc:spChg>
       </pc:sldChg>
-      <pc:sldChg chg="addSp delSp modSp add mod">
-        <pc:chgData name="Daniel Laurentiu Schmidt" userId="9ab8f5a0-558d-473f-8210-f04e6f74bedf" providerId="ADAL" clId="{D80A0EBD-EE11-445B-8AB6-F630743B4943}" dt="2025-06-23T12:56:03.247" v="1841" actId="20577"/>
+      <pc:sldChg chg="addSp delSp modSp add mod modClrScheme chgLayout">
+        <pc:chgData name="Daniel Laurentiu Schmidt" userId="9ab8f5a0-558d-473f-8210-f04e6f74bedf" providerId="ADAL" clId="{D80A0EBD-EE11-445B-8AB6-F630743B4943}" dt="2025-06-24T20:40:43.809" v="2270" actId="1076"/>
         <pc:sldMkLst>
           <pc:docMk/>
           <pc:sldMk cId="4086353399" sldId="284"/>
@@ -682,8 +799,8 @@
             <ac:spMk id="2" creationId="{350CC40F-0C9D-43B6-F8B0-537691A7D4CC}"/>
           </ac:spMkLst>
         </pc:spChg>
-        <pc:spChg chg="mod">
-          <ac:chgData name="Daniel Laurentiu Schmidt" userId="9ab8f5a0-558d-473f-8210-f04e6f74bedf" providerId="ADAL" clId="{D80A0EBD-EE11-445B-8AB6-F630743B4943}" dt="2025-06-23T12:56:03.247" v="1841" actId="20577"/>
+        <pc:spChg chg="mod ord">
+          <ac:chgData name="Daniel Laurentiu Schmidt" userId="9ab8f5a0-558d-473f-8210-f04e6f74bedf" providerId="ADAL" clId="{D80A0EBD-EE11-445B-8AB6-F630743B4943}" dt="2025-06-24T20:40:43.809" v="2270" actId="1076"/>
           <ac:spMkLst>
             <pc:docMk/>
             <pc:sldMk cId="4086353399" sldId="284"/>
@@ -699,26 +816,189 @@
           </ac:picMkLst>
         </pc:picChg>
       </pc:sldChg>
-      <pc:sldChg chg="modSp add mod ord">
-        <pc:chgData name="Daniel Laurentiu Schmidt" userId="9ab8f5a0-558d-473f-8210-f04e6f74bedf" providerId="ADAL" clId="{D80A0EBD-EE11-445B-8AB6-F630743B4943}" dt="2025-06-23T12:56:43.312" v="1859"/>
+      <pc:sldChg chg="modSp add mod ord modClrScheme chgLayout">
+        <pc:chgData name="Daniel Laurentiu Schmidt" userId="9ab8f5a0-558d-473f-8210-f04e6f74bedf" providerId="ADAL" clId="{D80A0EBD-EE11-445B-8AB6-F630743B4943}" dt="2025-06-24T20:42:28.341" v="2299" actId="1035"/>
         <pc:sldMkLst>
           <pc:docMk/>
           <pc:sldMk cId="1457509898" sldId="285"/>
         </pc:sldMkLst>
         <pc:spChg chg="mod">
-          <ac:chgData name="Daniel Laurentiu Schmidt" userId="9ab8f5a0-558d-473f-8210-f04e6f74bedf" providerId="ADAL" clId="{D80A0EBD-EE11-445B-8AB6-F630743B4943}" dt="2025-06-23T12:56:43.312" v="1859"/>
+          <ac:chgData name="Daniel Laurentiu Schmidt" userId="9ab8f5a0-558d-473f-8210-f04e6f74bedf" providerId="ADAL" clId="{D80A0EBD-EE11-445B-8AB6-F630743B4943}" dt="2025-06-24T20:31:30.272" v="2175" actId="403"/>
           <ac:spMkLst>
             <pc:docMk/>
             <pc:sldMk cId="1457509898" sldId="285"/>
             <ac:spMk id="4" creationId="{5C7F35E6-AB7E-931E-6AC9-32962D1F5DCA}"/>
           </ac:spMkLst>
         </pc:spChg>
-        <pc:spChg chg="mod">
-          <ac:chgData name="Daniel Laurentiu Schmidt" userId="9ab8f5a0-558d-473f-8210-f04e6f74bedf" providerId="ADAL" clId="{D80A0EBD-EE11-445B-8AB6-F630743B4943}" dt="2025-06-23T12:56:23.023" v="1854" actId="20577"/>
+        <pc:spChg chg="mod ord">
+          <ac:chgData name="Daniel Laurentiu Schmidt" userId="9ab8f5a0-558d-473f-8210-f04e6f74bedf" providerId="ADAL" clId="{D80A0EBD-EE11-445B-8AB6-F630743B4943}" dt="2025-06-24T20:42:28.341" v="2299" actId="1035"/>
           <ac:spMkLst>
             <pc:docMk/>
             <pc:sldMk cId="1457509898" sldId="285"/>
             <ac:spMk id="6" creationId="{FE5F7E66-8DA2-25AB-BC88-E55837F038F7}"/>
+          </ac:spMkLst>
+        </pc:spChg>
+      </pc:sldChg>
+      <pc:sldChg chg="modSp add mod modClrScheme chgLayout">
+        <pc:chgData name="Daniel Laurentiu Schmidt" userId="9ab8f5a0-558d-473f-8210-f04e6f74bedf" providerId="ADAL" clId="{D80A0EBD-EE11-445B-8AB6-F630743B4943}" dt="2025-06-24T20:36:18.053" v="2228" actId="1076"/>
+        <pc:sldMkLst>
+          <pc:docMk/>
+          <pc:sldMk cId="2495409337" sldId="286"/>
+        </pc:sldMkLst>
+        <pc:spChg chg="add mod ord">
+          <ac:chgData name="Daniel Laurentiu Schmidt" userId="9ab8f5a0-558d-473f-8210-f04e6f74bedf" providerId="ADAL" clId="{D80A0EBD-EE11-445B-8AB6-F630743B4943}" dt="2025-06-24T20:25:49.157" v="2118" actId="26606"/>
+          <ac:spMkLst>
+            <pc:docMk/>
+            <pc:sldMk cId="2495409337" sldId="286"/>
+            <ac:spMk id="3" creationId="{62B1C560-2BDE-847D-33EF-4C596A0C62F5}"/>
+          </ac:spMkLst>
+        </pc:spChg>
+        <pc:spChg chg="add mod">
+          <ac:chgData name="Daniel Laurentiu Schmidt" userId="9ab8f5a0-558d-473f-8210-f04e6f74bedf" providerId="ADAL" clId="{D80A0EBD-EE11-445B-8AB6-F630743B4943}" dt="2025-06-24T20:35:37.831" v="2224" actId="1076"/>
+          <ac:spMkLst>
+            <pc:docMk/>
+            <pc:sldMk cId="2495409337" sldId="286"/>
+            <ac:spMk id="4" creationId="{88553654-773D-B17D-7F35-8FBE157F8DD7}"/>
+          </ac:spMkLst>
+        </pc:spChg>
+        <pc:spChg chg="mod ord">
+          <ac:chgData name="Daniel Laurentiu Schmidt" userId="9ab8f5a0-558d-473f-8210-f04e6f74bedf" providerId="ADAL" clId="{D80A0EBD-EE11-445B-8AB6-F630743B4943}" dt="2025-06-24T20:36:18.053" v="2228" actId="1076"/>
+          <ac:spMkLst>
+            <pc:docMk/>
+            <pc:sldMk cId="2495409337" sldId="286"/>
+            <ac:spMk id="6" creationId="{77677075-118B-C0A6-1234-3D1F9857DB17}"/>
+          </ac:spMkLst>
+        </pc:spChg>
+      </pc:sldChg>
+      <pc:sldChg chg="addSp delSp modSp add mod modClrScheme chgLayout">
+        <pc:chgData name="Daniel Laurentiu Schmidt" userId="9ab8f5a0-558d-473f-8210-f04e6f74bedf" providerId="ADAL" clId="{D80A0EBD-EE11-445B-8AB6-F630743B4943}" dt="2025-06-24T20:24:33.542" v="2116" actId="403"/>
+        <pc:sldMkLst>
+          <pc:docMk/>
+          <pc:sldMk cId="3527077400" sldId="287"/>
+        </pc:sldMkLst>
+        <pc:spChg chg="add mod">
+          <ac:chgData name="Daniel Laurentiu Schmidt" userId="9ab8f5a0-558d-473f-8210-f04e6f74bedf" providerId="ADAL" clId="{D80A0EBD-EE11-445B-8AB6-F630743B4943}" dt="2025-06-24T20:24:33.542" v="2116" actId="403"/>
+          <ac:spMkLst>
+            <pc:docMk/>
+            <pc:sldMk cId="3527077400" sldId="287"/>
+            <ac:spMk id="2" creationId="{92A1373A-69D4-0BF1-308D-9A57F19314D7}"/>
+          </ac:spMkLst>
+        </pc:spChg>
+        <pc:spChg chg="del mod">
+          <ac:chgData name="Daniel Laurentiu Schmidt" userId="9ab8f5a0-558d-473f-8210-f04e6f74bedf" providerId="ADAL" clId="{D80A0EBD-EE11-445B-8AB6-F630743B4943}" dt="2025-06-24T20:20:09.372" v="2065"/>
+          <ac:spMkLst>
+            <pc:docMk/>
+            <pc:sldMk cId="3527077400" sldId="287"/>
+            <ac:spMk id="3" creationId="{BE44645B-724A-5B8B-8C19-F6AA0AC3ACFD}"/>
+          </ac:spMkLst>
+        </pc:spChg>
+        <pc:spChg chg="del">
+          <ac:chgData name="Daniel Laurentiu Schmidt" userId="9ab8f5a0-558d-473f-8210-f04e6f74bedf" providerId="ADAL" clId="{D80A0EBD-EE11-445B-8AB6-F630743B4943}" dt="2025-06-24T20:19:58.045" v="2046" actId="478"/>
+          <ac:spMkLst>
+            <pc:docMk/>
+            <pc:sldMk cId="3527077400" sldId="287"/>
+            <ac:spMk id="4" creationId="{383130DA-311A-57BF-D9CB-3EC6EC5DF573}"/>
+          </ac:spMkLst>
+        </pc:spChg>
+        <pc:spChg chg="mod">
+          <ac:chgData name="Daniel Laurentiu Schmidt" userId="9ab8f5a0-558d-473f-8210-f04e6f74bedf" providerId="ADAL" clId="{D80A0EBD-EE11-445B-8AB6-F630743B4943}" dt="2025-06-24T20:24:25.832" v="2112" actId="26606"/>
+          <ac:spMkLst>
+            <pc:docMk/>
+            <pc:sldMk cId="3527077400" sldId="287"/>
+            <ac:spMk id="6" creationId="{1F5384B0-C5ED-D04C-B5FF-B5A25392AEAB}"/>
+          </ac:spMkLst>
+        </pc:spChg>
+        <pc:picChg chg="del">
+          <ac:chgData name="Daniel Laurentiu Schmidt" userId="9ab8f5a0-558d-473f-8210-f04e6f74bedf" providerId="ADAL" clId="{D80A0EBD-EE11-445B-8AB6-F630743B4943}" dt="2025-06-24T20:19:59.771" v="2047" actId="478"/>
+          <ac:picMkLst>
+            <pc:docMk/>
+            <pc:sldMk cId="3527077400" sldId="287"/>
+            <ac:picMk id="5" creationId="{A9BC52BC-4046-5396-1D50-6E9BB02AEB6D}"/>
+          </ac:picMkLst>
+        </pc:picChg>
+        <pc:picChg chg="add mod">
+          <ac:chgData name="Daniel Laurentiu Schmidt" userId="9ab8f5a0-558d-473f-8210-f04e6f74bedf" providerId="ADAL" clId="{D80A0EBD-EE11-445B-8AB6-F630743B4943}" dt="2025-06-24T20:24:25.832" v="2112" actId="26606"/>
+          <ac:picMkLst>
+            <pc:docMk/>
+            <pc:sldMk cId="3527077400" sldId="287"/>
+            <ac:picMk id="2050" creationId="{E6B9BE86-AD5C-E713-76A4-EB8055C56F98}"/>
+          </ac:picMkLst>
+        </pc:picChg>
+      </pc:sldChg>
+      <pc:sldChg chg="delSp modSp add mod modClrScheme chgLayout">
+        <pc:chgData name="Daniel Laurentiu Schmidt" userId="9ab8f5a0-558d-473f-8210-f04e6f74bedf" providerId="ADAL" clId="{D80A0EBD-EE11-445B-8AB6-F630743B4943}" dt="2025-06-24T20:42:55.448" v="2303" actId="1076"/>
+        <pc:sldMkLst>
+          <pc:docMk/>
+          <pc:sldMk cId="78095804" sldId="288"/>
+        </pc:sldMkLst>
+        <pc:spChg chg="del mod">
+          <ac:chgData name="Daniel Laurentiu Schmidt" userId="9ab8f5a0-558d-473f-8210-f04e6f74bedf" providerId="ADAL" clId="{D80A0EBD-EE11-445B-8AB6-F630743B4943}" dt="2025-06-24T20:29:40.805" v="2142"/>
+          <ac:spMkLst>
+            <pc:docMk/>
+            <pc:sldMk cId="78095804" sldId="288"/>
+            <ac:spMk id="3" creationId="{75E7A217-3DD5-0EA6-6538-2311BABC6D89}"/>
+          </ac:spMkLst>
+        </pc:spChg>
+        <pc:spChg chg="mod">
+          <ac:chgData name="Daniel Laurentiu Schmidt" userId="9ab8f5a0-558d-473f-8210-f04e6f74bedf" providerId="ADAL" clId="{D80A0EBD-EE11-445B-8AB6-F630743B4943}" dt="2025-06-24T20:30:58.731" v="2167" actId="403"/>
+          <ac:spMkLst>
+            <pc:docMk/>
+            <pc:sldMk cId="78095804" sldId="288"/>
+            <ac:spMk id="4" creationId="{27A37E45-5122-09D4-49BD-CCB288FC0376}"/>
+          </ac:spMkLst>
+        </pc:spChg>
+        <pc:spChg chg="mod ord">
+          <ac:chgData name="Daniel Laurentiu Schmidt" userId="9ab8f5a0-558d-473f-8210-f04e6f74bedf" providerId="ADAL" clId="{D80A0EBD-EE11-445B-8AB6-F630743B4943}" dt="2025-06-24T20:42:55.448" v="2303" actId="1076"/>
+          <ac:spMkLst>
+            <pc:docMk/>
+            <pc:sldMk cId="78095804" sldId="288"/>
+            <ac:spMk id="6" creationId="{5342B8E7-DFBE-752D-DC8F-22B5B38B8BAC}"/>
+          </ac:spMkLst>
+        </pc:spChg>
+      </pc:sldChg>
+      <pc:sldChg chg="addSp delSp modSp add mod modClrScheme chgLayout">
+        <pc:chgData name="Daniel Laurentiu Schmidt" userId="9ab8f5a0-558d-473f-8210-f04e6f74bedf" providerId="ADAL" clId="{D80A0EBD-EE11-445B-8AB6-F630743B4943}" dt="2025-06-24T20:43:07.565" v="2306" actId="1076"/>
+        <pc:sldMkLst>
+          <pc:docMk/>
+          <pc:sldMk cId="3937631067" sldId="289"/>
+        </pc:sldMkLst>
+        <pc:spChg chg="add mod ord">
+          <ac:chgData name="Daniel Laurentiu Schmidt" userId="9ab8f5a0-558d-473f-8210-f04e6f74bedf" providerId="ADAL" clId="{D80A0EBD-EE11-445B-8AB6-F630743B4943}" dt="2025-06-24T20:43:07.565" v="2306" actId="1076"/>
+          <ac:spMkLst>
+            <pc:docMk/>
+            <pc:sldMk cId="3937631067" sldId="289"/>
+            <ac:spMk id="3" creationId="{5EE94DED-7A2B-B3D1-87FD-D1AD2901C16A}"/>
+          </ac:spMkLst>
+        </pc:spChg>
+        <pc:spChg chg="del mod">
+          <ac:chgData name="Daniel Laurentiu Schmidt" userId="9ab8f5a0-558d-473f-8210-f04e6f74bedf" providerId="ADAL" clId="{D80A0EBD-EE11-445B-8AB6-F630743B4943}" dt="2025-06-24T20:32:42.404" v="2191" actId="478"/>
+          <ac:spMkLst>
+            <pc:docMk/>
+            <pc:sldMk cId="3937631067" sldId="289"/>
+            <ac:spMk id="4" creationId="{4390C54E-9157-45C9-C731-5D101DC4DB39}"/>
+          </ac:spMkLst>
+        </pc:spChg>
+        <pc:spChg chg="del">
+          <ac:chgData name="Daniel Laurentiu Schmidt" userId="9ab8f5a0-558d-473f-8210-f04e6f74bedf" providerId="ADAL" clId="{D80A0EBD-EE11-445B-8AB6-F630743B4943}" dt="2025-06-24T20:32:40.100" v="2190" actId="478"/>
+          <ac:spMkLst>
+            <pc:docMk/>
+            <pc:sldMk cId="3937631067" sldId="289"/>
+            <ac:spMk id="6" creationId="{9AA59FCB-888B-F60E-98EE-2502CE14A8FD}"/>
+          </ac:spMkLst>
+        </pc:spChg>
+      </pc:sldChg>
+      <pc:sldChg chg="modSp add mod">
+        <pc:chgData name="Daniel Laurentiu Schmidt" userId="9ab8f5a0-558d-473f-8210-f04e6f74bedf" providerId="ADAL" clId="{D80A0EBD-EE11-445B-8AB6-F630743B4943}" dt="2025-06-24T20:43:19.765" v="2316" actId="20577"/>
+        <pc:sldMkLst>
+          <pc:docMk/>
+          <pc:sldMk cId="3438298875" sldId="290"/>
+        </pc:sldMkLst>
+        <pc:spChg chg="mod">
+          <ac:chgData name="Daniel Laurentiu Schmidt" userId="9ab8f5a0-558d-473f-8210-f04e6f74bedf" providerId="ADAL" clId="{D80A0EBD-EE11-445B-8AB6-F630743B4943}" dt="2025-06-24T20:43:19.765" v="2316" actId="20577"/>
+          <ac:spMkLst>
+            <pc:docMk/>
+            <pc:sldMk cId="3438298875" sldId="290"/>
+            <ac:spMk id="3" creationId="{74061CB3-B102-B6C1-96E5-E6801DBFB608}"/>
           </ac:spMkLst>
         </pc:spChg>
       </pc:sldChg>
@@ -973,7 +1253,7 @@
           <a:p>
             <a:fld id="{F3818F04-716F-4EA1-8D94-EE650D13863D}" type="datetimeFigureOut">
               <a:rPr lang="en-US" smtClean="0"/>
-              <a:t>6/23/2025</a:t>
+              <a:t>6/24/2025</a:t>
             </a:fld>
             <a:endParaRPr lang="en-US"/>
           </a:p>
@@ -1305,7 +1585,7 @@
           <a:p>
             <a:fld id="{032F2F96-FB4F-4FE3-9775-2EE627221D70}" type="slidenum">
               <a:rPr lang="en-US" smtClean="0"/>
-              <a:t>5</a:t>
+              <a:t>7</a:t>
             </a:fld>
             <a:endParaRPr lang="en-US"/>
           </a:p>
@@ -1413,7 +1693,7 @@
           <a:p>
             <a:fld id="{032F2F96-FB4F-4FE3-9775-2EE627221D70}" type="slidenum">
               <a:rPr lang="en-US" smtClean="0"/>
-              <a:t>14</a:t>
+              <a:t>16</a:t>
             </a:fld>
             <a:endParaRPr lang="en-US"/>
           </a:p>
@@ -1521,7 +1801,7 @@
           <a:p>
             <a:fld id="{032F2F96-FB4F-4FE3-9775-2EE627221D70}" type="slidenum">
               <a:rPr lang="en-US" smtClean="0"/>
-              <a:t>15</a:t>
+              <a:t>17</a:t>
             </a:fld>
             <a:endParaRPr lang="en-US"/>
           </a:p>
@@ -1629,7 +1909,7 @@
           <a:p>
             <a:fld id="{032F2F96-FB4F-4FE3-9775-2EE627221D70}" type="slidenum">
               <a:rPr lang="en-US" smtClean="0"/>
-              <a:t>16</a:t>
+              <a:t>18</a:t>
             </a:fld>
             <a:endParaRPr lang="en-US"/>
           </a:p>
@@ -1737,7 +2017,7 @@
           <a:p>
             <a:fld id="{032F2F96-FB4F-4FE3-9775-2EE627221D70}" type="slidenum">
               <a:rPr lang="en-US" smtClean="0"/>
-              <a:t>17</a:t>
+              <a:t>19</a:t>
             </a:fld>
             <a:endParaRPr lang="en-US"/>
           </a:p>
@@ -1747,6 +2027,330 @@
     <p:extLst>
       <p:ext uri="{BB962C8B-B14F-4D97-AF65-F5344CB8AC3E}">
         <p14:creationId xmlns:p14="http://schemas.microsoft.com/office/powerpoint/2010/main" val="3399511706"/>
+      </p:ext>
+    </p:extLst>
+  </p:cSld>
+  <p:clrMapOvr>
+    <a:masterClrMapping/>
+  </p:clrMapOvr>
+</p:notes>
+</file>
+
+<file path=ppt/notesSlides/notesSlide14.xml><?xml version="1.0" encoding="utf-8"?>
+<p:notes xmlns:a="http://schemas.openxmlformats.org/drawingml/2006/main" xmlns:r="http://schemas.openxmlformats.org/officeDocument/2006/relationships" xmlns:p="http://schemas.openxmlformats.org/presentationml/2006/main">
+  <p:cSld>
+    <p:spTree>
+      <p:nvGrpSpPr>
+        <p:cNvPr id="1" name="">
+          <a:extLst>
+            <a:ext uri="{FF2B5EF4-FFF2-40B4-BE49-F238E27FC236}">
+              <a16:creationId xmlns:a16="http://schemas.microsoft.com/office/drawing/2014/main" id="{E7090D52-E7D0-B13F-B738-C4A37EEAEB96}"/>
+            </a:ext>
+          </a:extLst>
+        </p:cNvPr>
+        <p:cNvGrpSpPr/>
+        <p:nvPr/>
+      </p:nvGrpSpPr>
+      <p:grpSpPr>
+        <a:xfrm>
+          <a:off x="0" y="0"/>
+          <a:ext cx="0" cy="0"/>
+          <a:chOff x="0" y="0"/>
+          <a:chExt cx="0" cy="0"/>
+        </a:xfrm>
+      </p:grpSpPr>
+      <p:sp>
+        <p:nvSpPr>
+          <p:cNvPr id="2" name="Slide Image Placeholder 1">
+            <a:extLst>
+              <a:ext uri="{FF2B5EF4-FFF2-40B4-BE49-F238E27FC236}">
+                <a16:creationId xmlns:a16="http://schemas.microsoft.com/office/drawing/2014/main" id="{B454F6F8-BDB9-B4FF-E5A9-81D000873618}"/>
+              </a:ext>
+            </a:extLst>
+          </p:cNvPr>
+          <p:cNvSpPr>
+            <a:spLocks noGrp="1" noRot="1" noChangeAspect="1"/>
+          </p:cNvSpPr>
+          <p:nvPr>
+            <p:ph type="sldImg"/>
+          </p:nvPr>
+        </p:nvSpPr>
+        <p:spPr/>
+      </p:sp>
+      <p:sp>
+        <p:nvSpPr>
+          <p:cNvPr id="3" name="Notes Placeholder 2">
+            <a:extLst>
+              <a:ext uri="{FF2B5EF4-FFF2-40B4-BE49-F238E27FC236}">
+                <a16:creationId xmlns:a16="http://schemas.microsoft.com/office/drawing/2014/main" id="{0E5D8C4F-E1F7-1173-BF7B-934BAB11C2A6}"/>
+              </a:ext>
+            </a:extLst>
+          </p:cNvPr>
+          <p:cNvSpPr>
+            <a:spLocks noGrp="1"/>
+          </p:cNvSpPr>
+          <p:nvPr>
+            <p:ph type="body" idx="1"/>
+          </p:nvPr>
+        </p:nvSpPr>
+        <p:spPr/>
+        <p:txBody>
+          <a:bodyPr/>
+          <a:lstStyle/>
+          <a:p>
+            <a:endParaRPr lang="en-US" dirty="0"/>
+          </a:p>
+        </p:txBody>
+      </p:sp>
+      <p:sp>
+        <p:nvSpPr>
+          <p:cNvPr id="4" name="Slide Number Placeholder 3">
+            <a:extLst>
+              <a:ext uri="{FF2B5EF4-FFF2-40B4-BE49-F238E27FC236}">
+                <a16:creationId xmlns:a16="http://schemas.microsoft.com/office/drawing/2014/main" id="{D7A1C79F-00E1-8F70-D5DE-B7BF785A8738}"/>
+              </a:ext>
+            </a:extLst>
+          </p:cNvPr>
+          <p:cNvSpPr>
+            <a:spLocks noGrp="1"/>
+          </p:cNvSpPr>
+          <p:nvPr>
+            <p:ph type="sldNum" sz="quarter" idx="5"/>
+          </p:nvPr>
+        </p:nvSpPr>
+        <p:spPr/>
+        <p:txBody>
+          <a:bodyPr/>
+          <a:lstStyle/>
+          <a:p>
+            <a:fld id="{032F2F96-FB4F-4FE3-9775-2EE627221D70}" type="slidenum">
+              <a:rPr lang="en-US" smtClean="0"/>
+              <a:t>20</a:t>
+            </a:fld>
+            <a:endParaRPr lang="en-US"/>
+          </a:p>
+        </p:txBody>
+      </p:sp>
+    </p:spTree>
+    <p:extLst>
+      <p:ext uri="{BB962C8B-B14F-4D97-AF65-F5344CB8AC3E}">
+        <p14:creationId xmlns:p14="http://schemas.microsoft.com/office/powerpoint/2010/main" val="194399213"/>
+      </p:ext>
+    </p:extLst>
+  </p:cSld>
+  <p:clrMapOvr>
+    <a:masterClrMapping/>
+  </p:clrMapOvr>
+</p:notes>
+</file>
+
+<file path=ppt/notesSlides/notesSlide15.xml><?xml version="1.0" encoding="utf-8"?>
+<p:notes xmlns:a="http://schemas.openxmlformats.org/drawingml/2006/main" xmlns:r="http://schemas.openxmlformats.org/officeDocument/2006/relationships" xmlns:p="http://schemas.openxmlformats.org/presentationml/2006/main">
+  <p:cSld>
+    <p:spTree>
+      <p:nvGrpSpPr>
+        <p:cNvPr id="1" name="">
+          <a:extLst>
+            <a:ext uri="{FF2B5EF4-FFF2-40B4-BE49-F238E27FC236}">
+              <a16:creationId xmlns:a16="http://schemas.microsoft.com/office/drawing/2014/main" id="{7E7A26BC-E0BC-B143-E1BF-2D654A56766A}"/>
+            </a:ext>
+          </a:extLst>
+        </p:cNvPr>
+        <p:cNvGrpSpPr/>
+        <p:nvPr/>
+      </p:nvGrpSpPr>
+      <p:grpSpPr>
+        <a:xfrm>
+          <a:off x="0" y="0"/>
+          <a:ext cx="0" cy="0"/>
+          <a:chOff x="0" y="0"/>
+          <a:chExt cx="0" cy="0"/>
+        </a:xfrm>
+      </p:grpSpPr>
+      <p:sp>
+        <p:nvSpPr>
+          <p:cNvPr id="2" name="Slide Image Placeholder 1">
+            <a:extLst>
+              <a:ext uri="{FF2B5EF4-FFF2-40B4-BE49-F238E27FC236}">
+                <a16:creationId xmlns:a16="http://schemas.microsoft.com/office/drawing/2014/main" id="{44056645-8A8F-6672-D884-50EDE56E0F08}"/>
+              </a:ext>
+            </a:extLst>
+          </p:cNvPr>
+          <p:cNvSpPr>
+            <a:spLocks noGrp="1" noRot="1" noChangeAspect="1"/>
+          </p:cNvSpPr>
+          <p:nvPr>
+            <p:ph type="sldImg"/>
+          </p:nvPr>
+        </p:nvSpPr>
+        <p:spPr/>
+      </p:sp>
+      <p:sp>
+        <p:nvSpPr>
+          <p:cNvPr id="3" name="Notes Placeholder 2">
+            <a:extLst>
+              <a:ext uri="{FF2B5EF4-FFF2-40B4-BE49-F238E27FC236}">
+                <a16:creationId xmlns:a16="http://schemas.microsoft.com/office/drawing/2014/main" id="{7D4907CB-DC3C-301B-31E7-B24AFAC9C480}"/>
+              </a:ext>
+            </a:extLst>
+          </p:cNvPr>
+          <p:cNvSpPr>
+            <a:spLocks noGrp="1"/>
+          </p:cNvSpPr>
+          <p:nvPr>
+            <p:ph type="body" idx="1"/>
+          </p:nvPr>
+        </p:nvSpPr>
+        <p:spPr/>
+        <p:txBody>
+          <a:bodyPr/>
+          <a:lstStyle/>
+          <a:p>
+            <a:endParaRPr lang="en-US" dirty="0"/>
+          </a:p>
+        </p:txBody>
+      </p:sp>
+      <p:sp>
+        <p:nvSpPr>
+          <p:cNvPr id="4" name="Slide Number Placeholder 3">
+            <a:extLst>
+              <a:ext uri="{FF2B5EF4-FFF2-40B4-BE49-F238E27FC236}">
+                <a16:creationId xmlns:a16="http://schemas.microsoft.com/office/drawing/2014/main" id="{757A67C5-0FA1-4DC3-FDE8-8C19D72216FF}"/>
+              </a:ext>
+            </a:extLst>
+          </p:cNvPr>
+          <p:cNvSpPr>
+            <a:spLocks noGrp="1"/>
+          </p:cNvSpPr>
+          <p:nvPr>
+            <p:ph type="sldNum" sz="quarter" idx="5"/>
+          </p:nvPr>
+        </p:nvSpPr>
+        <p:spPr/>
+        <p:txBody>
+          <a:bodyPr/>
+          <a:lstStyle/>
+          <a:p>
+            <a:fld id="{032F2F96-FB4F-4FE3-9775-2EE627221D70}" type="slidenum">
+              <a:rPr lang="en-US" smtClean="0"/>
+              <a:t>21</a:t>
+            </a:fld>
+            <a:endParaRPr lang="en-US"/>
+          </a:p>
+        </p:txBody>
+      </p:sp>
+    </p:spTree>
+    <p:extLst>
+      <p:ext uri="{BB962C8B-B14F-4D97-AF65-F5344CB8AC3E}">
+        <p14:creationId xmlns:p14="http://schemas.microsoft.com/office/powerpoint/2010/main" val="1407981762"/>
+      </p:ext>
+    </p:extLst>
+  </p:cSld>
+  <p:clrMapOvr>
+    <a:masterClrMapping/>
+  </p:clrMapOvr>
+</p:notes>
+</file>
+
+<file path=ppt/notesSlides/notesSlide16.xml><?xml version="1.0" encoding="utf-8"?>
+<p:notes xmlns:a="http://schemas.openxmlformats.org/drawingml/2006/main" xmlns:r="http://schemas.openxmlformats.org/officeDocument/2006/relationships" xmlns:p="http://schemas.openxmlformats.org/presentationml/2006/main">
+  <p:cSld>
+    <p:spTree>
+      <p:nvGrpSpPr>
+        <p:cNvPr id="1" name="">
+          <a:extLst>
+            <a:ext uri="{FF2B5EF4-FFF2-40B4-BE49-F238E27FC236}">
+              <a16:creationId xmlns:a16="http://schemas.microsoft.com/office/drawing/2014/main" id="{5B928333-DEE2-00A9-F2DC-72737E43AA7D}"/>
+            </a:ext>
+          </a:extLst>
+        </p:cNvPr>
+        <p:cNvGrpSpPr/>
+        <p:nvPr/>
+      </p:nvGrpSpPr>
+      <p:grpSpPr>
+        <a:xfrm>
+          <a:off x="0" y="0"/>
+          <a:ext cx="0" cy="0"/>
+          <a:chOff x="0" y="0"/>
+          <a:chExt cx="0" cy="0"/>
+        </a:xfrm>
+      </p:grpSpPr>
+      <p:sp>
+        <p:nvSpPr>
+          <p:cNvPr id="2" name="Slide Image Placeholder 1">
+            <a:extLst>
+              <a:ext uri="{FF2B5EF4-FFF2-40B4-BE49-F238E27FC236}">
+                <a16:creationId xmlns:a16="http://schemas.microsoft.com/office/drawing/2014/main" id="{764DCD12-D09E-EB84-1319-ED47E6ADB443}"/>
+              </a:ext>
+            </a:extLst>
+          </p:cNvPr>
+          <p:cNvSpPr>
+            <a:spLocks noGrp="1" noRot="1" noChangeAspect="1"/>
+          </p:cNvSpPr>
+          <p:nvPr>
+            <p:ph type="sldImg"/>
+          </p:nvPr>
+        </p:nvSpPr>
+        <p:spPr/>
+      </p:sp>
+      <p:sp>
+        <p:nvSpPr>
+          <p:cNvPr id="3" name="Notes Placeholder 2">
+            <a:extLst>
+              <a:ext uri="{FF2B5EF4-FFF2-40B4-BE49-F238E27FC236}">
+                <a16:creationId xmlns:a16="http://schemas.microsoft.com/office/drawing/2014/main" id="{BC5A2E9D-6B6E-FAF5-526F-832158CFC3F3}"/>
+              </a:ext>
+            </a:extLst>
+          </p:cNvPr>
+          <p:cNvSpPr>
+            <a:spLocks noGrp="1"/>
+          </p:cNvSpPr>
+          <p:nvPr>
+            <p:ph type="body" idx="1"/>
+          </p:nvPr>
+        </p:nvSpPr>
+        <p:spPr/>
+        <p:txBody>
+          <a:bodyPr/>
+          <a:lstStyle/>
+          <a:p>
+            <a:endParaRPr lang="en-US" dirty="0"/>
+          </a:p>
+        </p:txBody>
+      </p:sp>
+      <p:sp>
+        <p:nvSpPr>
+          <p:cNvPr id="4" name="Slide Number Placeholder 3">
+            <a:extLst>
+              <a:ext uri="{FF2B5EF4-FFF2-40B4-BE49-F238E27FC236}">
+                <a16:creationId xmlns:a16="http://schemas.microsoft.com/office/drawing/2014/main" id="{996898A9-3417-2023-A654-9E4ED971D61B}"/>
+              </a:ext>
+            </a:extLst>
+          </p:cNvPr>
+          <p:cNvSpPr>
+            <a:spLocks noGrp="1"/>
+          </p:cNvSpPr>
+          <p:nvPr>
+            <p:ph type="sldNum" sz="quarter" idx="5"/>
+          </p:nvPr>
+        </p:nvSpPr>
+        <p:spPr/>
+        <p:txBody>
+          <a:bodyPr/>
+          <a:lstStyle/>
+          <a:p>
+            <a:fld id="{032F2F96-FB4F-4FE3-9775-2EE627221D70}" type="slidenum">
+              <a:rPr lang="en-US" smtClean="0"/>
+              <a:t>22</a:t>
+            </a:fld>
+            <a:endParaRPr lang="en-US"/>
+          </a:p>
+        </p:txBody>
+      </p:sp>
+    </p:spTree>
+    <p:extLst>
+      <p:ext uri="{BB962C8B-B14F-4D97-AF65-F5344CB8AC3E}">
+        <p14:creationId xmlns:p14="http://schemas.microsoft.com/office/powerpoint/2010/main" val="682668962"/>
       </p:ext>
     </p:extLst>
   </p:cSld>
@@ -1845,7 +2449,7 @@
           <a:p>
             <a:fld id="{032F2F96-FB4F-4FE3-9775-2EE627221D70}" type="slidenum">
               <a:rPr lang="en-US" smtClean="0"/>
-              <a:t>6</a:t>
+              <a:t>8</a:t>
             </a:fld>
             <a:endParaRPr lang="en-US"/>
           </a:p>
@@ -1953,7 +2557,7 @@
           <a:p>
             <a:fld id="{032F2F96-FB4F-4FE3-9775-2EE627221D70}" type="slidenum">
               <a:rPr lang="en-US" smtClean="0"/>
-              <a:t>7</a:t>
+              <a:t>9</a:t>
             </a:fld>
             <a:endParaRPr lang="en-US"/>
           </a:p>
@@ -2061,7 +2665,7 @@
           <a:p>
             <a:fld id="{032F2F96-FB4F-4FE3-9775-2EE627221D70}" type="slidenum">
               <a:rPr lang="en-US" smtClean="0"/>
-              <a:t>8</a:t>
+              <a:t>10</a:t>
             </a:fld>
             <a:endParaRPr lang="en-US"/>
           </a:p>
@@ -2169,7 +2773,7 @@
           <a:p>
             <a:fld id="{032F2F96-FB4F-4FE3-9775-2EE627221D70}" type="slidenum">
               <a:rPr lang="en-US" smtClean="0"/>
-              <a:t>9</a:t>
+              <a:t>11</a:t>
             </a:fld>
             <a:endParaRPr lang="en-US"/>
           </a:p>
@@ -2277,7 +2881,7 @@
           <a:p>
             <a:fld id="{032F2F96-FB4F-4FE3-9775-2EE627221D70}" type="slidenum">
               <a:rPr lang="en-US" smtClean="0"/>
-              <a:t>10</a:t>
+              <a:t>12</a:t>
             </a:fld>
             <a:endParaRPr lang="en-US"/>
           </a:p>
@@ -2385,7 +2989,7 @@
           <a:p>
             <a:fld id="{032F2F96-FB4F-4FE3-9775-2EE627221D70}" type="slidenum">
               <a:rPr lang="en-US" smtClean="0"/>
-              <a:t>11</a:t>
+              <a:t>13</a:t>
             </a:fld>
             <a:endParaRPr lang="en-US"/>
           </a:p>
@@ -2493,7 +3097,7 @@
           <a:p>
             <a:fld id="{032F2F96-FB4F-4FE3-9775-2EE627221D70}" type="slidenum">
               <a:rPr lang="en-US" smtClean="0"/>
-              <a:t>12</a:t>
+              <a:t>14</a:t>
             </a:fld>
             <a:endParaRPr lang="en-US"/>
           </a:p>
@@ -2601,7 +3205,7 @@
           <a:p>
             <a:fld id="{032F2F96-FB4F-4FE3-9775-2EE627221D70}" type="slidenum">
               <a:rPr lang="en-US" smtClean="0"/>
-              <a:t>13</a:t>
+              <a:t>15</a:t>
             </a:fld>
             <a:endParaRPr lang="en-US"/>
           </a:p>
@@ -2788,7 +3392,7 @@
           </a:ln>
           <a:extLst>
             <a:ext uri="{C572A759-6A51-4108-AA02-DFA0A04FC94B}">
-              <ma14:wrappingTextBoxFlag xmlns:m="http://schemas.openxmlformats.org/officeDocument/2006/math" xmlns:a14="http://schemas.microsoft.com/office/drawing/2010/main" xmlns:ma14="http://schemas.microsoft.com/office/mac/drawingml/2011/main" xmlns="" val="1"/>
+              <ma14:wrappingTextBoxFlag xmlns="" xmlns:ma14="http://schemas.microsoft.com/office/mac/drawingml/2011/main" xmlns:a14="http://schemas.microsoft.com/office/drawing/2010/main" xmlns:m="http://schemas.openxmlformats.org/officeDocument/2006/math" val="1"/>
             </a:ext>
           </a:extLst>
         </p:spPr>
@@ -2906,7 +3510,7 @@
           </a:ln>
           <a:extLst>
             <a:ext uri="{C572A759-6A51-4108-AA02-DFA0A04FC94B}">
-              <ma14:wrappingTextBoxFlag xmlns:m="http://schemas.openxmlformats.org/officeDocument/2006/math" xmlns:a14="http://schemas.microsoft.com/office/drawing/2010/main" xmlns:ma14="http://schemas.microsoft.com/office/mac/drawingml/2011/main" xmlns="" val="1"/>
+              <ma14:wrappingTextBoxFlag xmlns="" xmlns:ma14="http://schemas.microsoft.com/office/mac/drawingml/2011/main" xmlns:a14="http://schemas.microsoft.com/office/drawing/2010/main" xmlns:m="http://schemas.openxmlformats.org/officeDocument/2006/math" val="1"/>
             </a:ext>
           </a:extLst>
         </p:spPr>
@@ -3012,7 +3616,7 @@
           </a:ln>
           <a:extLst>
             <a:ext uri="{C572A759-6A51-4108-AA02-DFA0A04FC94B}">
-              <ma14:wrappingTextBoxFlag xmlns:ma14="http://schemas.microsoft.com/office/mac/drawingml/2011/main" xmlns:a14="http://schemas.microsoft.com/office/drawing/2010/main" xmlns:m="http://schemas.openxmlformats.org/officeDocument/2006/math" xmlns="" val="1"/>
+              <ma14:wrappingTextBoxFlag xmlns="" xmlns:m="http://schemas.openxmlformats.org/officeDocument/2006/math" xmlns:a14="http://schemas.microsoft.com/office/drawing/2010/main" xmlns:ma14="http://schemas.microsoft.com/office/mac/drawingml/2011/main" val="1"/>
             </a:ext>
           </a:extLst>
         </p:spPr>
@@ -3128,7 +3732,7 @@
           </a:ln>
           <a:extLst>
             <a:ext uri="{C572A759-6A51-4108-AA02-DFA0A04FC94B}">
-              <ma14:wrappingTextBoxFlag xmlns:ma14="http://schemas.microsoft.com/office/mac/drawingml/2011/main" xmlns:a14="http://schemas.microsoft.com/office/drawing/2010/main" xmlns:m="http://schemas.openxmlformats.org/officeDocument/2006/math" xmlns="" val="1"/>
+              <ma14:wrappingTextBoxFlag xmlns="" xmlns:m="http://schemas.openxmlformats.org/officeDocument/2006/math" xmlns:a14="http://schemas.microsoft.com/office/drawing/2010/main" xmlns:ma14="http://schemas.microsoft.com/office/mac/drawingml/2011/main" val="1"/>
             </a:ext>
           </a:extLst>
         </p:spPr>
@@ -3999,7 +4603,7 @@
           </a:ln>
           <a:extLst>
             <a:ext uri="{C572A759-6A51-4108-AA02-DFA0A04FC94B}">
-              <ma14:wrappingTextBoxFlag xmlns:m="http://schemas.openxmlformats.org/officeDocument/2006/math" xmlns:a14="http://schemas.microsoft.com/office/drawing/2010/main" xmlns:ma14="http://schemas.microsoft.com/office/mac/drawingml/2011/main" xmlns="" val="1"/>
+              <ma14:wrappingTextBoxFlag xmlns="" xmlns:ma14="http://schemas.microsoft.com/office/mac/drawingml/2011/main" xmlns:a14="http://schemas.microsoft.com/office/drawing/2010/main" xmlns:m="http://schemas.openxmlformats.org/officeDocument/2006/math" val="1"/>
             </a:ext>
           </a:extLst>
         </p:spPr>
@@ -4508,7 +5112,7 @@
           </a:ln>
           <a:extLst>
             <a:ext uri="{C572A759-6A51-4108-AA02-DFA0A04FC94B}">
-              <ma14:wrappingTextBoxFlag xmlns:m="http://schemas.openxmlformats.org/officeDocument/2006/math" xmlns:a14="http://schemas.microsoft.com/office/drawing/2010/main" xmlns:ma14="http://schemas.microsoft.com/office/mac/drawingml/2011/main" xmlns="" val="1"/>
+              <ma14:wrappingTextBoxFlag xmlns="" xmlns:ma14="http://schemas.microsoft.com/office/mac/drawingml/2011/main" xmlns:a14="http://schemas.microsoft.com/office/drawing/2010/main" xmlns:m="http://schemas.openxmlformats.org/officeDocument/2006/math" val="1"/>
             </a:ext>
           </a:extLst>
         </p:spPr>
@@ -4627,7 +5231,7 @@
           </a:ln>
           <a:extLst>
             <a:ext uri="{C572A759-6A51-4108-AA02-DFA0A04FC94B}">
-              <ma14:wrappingTextBoxFlag xmlns:m="http://schemas.openxmlformats.org/officeDocument/2006/math" xmlns:a14="http://schemas.microsoft.com/office/drawing/2010/main" xmlns:ma14="http://schemas.microsoft.com/office/mac/drawingml/2011/main" xmlns="" val="1"/>
+              <ma14:wrappingTextBoxFlag xmlns="" xmlns:ma14="http://schemas.microsoft.com/office/mac/drawingml/2011/main" xmlns:a14="http://schemas.microsoft.com/office/drawing/2010/main" xmlns:m="http://schemas.openxmlformats.org/officeDocument/2006/math" val="1"/>
             </a:ext>
           </a:extLst>
         </p:spPr>
@@ -4911,7 +5515,7 @@
           </a:ln>
           <a:extLst>
             <a:ext uri="{C572A759-6A51-4108-AA02-DFA0A04FC94B}">
-              <ma14:wrappingTextBoxFlag xmlns:m="http://schemas.openxmlformats.org/officeDocument/2006/math" xmlns:a14="http://schemas.microsoft.com/office/drawing/2010/main" xmlns:ma14="http://schemas.microsoft.com/office/mac/drawingml/2011/main" xmlns="" val="1"/>
+              <ma14:wrappingTextBoxFlag xmlns="" xmlns:ma14="http://schemas.microsoft.com/office/mac/drawingml/2011/main" xmlns:a14="http://schemas.microsoft.com/office/drawing/2010/main" xmlns:m="http://schemas.openxmlformats.org/officeDocument/2006/math" val="1"/>
             </a:ext>
           </a:extLst>
         </p:spPr>
@@ -5152,7 +5756,7 @@
           </a:ln>
           <a:extLst>
             <a:ext uri="{C572A759-6A51-4108-AA02-DFA0A04FC94B}">
-              <ma14:wrappingTextBoxFlag xmlns:m="http://schemas.openxmlformats.org/officeDocument/2006/math" xmlns:a14="http://schemas.microsoft.com/office/drawing/2010/main" xmlns:ma14="http://schemas.microsoft.com/office/mac/drawingml/2011/main" xmlns="" val="1"/>
+              <ma14:wrappingTextBoxFlag xmlns="" xmlns:ma14="http://schemas.microsoft.com/office/mac/drawingml/2011/main" xmlns:a14="http://schemas.microsoft.com/office/drawing/2010/main" xmlns:m="http://schemas.openxmlformats.org/officeDocument/2006/math" val="1"/>
             </a:ext>
           </a:extLst>
         </p:spPr>
@@ -5338,7 +5942,7 @@
           </a:ln>
           <a:extLst>
             <a:ext uri="{C572A759-6A51-4108-AA02-DFA0A04FC94B}">
-              <ma14:wrappingTextBoxFlag xmlns:m="http://schemas.openxmlformats.org/officeDocument/2006/math" xmlns:a14="http://schemas.microsoft.com/office/drawing/2010/main" xmlns:ma14="http://schemas.microsoft.com/office/mac/drawingml/2011/main" xmlns="" val="1"/>
+              <ma14:wrappingTextBoxFlag xmlns="" xmlns:ma14="http://schemas.microsoft.com/office/mac/drawingml/2011/main" xmlns:a14="http://schemas.microsoft.com/office/drawing/2010/main" xmlns:m="http://schemas.openxmlformats.org/officeDocument/2006/math" val="1"/>
             </a:ext>
           </a:extLst>
         </p:spPr>
@@ -5456,7 +6060,7 @@
           </a:ln>
           <a:extLst>
             <a:ext uri="{C572A759-6A51-4108-AA02-DFA0A04FC94B}">
-              <ma14:wrappingTextBoxFlag xmlns:m="http://schemas.openxmlformats.org/officeDocument/2006/math" xmlns:a14="http://schemas.microsoft.com/office/drawing/2010/main" xmlns:ma14="http://schemas.microsoft.com/office/mac/drawingml/2011/main" xmlns="" val="1"/>
+              <ma14:wrappingTextBoxFlag xmlns="" xmlns:ma14="http://schemas.microsoft.com/office/mac/drawingml/2011/main" xmlns:a14="http://schemas.microsoft.com/office/drawing/2010/main" xmlns:m="http://schemas.openxmlformats.org/officeDocument/2006/math" val="1"/>
             </a:ext>
           </a:extLst>
         </p:spPr>
@@ -5506,7 +6110,7 @@
           </a:ln>
           <a:extLst>
             <a:ext uri="{C572A759-6A51-4108-AA02-DFA0A04FC94B}">
-              <ma14:wrappingTextBoxFlag xmlns:m="http://schemas.openxmlformats.org/officeDocument/2006/math" xmlns:a14="http://schemas.microsoft.com/office/drawing/2010/main" xmlns:ma14="http://schemas.microsoft.com/office/mac/drawingml/2011/main" xmlns="" val="1"/>
+              <ma14:wrappingTextBoxFlag xmlns="" xmlns:ma14="http://schemas.microsoft.com/office/mac/drawingml/2011/main" xmlns:a14="http://schemas.microsoft.com/office/drawing/2010/main" xmlns:m="http://schemas.openxmlformats.org/officeDocument/2006/math" val="1"/>
             </a:ext>
           </a:extLst>
         </p:spPr>
@@ -5826,7 +6430,7 @@
           </a:ln>
           <a:extLst>
             <a:ext uri="{C572A759-6A51-4108-AA02-DFA0A04FC94B}">
-              <ma14:wrappingTextBoxFlag xmlns:m="http://schemas.openxmlformats.org/officeDocument/2006/math" xmlns:a14="http://schemas.microsoft.com/office/drawing/2010/main" xmlns:ma14="http://schemas.microsoft.com/office/mac/drawingml/2011/main" xmlns="" val="1"/>
+              <ma14:wrappingTextBoxFlag xmlns="" xmlns:ma14="http://schemas.microsoft.com/office/mac/drawingml/2011/main" xmlns:a14="http://schemas.microsoft.com/office/drawing/2010/main" xmlns:m="http://schemas.openxmlformats.org/officeDocument/2006/math" val="1"/>
             </a:ext>
           </a:extLst>
         </p:spPr>
@@ -5944,7 +6548,7 @@
           </a:ln>
           <a:extLst>
             <a:ext uri="{C572A759-6A51-4108-AA02-DFA0A04FC94B}">
-              <ma14:wrappingTextBoxFlag xmlns:m="http://schemas.openxmlformats.org/officeDocument/2006/math" xmlns:a14="http://schemas.microsoft.com/office/drawing/2010/main" xmlns:ma14="http://schemas.microsoft.com/office/mac/drawingml/2011/main" xmlns="" val="1"/>
+              <ma14:wrappingTextBoxFlag xmlns="" xmlns:ma14="http://schemas.microsoft.com/office/mac/drawingml/2011/main" xmlns:a14="http://schemas.microsoft.com/office/drawing/2010/main" xmlns:m="http://schemas.openxmlformats.org/officeDocument/2006/math" val="1"/>
             </a:ext>
           </a:extLst>
         </p:spPr>
@@ -6196,7 +6800,7 @@
           </a:ln>
           <a:extLst>
             <a:ext uri="{C572A759-6A51-4108-AA02-DFA0A04FC94B}">
-              <ma14:wrappingTextBoxFlag xmlns:m="http://schemas.openxmlformats.org/officeDocument/2006/math" xmlns:a14="http://schemas.microsoft.com/office/drawing/2010/main" xmlns:ma14="http://schemas.microsoft.com/office/mac/drawingml/2011/main" xmlns="" val="1"/>
+              <ma14:wrappingTextBoxFlag xmlns="" xmlns:ma14="http://schemas.microsoft.com/office/mac/drawingml/2011/main" xmlns:a14="http://schemas.microsoft.com/office/drawing/2010/main" xmlns:m="http://schemas.openxmlformats.org/officeDocument/2006/math" val="1"/>
             </a:ext>
           </a:extLst>
         </p:spPr>
@@ -6314,7 +6918,7 @@
           </a:ln>
           <a:extLst>
             <a:ext uri="{C572A759-6A51-4108-AA02-DFA0A04FC94B}">
-              <ma14:wrappingTextBoxFlag xmlns:m="http://schemas.openxmlformats.org/officeDocument/2006/math" xmlns:a14="http://schemas.microsoft.com/office/drawing/2010/main" xmlns:ma14="http://schemas.microsoft.com/office/mac/drawingml/2011/main" xmlns="" val="1"/>
+              <ma14:wrappingTextBoxFlag xmlns="" xmlns:ma14="http://schemas.microsoft.com/office/mac/drawingml/2011/main" xmlns:a14="http://schemas.microsoft.com/office/drawing/2010/main" xmlns:m="http://schemas.openxmlformats.org/officeDocument/2006/math" val="1"/>
             </a:ext>
           </a:extLst>
         </p:spPr>
@@ -6420,7 +7024,7 @@
           </a:ln>
           <a:extLst>
             <a:ext uri="{C572A759-6A51-4108-AA02-DFA0A04FC94B}">
-              <ma14:wrappingTextBoxFlag xmlns:ma14="http://schemas.microsoft.com/office/mac/drawingml/2011/main" xmlns:a14="http://schemas.microsoft.com/office/drawing/2010/main" xmlns:m="http://schemas.openxmlformats.org/officeDocument/2006/math" xmlns="" val="1"/>
+              <ma14:wrappingTextBoxFlag xmlns="" xmlns:m="http://schemas.openxmlformats.org/officeDocument/2006/math" xmlns:a14="http://schemas.microsoft.com/office/drawing/2010/main" xmlns:ma14="http://schemas.microsoft.com/office/mac/drawingml/2011/main" val="1"/>
             </a:ext>
           </a:extLst>
         </p:spPr>
@@ -6653,7 +7257,7 @@
           </a:ln>
           <a:extLst>
             <a:ext uri="{C572A759-6A51-4108-AA02-DFA0A04FC94B}">
-              <ma14:wrappingTextBoxFlag xmlns:ma14="http://schemas.microsoft.com/office/mac/drawingml/2011/main" xmlns:a14="http://schemas.microsoft.com/office/drawing/2010/main" xmlns:m="http://schemas.openxmlformats.org/officeDocument/2006/math" xmlns="" val="1"/>
+              <ma14:wrappingTextBoxFlag xmlns="" xmlns:m="http://schemas.openxmlformats.org/officeDocument/2006/math" xmlns:a14="http://schemas.microsoft.com/office/drawing/2010/main" xmlns:ma14="http://schemas.microsoft.com/office/mac/drawingml/2011/main" val="1"/>
             </a:ext>
           </a:extLst>
         </p:spPr>
@@ -7384,7 +7988,7 @@
           </a:ln>
           <a:extLst>
             <a:ext uri="{C572A759-6A51-4108-AA02-DFA0A04FC94B}">
-              <ma14:wrappingTextBoxFlag xmlns:m="http://schemas.openxmlformats.org/officeDocument/2006/math" xmlns:a14="http://schemas.microsoft.com/office/drawing/2010/main" xmlns:ma14="http://schemas.microsoft.com/office/mac/drawingml/2011/main" xmlns="" val="1"/>
+              <ma14:wrappingTextBoxFlag xmlns="" xmlns:ma14="http://schemas.microsoft.com/office/mac/drawingml/2011/main" xmlns:a14="http://schemas.microsoft.com/office/drawing/2010/main" xmlns:m="http://schemas.openxmlformats.org/officeDocument/2006/math" val="1"/>
             </a:ext>
           </a:extLst>
         </p:spPr>
@@ -7854,7 +8458,7 @@
           </a:ln>
           <a:extLst>
             <a:ext uri="{C572A759-6A51-4108-AA02-DFA0A04FC94B}">
-              <ma14:wrappingTextBoxFlag xmlns:m="http://schemas.openxmlformats.org/officeDocument/2006/math" xmlns:a14="http://schemas.microsoft.com/office/drawing/2010/main" xmlns:ma14="http://schemas.microsoft.com/office/mac/drawingml/2011/main" xmlns="" val="1"/>
+              <ma14:wrappingTextBoxFlag xmlns="" xmlns:ma14="http://schemas.microsoft.com/office/mac/drawingml/2011/main" xmlns:a14="http://schemas.microsoft.com/office/drawing/2010/main" xmlns:m="http://schemas.openxmlformats.org/officeDocument/2006/math" val="1"/>
             </a:ext>
           </a:extLst>
         </p:spPr>
@@ -7973,7 +8577,7 @@
           </a:ln>
           <a:extLst>
             <a:ext uri="{C572A759-6A51-4108-AA02-DFA0A04FC94B}">
-              <ma14:wrappingTextBoxFlag xmlns:m="http://schemas.openxmlformats.org/officeDocument/2006/math" xmlns:a14="http://schemas.microsoft.com/office/drawing/2010/main" xmlns:ma14="http://schemas.microsoft.com/office/mac/drawingml/2011/main" xmlns="" val="1"/>
+              <ma14:wrappingTextBoxFlag xmlns="" xmlns:ma14="http://schemas.microsoft.com/office/mac/drawingml/2011/main" xmlns:a14="http://schemas.microsoft.com/office/drawing/2010/main" xmlns:m="http://schemas.openxmlformats.org/officeDocument/2006/math" val="1"/>
             </a:ext>
           </a:extLst>
         </p:spPr>
@@ -8256,7 +8860,7 @@
           </a:ln>
           <a:extLst>
             <a:ext uri="{C572A759-6A51-4108-AA02-DFA0A04FC94B}">
-              <ma14:wrappingTextBoxFlag xmlns:m="http://schemas.openxmlformats.org/officeDocument/2006/math" xmlns:a14="http://schemas.microsoft.com/office/drawing/2010/main" xmlns:ma14="http://schemas.microsoft.com/office/mac/drawingml/2011/main" xmlns="" val="1"/>
+              <ma14:wrappingTextBoxFlag xmlns="" xmlns:ma14="http://schemas.microsoft.com/office/mac/drawingml/2011/main" xmlns:a14="http://schemas.microsoft.com/office/drawing/2010/main" xmlns:m="http://schemas.openxmlformats.org/officeDocument/2006/math" val="1"/>
             </a:ext>
           </a:extLst>
         </p:spPr>
@@ -8540,7 +9144,7 @@
           </a:ln>
           <a:extLst>
             <a:ext uri="{C572A759-6A51-4108-AA02-DFA0A04FC94B}">
-              <ma14:wrappingTextBoxFlag xmlns:m="http://schemas.openxmlformats.org/officeDocument/2006/math" xmlns:a14="http://schemas.microsoft.com/office/drawing/2010/main" xmlns:ma14="http://schemas.microsoft.com/office/mac/drawingml/2011/main" xmlns="" val="1"/>
+              <ma14:wrappingTextBoxFlag xmlns="" xmlns:ma14="http://schemas.microsoft.com/office/mac/drawingml/2011/main" xmlns:a14="http://schemas.microsoft.com/office/drawing/2010/main" xmlns:m="http://schemas.openxmlformats.org/officeDocument/2006/math" val="1"/>
             </a:ext>
           </a:extLst>
         </p:spPr>
@@ -8769,7 +9373,7 @@
           </a:ln>
           <a:extLst>
             <a:ext uri="{C572A759-6A51-4108-AA02-DFA0A04FC94B}">
-              <ma14:wrappingTextBoxFlag xmlns:m="http://schemas.openxmlformats.org/officeDocument/2006/math" xmlns:a14="http://schemas.microsoft.com/office/drawing/2010/main" xmlns:ma14="http://schemas.microsoft.com/office/mac/drawingml/2011/main" xmlns="" val="1"/>
+              <ma14:wrappingTextBoxFlag xmlns="" xmlns:ma14="http://schemas.microsoft.com/office/mac/drawingml/2011/main" xmlns:a14="http://schemas.microsoft.com/office/drawing/2010/main" xmlns:m="http://schemas.openxmlformats.org/officeDocument/2006/math" val="1"/>
             </a:ext>
           </a:extLst>
         </p:spPr>
@@ -8954,7 +9558,7 @@
           </a:ln>
           <a:extLst>
             <a:ext uri="{C572A759-6A51-4108-AA02-DFA0A04FC94B}">
-              <ma14:wrappingTextBoxFlag xmlns:m="http://schemas.openxmlformats.org/officeDocument/2006/math" xmlns:a14="http://schemas.microsoft.com/office/drawing/2010/main" xmlns:ma14="http://schemas.microsoft.com/office/mac/drawingml/2011/main" xmlns="" val="1"/>
+              <ma14:wrappingTextBoxFlag xmlns="" xmlns:ma14="http://schemas.microsoft.com/office/mac/drawingml/2011/main" xmlns:a14="http://schemas.microsoft.com/office/drawing/2010/main" xmlns:m="http://schemas.openxmlformats.org/officeDocument/2006/math" val="1"/>
             </a:ext>
           </a:extLst>
         </p:spPr>
@@ -9171,7 +9775,7 @@
           </a:ln>
           <a:extLst>
             <a:ext uri="{C572A759-6A51-4108-AA02-DFA0A04FC94B}">
-              <ma14:wrappingTextBoxFlag xmlns:m="http://schemas.openxmlformats.org/officeDocument/2006/math" xmlns:a14="http://schemas.microsoft.com/office/drawing/2010/main" xmlns:ma14="http://schemas.microsoft.com/office/mac/drawingml/2011/main" xmlns="" val="1"/>
+              <ma14:wrappingTextBoxFlag xmlns="" xmlns:ma14="http://schemas.microsoft.com/office/mac/drawingml/2011/main" xmlns:a14="http://schemas.microsoft.com/office/drawing/2010/main" xmlns:m="http://schemas.openxmlformats.org/officeDocument/2006/math" val="1"/>
             </a:ext>
           </a:extLst>
         </p:spPr>
@@ -9289,7 +9893,7 @@
           </a:ln>
           <a:extLst>
             <a:ext uri="{C572A759-6A51-4108-AA02-DFA0A04FC94B}">
-              <ma14:wrappingTextBoxFlag xmlns:m="http://schemas.openxmlformats.org/officeDocument/2006/math" xmlns:a14="http://schemas.microsoft.com/office/drawing/2010/main" xmlns:ma14="http://schemas.microsoft.com/office/mac/drawingml/2011/main" xmlns="" val="1"/>
+              <ma14:wrappingTextBoxFlag xmlns="" xmlns:ma14="http://schemas.microsoft.com/office/mac/drawingml/2011/main" xmlns:a14="http://schemas.microsoft.com/office/drawing/2010/main" xmlns:m="http://schemas.openxmlformats.org/officeDocument/2006/math" val="1"/>
             </a:ext>
           </a:extLst>
         </p:spPr>
@@ -9541,7 +10145,7 @@
           </a:ln>
           <a:extLst>
             <a:ext uri="{C572A759-6A51-4108-AA02-DFA0A04FC94B}">
-              <ma14:wrappingTextBoxFlag xmlns:m="http://schemas.openxmlformats.org/officeDocument/2006/math" xmlns:a14="http://schemas.microsoft.com/office/drawing/2010/main" xmlns:ma14="http://schemas.microsoft.com/office/mac/drawingml/2011/main" xmlns="" val="1"/>
+              <ma14:wrappingTextBoxFlag xmlns="" xmlns:ma14="http://schemas.microsoft.com/office/mac/drawingml/2011/main" xmlns:a14="http://schemas.microsoft.com/office/drawing/2010/main" xmlns:m="http://schemas.openxmlformats.org/officeDocument/2006/math" val="1"/>
             </a:ext>
           </a:extLst>
         </p:spPr>
@@ -9659,7 +10263,7 @@
           </a:ln>
           <a:extLst>
             <a:ext uri="{C572A759-6A51-4108-AA02-DFA0A04FC94B}">
-              <ma14:wrappingTextBoxFlag xmlns:m="http://schemas.openxmlformats.org/officeDocument/2006/math" xmlns:a14="http://schemas.microsoft.com/office/drawing/2010/main" xmlns:ma14="http://schemas.microsoft.com/office/mac/drawingml/2011/main" xmlns="" val="1"/>
+              <ma14:wrappingTextBoxFlag xmlns="" xmlns:ma14="http://schemas.microsoft.com/office/mac/drawingml/2011/main" xmlns:a14="http://schemas.microsoft.com/office/drawing/2010/main" xmlns:m="http://schemas.openxmlformats.org/officeDocument/2006/math" val="1"/>
             </a:ext>
           </a:extLst>
         </p:spPr>
@@ -9765,7 +10369,7 @@
           </a:ln>
           <a:extLst>
             <a:ext uri="{C572A759-6A51-4108-AA02-DFA0A04FC94B}">
-              <ma14:wrappingTextBoxFlag xmlns:ma14="http://schemas.microsoft.com/office/mac/drawingml/2011/main" xmlns:a14="http://schemas.microsoft.com/office/drawing/2010/main" xmlns:m="http://schemas.openxmlformats.org/officeDocument/2006/math" xmlns="" val="1"/>
+              <ma14:wrappingTextBoxFlag xmlns="" xmlns:m="http://schemas.openxmlformats.org/officeDocument/2006/math" xmlns:a14="http://schemas.microsoft.com/office/drawing/2010/main" xmlns:ma14="http://schemas.microsoft.com/office/mac/drawingml/2011/main" val="1"/>
             </a:ext>
           </a:extLst>
         </p:spPr>
@@ -9881,7 +10485,7 @@
           </a:ln>
           <a:extLst>
             <a:ext uri="{C572A759-6A51-4108-AA02-DFA0A04FC94B}">
-              <ma14:wrappingTextBoxFlag xmlns:ma14="http://schemas.microsoft.com/office/mac/drawingml/2011/main" xmlns:a14="http://schemas.microsoft.com/office/drawing/2010/main" xmlns:m="http://schemas.openxmlformats.org/officeDocument/2006/math" xmlns="" val="1"/>
+              <ma14:wrappingTextBoxFlag xmlns="" xmlns:m="http://schemas.openxmlformats.org/officeDocument/2006/math" xmlns:a14="http://schemas.microsoft.com/office/drawing/2010/main" xmlns:ma14="http://schemas.microsoft.com/office/mac/drawingml/2011/main" val="1"/>
             </a:ext>
           </a:extLst>
         </p:spPr>
@@ -10168,7 +10772,7 @@
           </a:ln>
           <a:extLst>
             <a:ext uri="{C572A759-6A51-4108-AA02-DFA0A04FC94B}">
-              <ma14:wrappingTextBoxFlag xmlns:m="http://schemas.openxmlformats.org/officeDocument/2006/math" xmlns:a14="http://schemas.microsoft.com/office/drawing/2010/main" xmlns:ma14="http://schemas.microsoft.com/office/mac/drawingml/2011/main" xmlns="" val="1"/>
+              <ma14:wrappingTextBoxFlag xmlns="" xmlns:ma14="http://schemas.microsoft.com/office/mac/drawingml/2011/main" xmlns:a14="http://schemas.microsoft.com/office/drawing/2010/main" xmlns:m="http://schemas.openxmlformats.org/officeDocument/2006/math" val="1"/>
             </a:ext>
           </a:extLst>
         </p:spPr>
@@ -10409,7 +11013,7 @@
           </a:ln>
           <a:extLst>
             <a:ext uri="{C572A759-6A51-4108-AA02-DFA0A04FC94B}">
-              <ma14:wrappingTextBoxFlag xmlns:m="http://schemas.openxmlformats.org/officeDocument/2006/math" xmlns:a14="http://schemas.microsoft.com/office/drawing/2010/main" xmlns:ma14="http://schemas.microsoft.com/office/mac/drawingml/2011/main" xmlns="" val="1"/>
+              <ma14:wrappingTextBoxFlag xmlns="" xmlns:ma14="http://schemas.microsoft.com/office/mac/drawingml/2011/main" xmlns:a14="http://schemas.microsoft.com/office/drawing/2010/main" xmlns:m="http://schemas.openxmlformats.org/officeDocument/2006/math" val="1"/>
             </a:ext>
           </a:extLst>
         </p:spPr>
@@ -10595,7 +11199,7 @@
           </a:ln>
           <a:extLst>
             <a:ext uri="{C572A759-6A51-4108-AA02-DFA0A04FC94B}">
-              <ma14:wrappingTextBoxFlag xmlns:m="http://schemas.openxmlformats.org/officeDocument/2006/math" xmlns:a14="http://schemas.microsoft.com/office/drawing/2010/main" xmlns:ma14="http://schemas.microsoft.com/office/mac/drawingml/2011/main" xmlns="" val="1"/>
+              <ma14:wrappingTextBoxFlag xmlns="" xmlns:ma14="http://schemas.microsoft.com/office/mac/drawingml/2011/main" xmlns:a14="http://schemas.microsoft.com/office/drawing/2010/main" xmlns:m="http://schemas.openxmlformats.org/officeDocument/2006/math" val="1"/>
             </a:ext>
           </a:extLst>
         </p:spPr>
@@ -10713,7 +11317,7 @@
           </a:ln>
           <a:extLst>
             <a:ext uri="{C572A759-6A51-4108-AA02-DFA0A04FC94B}">
-              <ma14:wrappingTextBoxFlag xmlns:m="http://schemas.openxmlformats.org/officeDocument/2006/math" xmlns:a14="http://schemas.microsoft.com/office/drawing/2010/main" xmlns:ma14="http://schemas.microsoft.com/office/mac/drawingml/2011/main" xmlns="" val="1"/>
+              <ma14:wrappingTextBoxFlag xmlns="" xmlns:ma14="http://schemas.microsoft.com/office/mac/drawingml/2011/main" xmlns:a14="http://schemas.microsoft.com/office/drawing/2010/main" xmlns:m="http://schemas.openxmlformats.org/officeDocument/2006/math" val="1"/>
             </a:ext>
           </a:extLst>
         </p:spPr>
@@ -10763,7 +11367,7 @@
           </a:ln>
           <a:extLst>
             <a:ext uri="{C572A759-6A51-4108-AA02-DFA0A04FC94B}">
-              <ma14:wrappingTextBoxFlag xmlns:m="http://schemas.openxmlformats.org/officeDocument/2006/math" xmlns:a14="http://schemas.microsoft.com/office/drawing/2010/main" xmlns:ma14="http://schemas.microsoft.com/office/mac/drawingml/2011/main" xmlns="" val="1"/>
+              <ma14:wrappingTextBoxFlag xmlns="" xmlns:ma14="http://schemas.microsoft.com/office/mac/drawingml/2011/main" xmlns:a14="http://schemas.microsoft.com/office/drawing/2010/main" xmlns:m="http://schemas.openxmlformats.org/officeDocument/2006/math" val="1"/>
             </a:ext>
           </a:extLst>
         </p:spPr>
@@ -11083,7 +11687,7 @@
           </a:ln>
           <a:extLst>
             <a:ext uri="{C572A759-6A51-4108-AA02-DFA0A04FC94B}">
-              <ma14:wrappingTextBoxFlag xmlns:m="http://schemas.openxmlformats.org/officeDocument/2006/math" xmlns:a14="http://schemas.microsoft.com/office/drawing/2010/main" xmlns:ma14="http://schemas.microsoft.com/office/mac/drawingml/2011/main" xmlns="" val="1"/>
+              <ma14:wrappingTextBoxFlag xmlns="" xmlns:ma14="http://schemas.microsoft.com/office/mac/drawingml/2011/main" xmlns:a14="http://schemas.microsoft.com/office/drawing/2010/main" xmlns:m="http://schemas.openxmlformats.org/officeDocument/2006/math" val="1"/>
             </a:ext>
           </a:extLst>
         </p:spPr>
@@ -11201,7 +11805,7 @@
           </a:ln>
           <a:extLst>
             <a:ext uri="{C572A759-6A51-4108-AA02-DFA0A04FC94B}">
-              <ma14:wrappingTextBoxFlag xmlns:m="http://schemas.openxmlformats.org/officeDocument/2006/math" xmlns:a14="http://schemas.microsoft.com/office/drawing/2010/main" xmlns:ma14="http://schemas.microsoft.com/office/mac/drawingml/2011/main" xmlns="" val="1"/>
+              <ma14:wrappingTextBoxFlag xmlns="" xmlns:ma14="http://schemas.microsoft.com/office/mac/drawingml/2011/main" xmlns:a14="http://schemas.microsoft.com/office/drawing/2010/main" xmlns:m="http://schemas.openxmlformats.org/officeDocument/2006/math" val="1"/>
             </a:ext>
           </a:extLst>
         </p:spPr>
@@ -11391,7 +11995,7 @@
           </a:ln>
           <a:extLst>
             <a:ext uri="{C572A759-6A51-4108-AA02-DFA0A04FC94B}">
-              <ma14:wrappingTextBoxFlag xmlns:m="http://schemas.openxmlformats.org/officeDocument/2006/math" xmlns:a14="http://schemas.microsoft.com/office/drawing/2010/main" xmlns:ma14="http://schemas.microsoft.com/office/mac/drawingml/2011/main" xmlns="" val="1"/>
+              <ma14:wrappingTextBoxFlag xmlns="" xmlns:ma14="http://schemas.microsoft.com/office/mac/drawingml/2011/main" xmlns:a14="http://schemas.microsoft.com/office/drawing/2010/main" xmlns:m="http://schemas.openxmlformats.org/officeDocument/2006/math" val="1"/>
             </a:ext>
           </a:extLst>
         </p:spPr>
@@ -11431,7 +12035,7 @@
           </a:ln>
           <a:extLst>
             <a:ext uri="{C572A759-6A51-4108-AA02-DFA0A04FC94B}">
-              <ma14:wrappingTextBoxFlag xmlns:m="http://schemas.openxmlformats.org/officeDocument/2006/math" xmlns:a14="http://schemas.microsoft.com/office/drawing/2010/main" xmlns:ma14="http://schemas.microsoft.com/office/mac/drawingml/2011/main" xmlns="" val="1"/>
+              <ma14:wrappingTextBoxFlag xmlns="" xmlns:ma14="http://schemas.microsoft.com/office/mac/drawingml/2011/main" xmlns:a14="http://schemas.microsoft.com/office/drawing/2010/main" xmlns:m="http://schemas.openxmlformats.org/officeDocument/2006/math" val="1"/>
             </a:ext>
           </a:extLst>
         </p:spPr>
@@ -12334,7 +12938,7 @@
           </a:ln>
           <a:extLst>
             <a:ext uri="{C572A759-6A51-4108-AA02-DFA0A04FC94B}">
-              <ma14:wrappingTextBoxFlag xmlns:m="http://schemas.openxmlformats.org/officeDocument/2006/math" xmlns:a14="http://schemas.microsoft.com/office/drawing/2010/main" xmlns:ma14="http://schemas.microsoft.com/office/mac/drawingml/2011/main" xmlns="" val="1"/>
+              <ma14:wrappingTextBoxFlag xmlns="" xmlns:ma14="http://schemas.microsoft.com/office/mac/drawingml/2011/main" xmlns:a14="http://schemas.microsoft.com/office/drawing/2010/main" xmlns:m="http://schemas.openxmlformats.org/officeDocument/2006/math" val="1"/>
             </a:ext>
           </a:extLst>
         </p:spPr>
@@ -12374,7 +12978,7 @@
           </a:ln>
           <a:extLst>
             <a:ext uri="{C572A759-6A51-4108-AA02-DFA0A04FC94B}">
-              <ma14:wrappingTextBoxFlag xmlns:m="http://schemas.openxmlformats.org/officeDocument/2006/math" xmlns:a14="http://schemas.microsoft.com/office/drawing/2010/main" xmlns:ma14="http://schemas.microsoft.com/office/mac/drawingml/2011/main" xmlns="" val="1"/>
+              <ma14:wrappingTextBoxFlag xmlns="" xmlns:ma14="http://schemas.microsoft.com/office/mac/drawingml/2011/main" xmlns:a14="http://schemas.microsoft.com/office/drawing/2010/main" xmlns:m="http://schemas.openxmlformats.org/officeDocument/2006/math" val="1"/>
             </a:ext>
           </a:extLst>
         </p:spPr>
@@ -13279,7 +13883,7 @@
           </a:ln>
           <a:extLst>
             <a:ext uri="{C572A759-6A51-4108-AA02-DFA0A04FC94B}">
-              <ma14:wrappingTextBoxFlag xmlns:m="http://schemas.openxmlformats.org/officeDocument/2006/math" xmlns:a14="http://schemas.microsoft.com/office/drawing/2010/main" xmlns:ma14="http://schemas.microsoft.com/office/mac/drawingml/2011/main" xmlns="" val="1"/>
+              <ma14:wrappingTextBoxFlag xmlns="" xmlns:ma14="http://schemas.microsoft.com/office/mac/drawingml/2011/main" xmlns:a14="http://schemas.microsoft.com/office/drawing/2010/main" xmlns:m="http://schemas.openxmlformats.org/officeDocument/2006/math" val="1"/>
             </a:ext>
           </a:extLst>
         </p:spPr>
@@ -13319,7 +13923,7 @@
           </a:ln>
           <a:extLst>
             <a:ext uri="{C572A759-6A51-4108-AA02-DFA0A04FC94B}">
-              <ma14:wrappingTextBoxFlag xmlns:m="http://schemas.openxmlformats.org/officeDocument/2006/math" xmlns:a14="http://schemas.microsoft.com/office/drawing/2010/main" xmlns:ma14="http://schemas.microsoft.com/office/mac/drawingml/2011/main" xmlns="" val="1"/>
+              <ma14:wrappingTextBoxFlag xmlns="" xmlns:ma14="http://schemas.microsoft.com/office/mac/drawingml/2011/main" xmlns:a14="http://schemas.microsoft.com/office/drawing/2010/main" xmlns:m="http://schemas.openxmlformats.org/officeDocument/2006/math" val="1"/>
             </a:ext>
           </a:extLst>
         </p:spPr>
@@ -14316,7 +14920,7 @@
           </a:ln>
           <a:extLst>
             <a:ext uri="{C572A759-6A51-4108-AA02-DFA0A04FC94B}">
-              <ma14:wrappingTextBoxFlag xmlns:m="http://schemas.openxmlformats.org/officeDocument/2006/math" xmlns:a14="http://schemas.microsoft.com/office/drawing/2010/main" xmlns:ma14="http://schemas.microsoft.com/office/mac/drawingml/2011/main" xmlns="" val="1"/>
+              <ma14:wrappingTextBoxFlag xmlns="" xmlns:ma14="http://schemas.microsoft.com/office/mac/drawingml/2011/main" xmlns:a14="http://schemas.microsoft.com/office/drawing/2010/main" xmlns:m="http://schemas.openxmlformats.org/officeDocument/2006/math" val="1"/>
             </a:ext>
           </a:extLst>
         </p:spPr>
@@ -14391,6 +14995,538 @@
         <p:cNvPr id="1" name="">
           <a:extLst>
             <a:ext uri="{FF2B5EF4-FFF2-40B4-BE49-F238E27FC236}">
+              <a16:creationId xmlns:a16="http://schemas.microsoft.com/office/drawing/2014/main" id="{0493754E-F329-12FE-2EC3-5CA42947A3A4}"/>
+            </a:ext>
+          </a:extLst>
+        </p:cNvPr>
+        <p:cNvGrpSpPr/>
+        <p:nvPr/>
+      </p:nvGrpSpPr>
+      <p:grpSpPr>
+        <a:xfrm>
+          <a:off x="0" y="0"/>
+          <a:ext cx="0" cy="0"/>
+          <a:chOff x="0" y="0"/>
+          <a:chExt cx="0" cy="0"/>
+        </a:xfrm>
+      </p:grpSpPr>
+      <p:sp>
+        <p:nvSpPr>
+          <p:cNvPr id="6" name="Title 1">
+            <a:extLst>
+              <a:ext uri="{FF2B5EF4-FFF2-40B4-BE49-F238E27FC236}">
+                <a16:creationId xmlns:a16="http://schemas.microsoft.com/office/drawing/2014/main" id="{E015503E-6998-4268-C1F5-6AFA2187BC5F}"/>
+              </a:ext>
+            </a:extLst>
+          </p:cNvPr>
+          <p:cNvSpPr>
+            <a:spLocks noGrp="1"/>
+          </p:cNvSpPr>
+          <p:nvPr>
+            <p:ph type="title"/>
+          </p:nvPr>
+        </p:nvSpPr>
+        <p:spPr>
+          <a:xfrm>
+            <a:off x="1006004" y="1735386"/>
+            <a:ext cx="7671213" cy="1207199"/>
+          </a:xfrm>
+        </p:spPr>
+        <p:txBody>
+          <a:bodyPr/>
+          <a:lstStyle/>
+          <a:p>
+            <a:r>
+              <a:rPr lang="en-US" dirty="0"/>
+              <a:t>Bridge</a:t>
+            </a:r>
+          </a:p>
+        </p:txBody>
+      </p:sp>
+      <p:sp>
+        <p:nvSpPr>
+          <p:cNvPr id="3" name="TextBox 2">
+            <a:extLst>
+              <a:ext uri="{FF2B5EF4-FFF2-40B4-BE49-F238E27FC236}">
+                <a16:creationId xmlns:a16="http://schemas.microsoft.com/office/drawing/2014/main" id="{1626B9A1-5239-6F2E-FE25-89AA3967ED7B}"/>
+              </a:ext>
+            </a:extLst>
+          </p:cNvPr>
+          <p:cNvSpPr txBox="1"/>
+          <p:nvPr/>
+        </p:nvSpPr>
+        <p:spPr>
+          <a:xfrm>
+            <a:off x="1006004" y="2707833"/>
+            <a:ext cx="13811965" cy="1402948"/>
+          </a:xfrm>
+          <a:prstGeom prst="rect">
+            <a:avLst/>
+          </a:prstGeom>
+        </p:spPr>
+        <p:style>
+          <a:lnRef idx="0">
+            <a:scrgbClr r="0" g="0" b="0"/>
+          </a:lnRef>
+          <a:fillRef idx="0">
+            <a:scrgbClr r="0" g="0" b="0"/>
+          </a:fillRef>
+          <a:effectRef idx="0">
+            <a:scrgbClr r="0" g="0" b="0"/>
+          </a:effectRef>
+          <a:fontRef idx="none"/>
+        </p:style>
+        <p:txBody>
+          <a:bodyPr rot="0" spcFirstLastPara="1" vertOverflow="overflow" horzOverflow="overflow" vert="horz" wrap="square" lIns="50800" tIns="50800" rIns="50800" bIns="50800" numCol="1" spcCol="38100" rtlCol="0" anchor="ctr">
+            <a:spAutoFit/>
+          </a:bodyPr>
+          <a:lstStyle/>
+          <a:p>
+            <a:pPr marL="0" marR="0" indent="0" algn="l" defTabSz="821531" rtl="0" fontAlgn="auto" latinLnBrk="0" hangingPunct="0">
+              <a:lnSpc>
+                <a:spcPct val="120000"/>
+              </a:lnSpc>
+              <a:spcBef>
+                <a:spcPts val="1500"/>
+              </a:spcBef>
+              <a:spcAft>
+                <a:spcPts val="0"/>
+              </a:spcAft>
+              <a:buClrTx/>
+              <a:buSzTx/>
+              <a:buFontTx/>
+              <a:buNone/>
+              <a:tabLst/>
+            </a:pPr>
+            <a:r>
+              <a:rPr lang="en-US" sz="6000" dirty="0">
+                <a:solidFill>
+                  <a:schemeClr val="bg2"/>
+                </a:solidFill>
+              </a:rPr>
+              <a:t>Real life application context:</a:t>
+            </a:r>
+          </a:p>
+        </p:txBody>
+      </p:sp>
+      <p:sp>
+        <p:nvSpPr>
+          <p:cNvPr id="2" name="TextBox 1">
+            <a:extLst>
+              <a:ext uri="{FF2B5EF4-FFF2-40B4-BE49-F238E27FC236}">
+                <a16:creationId xmlns:a16="http://schemas.microsoft.com/office/drawing/2014/main" id="{3D890230-94CE-6452-273D-D57E6FA9EF88}"/>
+              </a:ext>
+            </a:extLst>
+          </p:cNvPr>
+          <p:cNvSpPr txBox="1"/>
+          <p:nvPr/>
+        </p:nvSpPr>
+        <p:spPr>
+          <a:xfrm>
+            <a:off x="1006004" y="4848476"/>
+            <a:ext cx="22371992" cy="4019049"/>
+          </a:xfrm>
+          <a:prstGeom prst="rect">
+            <a:avLst/>
+          </a:prstGeom>
+          <a:noFill/>
+          <a:ln w="12700" cap="flat">
+            <a:noFill/>
+            <a:miter lim="400000"/>
+          </a:ln>
+          <a:effectLst/>
+          <a:sp3d/>
+        </p:spPr>
+        <p:style>
+          <a:lnRef idx="0">
+            <a:scrgbClr r="0" g="0" b="0"/>
+          </a:lnRef>
+          <a:fillRef idx="0">
+            <a:scrgbClr r="0" g="0" b="0"/>
+          </a:fillRef>
+          <a:effectRef idx="0">
+            <a:scrgbClr r="0" g="0" b="0"/>
+          </a:effectRef>
+          <a:fontRef idx="none"/>
+        </p:style>
+        <p:txBody>
+          <a:bodyPr rot="0" spcFirstLastPara="1" vertOverflow="overflow" horzOverflow="overflow" vert="horz" wrap="square" lIns="50800" tIns="50800" rIns="50800" bIns="50800" numCol="1" spcCol="38100" rtlCol="0" anchor="ctr">
+            <a:spAutoFit/>
+          </a:bodyPr>
+          <a:lstStyle/>
+          <a:p>
+            <a:pPr marL="457200" marR="0" indent="-457200" algn="l" defTabSz="821531" rtl="0" fontAlgn="auto" latinLnBrk="0" hangingPunct="0">
+              <a:lnSpc>
+                <a:spcPct val="120000"/>
+              </a:lnSpc>
+              <a:spcBef>
+                <a:spcPts val="1500"/>
+              </a:spcBef>
+              <a:spcAft>
+                <a:spcPts val="0"/>
+              </a:spcAft>
+              <a:buClrTx/>
+              <a:buSzTx/>
+              <a:buFont typeface="Arial" panose="020B0604020202020204" pitchFamily="34" charset="0"/>
+              <a:buChar char="•"/>
+              <a:tabLst/>
+            </a:pPr>
+            <a:r>
+              <a:rPr kumimoji="0" lang="en-US" sz="3200" b="0" i="0" u="none" strike="noStrike" cap="none" spc="0" normalizeH="0" baseline="0" dirty="0">
+                <a:ln>
+                  <a:noFill/>
+                </a:ln>
+                <a:solidFill>
+                  <a:schemeClr val="bg2"/>
+                </a:solidFill>
+                <a:effectLst/>
+                <a:uFillTx/>
+                <a:latin typeface="+mn-lt"/>
+                <a:ea typeface="+mn-ea"/>
+                <a:cs typeface="+mn-cs"/>
+                <a:sym typeface="Poppins Regular"/>
+              </a:rPr>
+              <a:t>A medical booth for remote consultations equipped with medical devices for performing various </a:t>
+            </a:r>
+          </a:p>
+          <a:p>
+            <a:pPr marL="0" marR="0" indent="0" algn="l" defTabSz="821531" rtl="0" fontAlgn="auto" latinLnBrk="0" hangingPunct="0">
+              <a:lnSpc>
+                <a:spcPct val="120000"/>
+              </a:lnSpc>
+              <a:spcBef>
+                <a:spcPts val="1500"/>
+              </a:spcBef>
+              <a:spcAft>
+                <a:spcPts val="0"/>
+              </a:spcAft>
+              <a:buClrTx/>
+              <a:buSzTx/>
+              <a:buFontTx/>
+              <a:buNone/>
+              <a:tabLst/>
+            </a:pPr>
+            <a:r>
+              <a:rPr kumimoji="0" lang="en-US" sz="3200" b="0" i="0" u="none" strike="noStrike" cap="none" spc="0" normalizeH="0" baseline="0" dirty="0">
+                <a:ln>
+                  <a:noFill/>
+                </a:ln>
+                <a:solidFill>
+                  <a:schemeClr val="bg2"/>
+                </a:solidFill>
+                <a:effectLst/>
+                <a:uFillTx/>
+                <a:latin typeface="+mn-lt"/>
+                <a:ea typeface="+mn-ea"/>
+                <a:cs typeface="+mn-cs"/>
+                <a:sym typeface="Poppins Regular"/>
+              </a:rPr>
+              <a:t>measurements (blood pressure, oximetry, weight).</a:t>
+            </a:r>
+          </a:p>
+          <a:p>
+            <a:pPr marL="457200" marR="0" indent="-457200" algn="l" defTabSz="821531" rtl="0" fontAlgn="auto" latinLnBrk="0" hangingPunct="0">
+              <a:lnSpc>
+                <a:spcPct val="120000"/>
+              </a:lnSpc>
+              <a:spcBef>
+                <a:spcPts val="1500"/>
+              </a:spcBef>
+              <a:spcAft>
+                <a:spcPts val="0"/>
+              </a:spcAft>
+              <a:buClrTx/>
+              <a:buSzTx/>
+              <a:buFont typeface="Arial" panose="020B0604020202020204" pitchFamily="34" charset="0"/>
+              <a:buChar char="•"/>
+              <a:tabLst/>
+            </a:pPr>
+            <a:r>
+              <a:rPr kumimoji="0" lang="en-US" sz="3200" b="0" i="0" u="none" strike="noStrike" cap="none" spc="0" normalizeH="0" baseline="0" dirty="0">
+                <a:ln>
+                  <a:noFill/>
+                </a:ln>
+                <a:solidFill>
+                  <a:schemeClr val="bg2"/>
+                </a:solidFill>
+                <a:effectLst/>
+                <a:uFillTx/>
+                <a:latin typeface="+mn-lt"/>
+                <a:ea typeface="+mn-ea"/>
+                <a:cs typeface="+mn-cs"/>
+                <a:sym typeface="Poppins Regular"/>
+              </a:rPr>
+              <a:t>The booth communicates with each device using a C# driver (which implements the </a:t>
+            </a:r>
+          </a:p>
+          <a:p>
+            <a:pPr marL="0" marR="0" indent="0" algn="l" defTabSz="821531" rtl="0" fontAlgn="auto" latinLnBrk="0" hangingPunct="0">
+              <a:lnSpc>
+                <a:spcPct val="120000"/>
+              </a:lnSpc>
+              <a:spcBef>
+                <a:spcPts val="1500"/>
+              </a:spcBef>
+              <a:spcAft>
+                <a:spcPts val="0"/>
+              </a:spcAft>
+              <a:buClrTx/>
+              <a:buSzTx/>
+              <a:buFontTx/>
+              <a:buNone/>
+              <a:tabLst/>
+            </a:pPr>
+            <a:r>
+              <a:rPr kumimoji="0" lang="en-US" sz="3200" b="0" i="0" u="none" strike="noStrike" cap="none" spc="0" normalizeH="0" baseline="0" dirty="0">
+                <a:ln>
+                  <a:noFill/>
+                </a:ln>
+                <a:solidFill>
+                  <a:schemeClr val="bg2"/>
+                </a:solidFill>
+                <a:effectLst/>
+                <a:uFillTx/>
+                <a:latin typeface="+mn-lt"/>
+                <a:ea typeface="+mn-ea"/>
+                <a:cs typeface="+mn-cs"/>
+                <a:sym typeface="Poppins Regular"/>
+              </a:rPr>
+              <a:t>communication protocol provided by manufacturer).</a:t>
+            </a:r>
+          </a:p>
+          <a:p>
+            <a:pPr marL="457200" indent="-457200" defTabSz="821531" hangingPunct="0">
+              <a:lnSpc>
+                <a:spcPct val="120000"/>
+              </a:lnSpc>
+              <a:spcBef>
+                <a:spcPts val="1500"/>
+              </a:spcBef>
+              <a:buFont typeface="Arial" panose="020B0604020202020204" pitchFamily="34" charset="0"/>
+              <a:buChar char="•"/>
+            </a:pPr>
+            <a:r>
+              <a:rPr kumimoji="0" lang="en-US" sz="3200" b="0" i="0" u="none" strike="noStrike" cap="none" spc="0" normalizeH="0" baseline="0" dirty="0">
+                <a:ln>
+                  <a:noFill/>
+                </a:ln>
+                <a:solidFill>
+                  <a:schemeClr val="bg2"/>
+                </a:solidFill>
+                <a:effectLst/>
+                <a:uFillTx/>
+                <a:latin typeface="+mn-lt"/>
+                <a:ea typeface="+mn-ea"/>
+                <a:cs typeface="+mn-cs"/>
+                <a:sym typeface="Poppins Regular"/>
+              </a:rPr>
+              <a:t>The problem: </a:t>
+            </a:r>
+            <a:r>
+              <a:rPr lang="en-US" sz="3200" dirty="0">
+                <a:solidFill>
+                  <a:schemeClr val="bg2"/>
+                </a:solidFill>
+                <a:sym typeface="Poppins Regular"/>
+              </a:rPr>
+              <a:t>The drivers were evolving in different dimensions.</a:t>
+            </a:r>
+          </a:p>
+        </p:txBody>
+      </p:sp>
+    </p:spTree>
+    <p:extLst>
+      <p:ext uri="{BB962C8B-B14F-4D97-AF65-F5344CB8AC3E}">
+        <p14:creationId xmlns:p14="http://schemas.microsoft.com/office/powerpoint/2010/main" val="3767381252"/>
+      </p:ext>
+    </p:extLst>
+  </p:cSld>
+  <p:clrMapOvr>
+    <a:masterClrMapping/>
+  </p:clrMapOvr>
+  <p:transition spd="med"/>
+</p:sld>
+</file>
+
+<file path=ppt/slides/slide11.xml><?xml version="1.0" encoding="utf-8"?>
+<p:sld xmlns:a="http://schemas.openxmlformats.org/drawingml/2006/main" xmlns:r="http://schemas.openxmlformats.org/officeDocument/2006/relationships" xmlns:p="http://schemas.openxmlformats.org/presentationml/2006/main">
+  <p:cSld>
+    <p:spTree>
+      <p:nvGrpSpPr>
+        <p:cNvPr id="1" name="">
+          <a:extLst>
+            <a:ext uri="{FF2B5EF4-FFF2-40B4-BE49-F238E27FC236}">
+              <a16:creationId xmlns:a16="http://schemas.microsoft.com/office/drawing/2014/main" id="{8E3C7DE0-7813-7B38-8A01-827AB2DA94ED}"/>
+            </a:ext>
+          </a:extLst>
+        </p:cNvPr>
+        <p:cNvGrpSpPr/>
+        <p:nvPr/>
+      </p:nvGrpSpPr>
+      <p:grpSpPr>
+        <a:xfrm>
+          <a:off x="0" y="0"/>
+          <a:ext cx="0" cy="0"/>
+          <a:chOff x="0" y="0"/>
+          <a:chExt cx="0" cy="0"/>
+        </a:xfrm>
+      </p:grpSpPr>
+      <p:sp>
+        <p:nvSpPr>
+          <p:cNvPr id="6" name="Title 1">
+            <a:extLst>
+              <a:ext uri="{FF2B5EF4-FFF2-40B4-BE49-F238E27FC236}">
+                <a16:creationId xmlns:a16="http://schemas.microsoft.com/office/drawing/2014/main" id="{EA9FF163-2E35-9F16-6224-D4C5E670A89F}"/>
+              </a:ext>
+            </a:extLst>
+          </p:cNvPr>
+          <p:cNvSpPr>
+            <a:spLocks noGrp="1"/>
+          </p:cNvSpPr>
+          <p:nvPr>
+            <p:ph type="title"/>
+          </p:nvPr>
+        </p:nvSpPr>
+        <p:spPr>
+          <a:xfrm>
+            <a:off x="1006004" y="1626319"/>
+            <a:ext cx="7001174" cy="1402948"/>
+          </a:xfrm>
+        </p:spPr>
+        <p:txBody>
+          <a:bodyPr/>
+          <a:lstStyle/>
+          <a:p>
+            <a:r>
+              <a:rPr lang="en-US" dirty="0"/>
+              <a:t>Bridge</a:t>
+            </a:r>
+          </a:p>
+        </p:txBody>
+      </p:sp>
+      <p:sp>
+        <p:nvSpPr>
+          <p:cNvPr id="3" name="TextBox 2">
+            <a:extLst>
+              <a:ext uri="{FF2B5EF4-FFF2-40B4-BE49-F238E27FC236}">
+                <a16:creationId xmlns:a16="http://schemas.microsoft.com/office/drawing/2014/main" id="{708520F1-5CB1-3E72-1463-566343371991}"/>
+              </a:ext>
+            </a:extLst>
+          </p:cNvPr>
+          <p:cNvSpPr txBox="1"/>
+          <p:nvPr/>
+        </p:nvSpPr>
+        <p:spPr>
+          <a:xfrm>
+            <a:off x="1006004" y="2707833"/>
+            <a:ext cx="13811965" cy="1402948"/>
+          </a:xfrm>
+          <a:prstGeom prst="rect">
+            <a:avLst/>
+          </a:prstGeom>
+        </p:spPr>
+        <p:style>
+          <a:lnRef idx="0">
+            <a:scrgbClr r="0" g="0" b="0"/>
+          </a:lnRef>
+          <a:fillRef idx="0">
+            <a:scrgbClr r="0" g="0" b="0"/>
+          </a:fillRef>
+          <a:effectRef idx="0">
+            <a:scrgbClr r="0" g="0" b="0"/>
+          </a:effectRef>
+          <a:fontRef idx="none"/>
+        </p:style>
+        <p:txBody>
+          <a:bodyPr rot="0" spcFirstLastPara="1" vertOverflow="overflow" horzOverflow="overflow" vert="horz" wrap="square" lIns="50800" tIns="50800" rIns="50800" bIns="50800" numCol="1" spcCol="38100" rtlCol="0" anchor="ctr">
+            <a:spAutoFit/>
+          </a:bodyPr>
+          <a:lstStyle/>
+          <a:p>
+            <a:pPr marL="0" marR="0" indent="0" algn="l" defTabSz="821531" rtl="0" fontAlgn="auto" latinLnBrk="0" hangingPunct="0">
+              <a:lnSpc>
+                <a:spcPct val="120000"/>
+              </a:lnSpc>
+              <a:spcBef>
+                <a:spcPts val="1500"/>
+              </a:spcBef>
+              <a:spcAft>
+                <a:spcPts val="0"/>
+              </a:spcAft>
+              <a:buClrTx/>
+              <a:buSzTx/>
+              <a:buFontTx/>
+              <a:buNone/>
+              <a:tabLst/>
+            </a:pPr>
+            <a:r>
+              <a:rPr lang="en-US" sz="6000" dirty="0">
+                <a:solidFill>
+                  <a:schemeClr val="bg2"/>
+                </a:solidFill>
+              </a:rPr>
+              <a:t>The problem</a:t>
+            </a:r>
+          </a:p>
+        </p:txBody>
+      </p:sp>
+      <p:pic>
+        <p:nvPicPr>
+          <p:cNvPr id="10" name="Picture Placeholder 7" descr="A diagram of a device&#10;&#10;Description automatically generated">
+            <a:extLst>
+              <a:ext uri="{FF2B5EF4-FFF2-40B4-BE49-F238E27FC236}">
+                <a16:creationId xmlns:a16="http://schemas.microsoft.com/office/drawing/2014/main" id="{287354BD-7291-E8E8-7CC7-8E1DB2133063}"/>
+              </a:ext>
+            </a:extLst>
+          </p:cNvPr>
+          <p:cNvPicPr>
+            <a:picLocks noChangeAspect="1"/>
+          </p:cNvPicPr>
+          <p:nvPr/>
+        </p:nvPicPr>
+        <p:blipFill>
+          <a:blip r:embed="rId3">
+            <a:extLst>
+              <a:ext uri="{28A0092B-C50C-407E-A947-70E740481C1C}">
+                <a14:useLocalDpi xmlns:a14="http://schemas.microsoft.com/office/drawing/2010/main" val="0"/>
+              </a:ext>
+            </a:extLst>
+          </a:blip>
+          <a:srcRect l="-1744" t="-1498" r="-951" b="-2111"/>
+          <a:stretch/>
+        </p:blipFill>
+        <p:spPr>
+          <a:xfrm>
+            <a:off x="4516284" y="4605314"/>
+            <a:ext cx="15351431" cy="8660230"/>
+          </a:xfrm>
+          <a:prstGeom prst="rect">
+            <a:avLst/>
+          </a:prstGeom>
+        </p:spPr>
+      </p:pic>
+    </p:spTree>
+    <p:extLst>
+      <p:ext uri="{BB962C8B-B14F-4D97-AF65-F5344CB8AC3E}">
+        <p14:creationId xmlns:p14="http://schemas.microsoft.com/office/powerpoint/2010/main" val="3640432184"/>
+      </p:ext>
+    </p:extLst>
+  </p:cSld>
+  <p:clrMapOvr>
+    <a:masterClrMapping/>
+  </p:clrMapOvr>
+  <p:transition spd="med"/>
+</p:sld>
+</file>
+
+<file path=ppt/slides/slide12.xml><?xml version="1.0" encoding="utf-8"?>
+<p:sld xmlns:a="http://schemas.openxmlformats.org/drawingml/2006/main" xmlns:r="http://schemas.openxmlformats.org/officeDocument/2006/relationships" xmlns:p="http://schemas.openxmlformats.org/presentationml/2006/main">
+  <p:cSld>
+    <p:spTree>
+      <p:nvGrpSpPr>
+        <p:cNvPr id="1" name="">
+          <a:extLst>
+            <a:ext uri="{FF2B5EF4-FFF2-40B4-BE49-F238E27FC236}">
               <a16:creationId xmlns:a16="http://schemas.microsoft.com/office/drawing/2014/main" id="{C526FECF-7943-77B5-05C5-08DAAA6C6730}"/>
             </a:ext>
           </a:extLst>
@@ -14424,8 +15560,8 @@
         </p:nvSpPr>
         <p:spPr>
           <a:xfrm>
-            <a:off x="1006004" y="1255829"/>
-            <a:ext cx="21120232" cy="1452004"/>
+            <a:off x="1006004" y="1566590"/>
+            <a:ext cx="9546666" cy="1402948"/>
           </a:xfrm>
         </p:spPr>
         <p:txBody>
@@ -14671,7 +15807,7 @@
 </p:sld>
 </file>
 
-<file path=ppt/slides/slide11.xml><?xml version="1.0" encoding="utf-8"?>
+<file path=ppt/slides/slide13.xml><?xml version="1.0" encoding="utf-8"?>
 <p:sld xmlns:a="http://schemas.openxmlformats.org/drawingml/2006/main" xmlns:r="http://schemas.openxmlformats.org/officeDocument/2006/relationships" xmlns:p="http://schemas.openxmlformats.org/presentationml/2006/main">
   <p:cSld>
     <p:spTree>
@@ -14712,8 +15848,8 @@
         </p:nvSpPr>
         <p:spPr>
           <a:xfrm>
-            <a:off x="1006004" y="1255829"/>
-            <a:ext cx="21120232" cy="1452004"/>
+            <a:off x="1006004" y="1508720"/>
+            <a:ext cx="6531618" cy="1402948"/>
           </a:xfrm>
         </p:spPr>
         <p:txBody>
@@ -14807,8 +15943,8 @@
         </p:nvSpPr>
         <p:spPr>
           <a:xfrm>
-            <a:off x="1006004" y="4971883"/>
-            <a:ext cx="19927572" cy="885884"/>
+            <a:off x="1006004" y="4898017"/>
+            <a:ext cx="19927572" cy="1033616"/>
           </a:xfrm>
           <a:prstGeom prst="rect">
             <a:avLst/>
@@ -14849,7 +15985,7 @@
               <a:tabLst/>
             </a:pPr>
             <a:r>
-              <a:rPr kumimoji="0" lang="en-US" sz="3200" b="0" i="0" u="none" strike="noStrike" cap="none" spc="0" normalizeH="0" baseline="0" dirty="0">
+              <a:rPr kumimoji="0" lang="en-US" sz="4000" b="0" i="0" u="none" strike="noStrike" cap="none" spc="0" normalizeH="0" baseline="0" dirty="0">
                 <a:ln>
                   <a:noFill/>
                 </a:ln>
@@ -14862,9 +15998,24 @@
                 <a:ea typeface="+mn-ea"/>
                 <a:cs typeface="+mn-cs"/>
                 <a:sym typeface="Poppins Regular"/>
+                <a:hlinkClick r:id="rId3"/>
               </a:rPr>
               <a:t>https://github.com/Iamsdl/Endava-DesignPatterns/tree/main/Bridge</a:t>
             </a:r>
+            <a:endParaRPr kumimoji="0" lang="en-US" sz="4000" b="0" i="0" u="none" strike="noStrike" cap="none" spc="0" normalizeH="0" baseline="0" dirty="0">
+              <a:ln>
+                <a:noFill/>
+              </a:ln>
+              <a:solidFill>
+                <a:schemeClr val="bg2"/>
+              </a:solidFill>
+              <a:effectLst/>
+              <a:uFillTx/>
+              <a:latin typeface="+mn-lt"/>
+              <a:ea typeface="+mn-ea"/>
+              <a:cs typeface="+mn-cs"/>
+              <a:sym typeface="Poppins Regular"/>
+            </a:endParaRPr>
           </a:p>
         </p:txBody>
       </p:sp>
@@ -14882,7 +16033,7 @@
 </p:sld>
 </file>
 
-<file path=ppt/slides/slide12.xml><?xml version="1.0" encoding="utf-8"?>
+<file path=ppt/slides/slide14.xml><?xml version="1.0" encoding="utf-8"?>
 <p:sld xmlns:a="http://schemas.openxmlformats.org/drawingml/2006/main" xmlns:r="http://schemas.openxmlformats.org/officeDocument/2006/relationships" xmlns:p="http://schemas.openxmlformats.org/presentationml/2006/main">
   <p:cSld>
     <p:spTree>
@@ -14923,8 +16074,8 @@
         </p:nvSpPr>
         <p:spPr>
           <a:xfrm>
-            <a:off x="1006004" y="1255829"/>
-            <a:ext cx="21120232" cy="1452004"/>
+            <a:off x="1006004" y="1623485"/>
+            <a:ext cx="6531618" cy="1402948"/>
           </a:xfrm>
         </p:spPr>
         <p:txBody>
@@ -15330,7 +16481,7 @@
 </p:sld>
 </file>
 
-<file path=ppt/slides/slide13.xml><?xml version="1.0" encoding="utf-8"?>
+<file path=ppt/slides/slide15.xml><?xml version="1.0" encoding="utf-8"?>
 <p:sld xmlns:a="http://schemas.openxmlformats.org/drawingml/2006/main" xmlns:r="http://schemas.openxmlformats.org/officeDocument/2006/relationships" xmlns:p="http://schemas.openxmlformats.org/presentationml/2006/main">
   <p:cSld>
     <p:spTree>
@@ -15371,8 +16522,8 @@
         </p:nvSpPr>
         <p:spPr>
           <a:xfrm>
-            <a:off x="1006004" y="1255829"/>
-            <a:ext cx="21120232" cy="1452004"/>
+            <a:off x="1006004" y="1508720"/>
+            <a:ext cx="7890861" cy="1402948"/>
           </a:xfrm>
         </p:spPr>
         <p:txBody>
@@ -15715,7 +16866,7 @@
 </p:sld>
 </file>
 
-<file path=ppt/slides/slide14.xml><?xml version="1.0" encoding="utf-8"?>
+<file path=ppt/slides/slide16.xml><?xml version="1.0" encoding="utf-8"?>
 <p:sld xmlns:a="http://schemas.openxmlformats.org/drawingml/2006/main" xmlns:r="http://schemas.openxmlformats.org/officeDocument/2006/relationships" xmlns:p="http://schemas.openxmlformats.org/presentationml/2006/main">
   <p:cSld>
     <p:spTree>
@@ -15756,8 +16907,8 @@
         </p:nvSpPr>
         <p:spPr>
           <a:xfrm>
-            <a:off x="1006004" y="1255829"/>
-            <a:ext cx="21120232" cy="1452004"/>
+            <a:off x="1006004" y="1582860"/>
+            <a:ext cx="6086774" cy="1402948"/>
           </a:xfrm>
         </p:spPr>
         <p:txBody>
@@ -15887,7 +17038,7 @@
 </p:sld>
 </file>
 
-<file path=ppt/slides/slide15.xml><?xml version="1.0" encoding="utf-8"?>
+<file path=ppt/slides/slide17.xml><?xml version="1.0" encoding="utf-8"?>
 <p:sld xmlns:a="http://schemas.openxmlformats.org/drawingml/2006/main" xmlns:r="http://schemas.openxmlformats.org/officeDocument/2006/relationships" xmlns:p="http://schemas.openxmlformats.org/presentationml/2006/main">
   <p:cSld>
     <p:spTree>
@@ -15928,8 +17079,8 @@
         </p:nvSpPr>
         <p:spPr>
           <a:xfrm>
-            <a:off x="1006004" y="1255829"/>
-            <a:ext cx="21120232" cy="1452004"/>
+            <a:off x="1006004" y="1621728"/>
+            <a:ext cx="6729326" cy="1402948"/>
           </a:xfrm>
         </p:spPr>
         <p:txBody>
@@ -16410,7 +17561,7 @@
 </p:sld>
 </file>
 
-<file path=ppt/slides/slide16.xml><?xml version="1.0" encoding="utf-8"?>
+<file path=ppt/slides/slide18.xml><?xml version="1.0" encoding="utf-8"?>
 <p:sld xmlns:a="http://schemas.openxmlformats.org/drawingml/2006/main" xmlns:r="http://schemas.openxmlformats.org/officeDocument/2006/relationships" xmlns:p="http://schemas.openxmlformats.org/presentationml/2006/main">
   <p:cSld>
     <p:spTree>
@@ -16451,8 +17602,8 @@
         </p:nvSpPr>
         <p:spPr>
           <a:xfrm>
-            <a:off x="1006004" y="1255829"/>
-            <a:ext cx="21120232" cy="1452004"/>
+            <a:off x="1006004" y="1621728"/>
+            <a:ext cx="8340616" cy="1402948"/>
           </a:xfrm>
         </p:spPr>
         <p:txBody>
@@ -16844,7 +17995,7 @@
 </p:sld>
 </file>
 
-<file path=ppt/slides/slide17.xml><?xml version="1.0" encoding="utf-8"?>
+<file path=ppt/slides/slide19.xml><?xml version="1.0" encoding="utf-8"?>
 <p:sld xmlns:a="http://schemas.openxmlformats.org/drawingml/2006/main" xmlns:r="http://schemas.openxmlformats.org/officeDocument/2006/relationships" xmlns:p="http://schemas.openxmlformats.org/presentationml/2006/main">
   <p:cSld>
     <p:spTree>
@@ -16885,8 +18036,8 @@
         </p:nvSpPr>
         <p:spPr>
           <a:xfrm>
-            <a:off x="1006004" y="1255829"/>
-            <a:ext cx="21120232" cy="1452004"/>
+            <a:off x="1006004" y="1628666"/>
+            <a:ext cx="7668439" cy="1402948"/>
           </a:xfrm>
         </p:spPr>
         <p:txBody>
@@ -16980,8 +18131,8 @@
         </p:nvSpPr>
         <p:spPr>
           <a:xfrm>
-            <a:off x="1006004" y="4971883"/>
-            <a:ext cx="19927572" cy="885884"/>
+            <a:off x="1006004" y="4898017"/>
+            <a:ext cx="19927572" cy="1033616"/>
           </a:xfrm>
           <a:prstGeom prst="rect">
             <a:avLst/>
@@ -17022,7 +18173,7 @@
               <a:tabLst/>
             </a:pPr>
             <a:r>
-              <a:rPr kumimoji="0" lang="en-US" sz="3200" b="0" i="0" u="none" strike="noStrike" cap="none" spc="0" normalizeH="0" baseline="0" dirty="0">
+              <a:rPr kumimoji="0" lang="en-US" sz="4000" b="0" i="0" u="none" strike="noStrike" cap="none" spc="0" normalizeH="0" baseline="0" dirty="0">
                 <a:ln>
                   <a:noFill/>
                 </a:ln>
@@ -17035,9 +18186,24 @@
                 <a:ea typeface="+mn-ea"/>
                 <a:cs typeface="+mn-cs"/>
                 <a:sym typeface="Poppins Regular"/>
+                <a:hlinkClick r:id="rId3"/>
               </a:rPr>
               <a:t>https://github.com/Iamsdl/Endava-DesignPatterns/tree/main/Prototype</a:t>
             </a:r>
+            <a:endParaRPr kumimoji="0" lang="en-US" sz="4000" b="0" i="0" u="none" strike="noStrike" cap="none" spc="0" normalizeH="0" baseline="0" dirty="0">
+              <a:ln>
+                <a:noFill/>
+              </a:ln>
+              <a:solidFill>
+                <a:schemeClr val="bg2"/>
+              </a:solidFill>
+              <a:effectLst/>
+              <a:uFillTx/>
+              <a:latin typeface="+mn-lt"/>
+              <a:ea typeface="+mn-ea"/>
+              <a:cs typeface="+mn-cs"/>
+              <a:sym typeface="Poppins Regular"/>
+            </a:endParaRPr>
           </a:p>
         </p:txBody>
       </p:sp>
@@ -17090,8 +18256,8 @@
         </p:nvSpPr>
         <p:spPr>
           <a:xfrm>
-            <a:off x="1008184" y="1255829"/>
-            <a:ext cx="21115870" cy="1452004"/>
+            <a:off x="1357805" y="1593537"/>
+            <a:ext cx="6303384" cy="1679324"/>
           </a:xfrm>
         </p:spPr>
         <p:txBody>
@@ -17100,7 +18266,7 @@
           <a:p>
             <a:r>
               <a:rPr lang="en-US" dirty="0"/>
-              <a:t>Introduction</a:t>
+              <a:t>About me</a:t>
             </a:r>
           </a:p>
         </p:txBody>
@@ -17111,6 +18277,949 @@
             <a:extLst>
               <a:ext uri="{FF2B5EF4-FFF2-40B4-BE49-F238E27FC236}">
                 <a16:creationId xmlns:a16="http://schemas.microsoft.com/office/drawing/2014/main" id="{5245B22D-8072-6C69-AC79-EC4038178030}"/>
+              </a:ext>
+            </a:extLst>
+          </p:cNvPr>
+          <p:cNvSpPr txBox="1"/>
+          <p:nvPr/>
+        </p:nvSpPr>
+        <p:spPr>
+          <a:xfrm>
+            <a:off x="254421" y="8443685"/>
+            <a:ext cx="7641546" cy="2186240"/>
+          </a:xfrm>
+          <a:prstGeom prst="rect">
+            <a:avLst/>
+          </a:prstGeom>
+        </p:spPr>
+        <p:style>
+          <a:lnRef idx="0">
+            <a:scrgbClr r="0" g="0" b="0"/>
+          </a:lnRef>
+          <a:fillRef idx="0">
+            <a:scrgbClr r="0" g="0" b="0"/>
+          </a:fillRef>
+          <a:effectRef idx="0">
+            <a:scrgbClr r="0" g="0" b="0"/>
+          </a:effectRef>
+          <a:fontRef idx="none"/>
+        </p:style>
+        <p:txBody>
+          <a:bodyPr rot="0" spcFirstLastPara="1" vertOverflow="overflow" horzOverflow="overflow" vert="horz" wrap="square" lIns="50800" tIns="50800" rIns="50800" bIns="50800" numCol="1" spcCol="38100" rtlCol="0" anchor="ctr">
+            <a:spAutoFit/>
+          </a:bodyPr>
+          <a:lstStyle/>
+          <a:p>
+            <a:pPr marL="0" marR="0" indent="0" algn="ctr" defTabSz="821531" rtl="0" fontAlgn="auto" latinLnBrk="0" hangingPunct="0">
+              <a:lnSpc>
+                <a:spcPct val="120000"/>
+              </a:lnSpc>
+              <a:spcBef>
+                <a:spcPts val="1500"/>
+              </a:spcBef>
+              <a:spcAft>
+                <a:spcPts val="0"/>
+              </a:spcAft>
+              <a:buClrTx/>
+              <a:buSzTx/>
+              <a:buFontTx/>
+              <a:buNone/>
+              <a:tabLst/>
+            </a:pPr>
+            <a:r>
+              <a:rPr lang="en-US" sz="4800" dirty="0">
+                <a:solidFill>
+                  <a:schemeClr val="bg2"/>
+                </a:solidFill>
+              </a:rPr>
+              <a:t>Senior Developer</a:t>
+            </a:r>
+            <a:endParaRPr lang="en-US" sz="4400" dirty="0">
+              <a:solidFill>
+                <a:schemeClr val="bg2"/>
+              </a:solidFill>
+            </a:endParaRPr>
+          </a:p>
+          <a:p>
+            <a:pPr marL="0" marR="0" indent="0" algn="ctr" defTabSz="821531" rtl="0" fontAlgn="auto" latinLnBrk="0" hangingPunct="0">
+              <a:lnSpc>
+                <a:spcPct val="120000"/>
+              </a:lnSpc>
+              <a:spcBef>
+                <a:spcPts val="1500"/>
+              </a:spcBef>
+              <a:spcAft>
+                <a:spcPts val="0"/>
+              </a:spcAft>
+              <a:buClrTx/>
+              <a:buSzTx/>
+              <a:buFontTx/>
+              <a:buNone/>
+              <a:tabLst/>
+            </a:pPr>
+            <a:r>
+              <a:rPr lang="en-US" sz="4400" dirty="0">
+                <a:solidFill>
+                  <a:schemeClr val="bg2"/>
+                </a:solidFill>
+              </a:rPr>
+              <a:t>Daniel Schmidt</a:t>
+            </a:r>
+          </a:p>
+        </p:txBody>
+      </p:sp>
+      <p:sp>
+        <p:nvSpPr>
+          <p:cNvPr id="4" name="TextBox 3">
+            <a:extLst>
+              <a:ext uri="{FF2B5EF4-FFF2-40B4-BE49-F238E27FC236}">
+                <a16:creationId xmlns:a16="http://schemas.microsoft.com/office/drawing/2014/main" id="{D8ECD6E7-0E54-BCF2-09CA-FCA7772CA821}"/>
+              </a:ext>
+            </a:extLst>
+          </p:cNvPr>
+          <p:cNvSpPr txBox="1"/>
+          <p:nvPr/>
+        </p:nvSpPr>
+        <p:spPr>
+          <a:xfrm>
+            <a:off x="9218140" y="2433199"/>
+            <a:ext cx="13808055" cy="8849602"/>
+          </a:xfrm>
+          <a:prstGeom prst="rect">
+            <a:avLst/>
+          </a:prstGeom>
+          <a:noFill/>
+          <a:ln w="12700" cap="flat">
+            <a:noFill/>
+            <a:miter lim="400000"/>
+          </a:ln>
+          <a:effectLst/>
+          <a:sp3d/>
+        </p:spPr>
+        <p:style>
+          <a:lnRef idx="0">
+            <a:scrgbClr r="0" g="0" b="0"/>
+          </a:lnRef>
+          <a:fillRef idx="0">
+            <a:scrgbClr r="0" g="0" b="0"/>
+          </a:fillRef>
+          <a:effectRef idx="0">
+            <a:scrgbClr r="0" g="0" b="0"/>
+          </a:effectRef>
+          <a:fontRef idx="none"/>
+        </p:style>
+        <p:txBody>
+          <a:bodyPr rot="0" spcFirstLastPara="1" vertOverflow="overflow" horzOverflow="overflow" vert="horz" wrap="square" lIns="50800" tIns="50800" rIns="50800" bIns="50800" numCol="1" spcCol="38100" rtlCol="0" anchor="ctr">
+            <a:spAutoFit/>
+          </a:bodyPr>
+          <a:lstStyle/>
+          <a:p>
+            <a:pPr marL="0" marR="0" indent="0" defTabSz="821531" rtl="0" fontAlgn="auto" latinLnBrk="0" hangingPunct="0">
+              <a:lnSpc>
+                <a:spcPct val="120000"/>
+              </a:lnSpc>
+              <a:spcBef>
+                <a:spcPts val="1500"/>
+              </a:spcBef>
+              <a:spcAft>
+                <a:spcPts val="0"/>
+              </a:spcAft>
+              <a:buClrTx/>
+              <a:buSzTx/>
+              <a:buFontTx/>
+              <a:buNone/>
+              <a:tabLst/>
+            </a:pPr>
+            <a:r>
+              <a:rPr lang="en-US" sz="3600" dirty="0">
+                <a:solidFill>
+                  <a:schemeClr val="bg2"/>
+                </a:solidFill>
+              </a:rPr>
+              <a:t>I am a software engineer with more than 8 years of experience. I joined Endava near the end of 2024.</a:t>
+            </a:r>
+          </a:p>
+          <a:p>
+            <a:pPr marL="0" marR="0" indent="0" defTabSz="821531" rtl="0" fontAlgn="auto" latinLnBrk="0" hangingPunct="0">
+              <a:lnSpc>
+                <a:spcPct val="120000"/>
+              </a:lnSpc>
+              <a:spcBef>
+                <a:spcPts val="1500"/>
+              </a:spcBef>
+              <a:spcAft>
+                <a:spcPts val="0"/>
+              </a:spcAft>
+              <a:buClrTx/>
+              <a:buSzTx/>
+              <a:buFontTx/>
+              <a:buNone/>
+              <a:tabLst/>
+            </a:pPr>
+            <a:r>
+              <a:rPr lang="en-US" sz="3600" dirty="0">
+                <a:solidFill>
+                  <a:schemeClr val="bg2"/>
+                </a:solidFill>
+              </a:rPr>
+              <a:t> Most of my experience comes from a previous telemedicine project, where I’ve worked as a backend developer for its various applications (SQL Server Database, .NET Web Api, WPF, MVC) developing new features, integrating new medical devices, and also adjusting the Angular frontend when needed. I’ve also done some junior/intern mentoring in the later years. </a:t>
+            </a:r>
+          </a:p>
+          <a:p>
+            <a:pPr marL="0" marR="0" indent="0" defTabSz="821531" rtl="0" fontAlgn="auto" latinLnBrk="0" hangingPunct="0">
+              <a:lnSpc>
+                <a:spcPct val="120000"/>
+              </a:lnSpc>
+              <a:spcBef>
+                <a:spcPts val="1500"/>
+              </a:spcBef>
+              <a:spcAft>
+                <a:spcPts val="0"/>
+              </a:spcAft>
+              <a:buClrTx/>
+              <a:buSzTx/>
+              <a:buFontTx/>
+              <a:buNone/>
+              <a:tabLst/>
+            </a:pPr>
+            <a:r>
+              <a:rPr lang="en-US" sz="3600" dirty="0">
+                <a:solidFill>
+                  <a:schemeClr val="bg2"/>
+                </a:solidFill>
+              </a:rPr>
+              <a:t>Outside of work I’m passionate about programming, video games, and piano.</a:t>
+            </a:r>
+          </a:p>
+          <a:p>
+            <a:pPr marL="0" marR="0" indent="0" defTabSz="821531" rtl="0" fontAlgn="auto" latinLnBrk="0" hangingPunct="0">
+              <a:lnSpc>
+                <a:spcPct val="120000"/>
+              </a:lnSpc>
+              <a:spcBef>
+                <a:spcPts val="1500"/>
+              </a:spcBef>
+              <a:spcAft>
+                <a:spcPts val="0"/>
+              </a:spcAft>
+              <a:buClrTx/>
+              <a:buSzTx/>
+              <a:buFontTx/>
+              <a:buNone/>
+              <a:tabLst/>
+            </a:pPr>
+            <a:endParaRPr kumimoji="0" lang="en-US" sz="3600" b="0" i="0" u="none" strike="noStrike" cap="none" spc="0" normalizeH="0" baseline="0" dirty="0">
+              <a:ln>
+                <a:noFill/>
+              </a:ln>
+              <a:solidFill>
+                <a:schemeClr val="bg2"/>
+              </a:solidFill>
+              <a:effectLst/>
+              <a:uFillTx/>
+              <a:latin typeface="+mn-lt"/>
+              <a:ea typeface="+mn-ea"/>
+              <a:cs typeface="+mn-cs"/>
+              <a:sym typeface="Poppins Regular"/>
+            </a:endParaRPr>
+          </a:p>
+        </p:txBody>
+      </p:sp>
+      <p:pic>
+        <p:nvPicPr>
+          <p:cNvPr id="5" name="Picture 4" descr="A person taking a selfie&#10;&#10;AI-generated content may be incorrect.">
+            <a:extLst>
+              <a:ext uri="{FF2B5EF4-FFF2-40B4-BE49-F238E27FC236}">
+                <a16:creationId xmlns:a16="http://schemas.microsoft.com/office/drawing/2014/main" id="{E00D265B-D4B2-46FD-4198-84F6C2604817}"/>
+              </a:ext>
+            </a:extLst>
+          </p:cNvPr>
+          <p:cNvPicPr>
+            <a:picLocks noChangeAspect="1"/>
+          </p:cNvPicPr>
+          <p:nvPr/>
+        </p:nvPicPr>
+        <p:blipFill>
+          <a:blip r:embed="rId2">
+            <a:extLst>
+              <a:ext uri="{28A0092B-C50C-407E-A947-70E740481C1C}">
+                <a14:useLocalDpi xmlns:a14="http://schemas.microsoft.com/office/drawing/2010/main" val="0"/>
+              </a:ext>
+            </a:extLst>
+          </a:blip>
+          <a:stretch>
+            <a:fillRect/>
+          </a:stretch>
+        </p:blipFill>
+        <p:spPr>
+          <a:xfrm>
+            <a:off x="2368166" y="4000840"/>
+            <a:ext cx="3414056" cy="4442845"/>
+          </a:xfrm>
+          <a:prstGeom prst="ellipse">
+            <a:avLst/>
+          </a:prstGeom>
+          <a:ln>
+            <a:noFill/>
+          </a:ln>
+          <a:effectLst>
+            <a:softEdge rad="112500"/>
+          </a:effectLst>
+        </p:spPr>
+      </p:pic>
+    </p:spTree>
+    <p:extLst>
+      <p:ext uri="{BB962C8B-B14F-4D97-AF65-F5344CB8AC3E}">
+        <p14:creationId xmlns:p14="http://schemas.microsoft.com/office/powerpoint/2010/main" val="2370860523"/>
+      </p:ext>
+    </p:extLst>
+  </p:cSld>
+  <p:clrMapOvr>
+    <a:masterClrMapping/>
+  </p:clrMapOvr>
+  <p:transition spd="med"/>
+</p:sld>
+</file>
+
+<file path=ppt/slides/slide20.xml><?xml version="1.0" encoding="utf-8"?>
+<p:sld xmlns:a="http://schemas.openxmlformats.org/drawingml/2006/main" xmlns:r="http://schemas.openxmlformats.org/officeDocument/2006/relationships" xmlns:p="http://schemas.openxmlformats.org/presentationml/2006/main">
+  <p:cSld>
+    <p:spTree>
+      <p:nvGrpSpPr>
+        <p:cNvPr id="1" name="">
+          <a:extLst>
+            <a:ext uri="{FF2B5EF4-FFF2-40B4-BE49-F238E27FC236}">
+              <a16:creationId xmlns:a16="http://schemas.microsoft.com/office/drawing/2014/main" id="{F491BCA1-5B8B-F1F5-2B57-3AAD6CF0A3EC}"/>
+            </a:ext>
+          </a:extLst>
+        </p:cNvPr>
+        <p:cNvGrpSpPr/>
+        <p:nvPr/>
+      </p:nvGrpSpPr>
+      <p:grpSpPr>
+        <a:xfrm>
+          <a:off x="0" y="0"/>
+          <a:ext cx="0" cy="0"/>
+          <a:chOff x="0" y="0"/>
+          <a:chExt cx="0" cy="0"/>
+        </a:xfrm>
+      </p:grpSpPr>
+      <p:sp>
+        <p:nvSpPr>
+          <p:cNvPr id="6" name="Title 1">
+            <a:extLst>
+              <a:ext uri="{FF2B5EF4-FFF2-40B4-BE49-F238E27FC236}">
+                <a16:creationId xmlns:a16="http://schemas.microsoft.com/office/drawing/2014/main" id="{5342B8E7-DFBE-752D-DC8F-22B5B38B8BAC}"/>
+              </a:ext>
+            </a:extLst>
+          </p:cNvPr>
+          <p:cNvSpPr>
+            <a:spLocks noGrp="1"/>
+          </p:cNvSpPr>
+          <p:nvPr>
+            <p:ph type="title"/>
+          </p:nvPr>
+        </p:nvSpPr>
+        <p:spPr>
+          <a:xfrm>
+            <a:off x="1006004" y="1601792"/>
+            <a:ext cx="7716750" cy="1512111"/>
+          </a:xfrm>
+        </p:spPr>
+        <p:txBody>
+          <a:bodyPr/>
+          <a:lstStyle/>
+          <a:p>
+            <a:r>
+              <a:rPr lang="en-US" dirty="0"/>
+              <a:t>Bibliography</a:t>
+            </a:r>
+          </a:p>
+        </p:txBody>
+      </p:sp>
+      <p:sp>
+        <p:nvSpPr>
+          <p:cNvPr id="4" name="TextBox 3">
+            <a:extLst>
+              <a:ext uri="{FF2B5EF4-FFF2-40B4-BE49-F238E27FC236}">
+                <a16:creationId xmlns:a16="http://schemas.microsoft.com/office/drawing/2014/main" id="{27A37E45-5122-09D4-49BD-CCB288FC0376}"/>
+              </a:ext>
+            </a:extLst>
+          </p:cNvPr>
+          <p:cNvSpPr txBox="1"/>
+          <p:nvPr/>
+        </p:nvSpPr>
+        <p:spPr>
+          <a:xfrm>
+            <a:off x="1006004" y="4432506"/>
+            <a:ext cx="19927572" cy="1964640"/>
+          </a:xfrm>
+          <a:prstGeom prst="rect">
+            <a:avLst/>
+          </a:prstGeom>
+        </p:spPr>
+        <p:style>
+          <a:lnRef idx="0">
+            <a:scrgbClr r="0" g="0" b="0"/>
+          </a:lnRef>
+          <a:fillRef idx="0">
+            <a:scrgbClr r="0" g="0" b="0"/>
+          </a:fillRef>
+          <a:effectRef idx="0">
+            <a:scrgbClr r="0" g="0" b="0"/>
+          </a:effectRef>
+          <a:fontRef idx="none"/>
+        </p:style>
+        <p:txBody>
+          <a:bodyPr rot="0" spcFirstLastPara="1" vertOverflow="overflow" horzOverflow="overflow" vert="horz" wrap="square" lIns="50800" tIns="50800" rIns="50800" bIns="50800" numCol="1" spcCol="38100" rtlCol="0" anchor="ctr">
+            <a:spAutoFit/>
+          </a:bodyPr>
+          <a:lstStyle/>
+          <a:p>
+            <a:pPr marL="457200" marR="0" indent="-457200" algn="l" defTabSz="821531" rtl="0" fontAlgn="auto" latinLnBrk="0" hangingPunct="0">
+              <a:lnSpc>
+                <a:spcPct val="120000"/>
+              </a:lnSpc>
+              <a:spcBef>
+                <a:spcPts val="1500"/>
+              </a:spcBef>
+              <a:spcAft>
+                <a:spcPts val="0"/>
+              </a:spcAft>
+              <a:buClrTx/>
+              <a:buSzTx/>
+              <a:buFont typeface="Arial" panose="020B0604020202020204" pitchFamily="34" charset="0"/>
+              <a:buChar char="•"/>
+              <a:tabLst/>
+            </a:pPr>
+            <a:r>
+              <a:rPr kumimoji="0" lang="en-US" sz="4000" b="0" i="0" u="none" strike="noStrike" cap="none" spc="0" normalizeH="0" baseline="0" dirty="0">
+                <a:ln>
+                  <a:noFill/>
+                </a:ln>
+                <a:solidFill>
+                  <a:schemeClr val="bg2"/>
+                </a:solidFill>
+                <a:effectLst/>
+                <a:uFillTx/>
+                <a:latin typeface="+mn-lt"/>
+                <a:ea typeface="+mn-ea"/>
+                <a:cs typeface="+mn-cs"/>
+                <a:sym typeface="Poppins Regular"/>
+                <a:hlinkClick r:id="rId3"/>
+              </a:rPr>
+              <a:t>https://refactoring.guru/design-patterns/bridge</a:t>
+            </a:r>
+            <a:endParaRPr lang="en-US" sz="4000" dirty="0">
+              <a:solidFill>
+                <a:schemeClr val="bg2"/>
+              </a:solidFill>
+              <a:sym typeface="Poppins Regular"/>
+            </a:endParaRPr>
+          </a:p>
+          <a:p>
+            <a:pPr marL="457200" marR="0" indent="-457200" algn="l" defTabSz="821531" rtl="0" fontAlgn="auto" latinLnBrk="0" hangingPunct="0">
+              <a:lnSpc>
+                <a:spcPct val="120000"/>
+              </a:lnSpc>
+              <a:spcBef>
+                <a:spcPts val="1500"/>
+              </a:spcBef>
+              <a:spcAft>
+                <a:spcPts val="0"/>
+              </a:spcAft>
+              <a:buClrTx/>
+              <a:buSzTx/>
+              <a:buFont typeface="Arial" panose="020B0604020202020204" pitchFamily="34" charset="0"/>
+              <a:buChar char="•"/>
+              <a:tabLst/>
+            </a:pPr>
+            <a:r>
+              <a:rPr kumimoji="0" lang="en-US" sz="4000" b="0" i="0" u="none" strike="noStrike" cap="none" spc="0" normalizeH="0" baseline="0" dirty="0">
+                <a:ln>
+                  <a:noFill/>
+                </a:ln>
+                <a:solidFill>
+                  <a:schemeClr val="bg2"/>
+                </a:solidFill>
+                <a:effectLst/>
+                <a:uFillTx/>
+                <a:latin typeface="+mn-lt"/>
+                <a:ea typeface="+mn-ea"/>
+                <a:cs typeface="+mn-cs"/>
+                <a:sym typeface="Poppins Regular"/>
+                <a:hlinkClick r:id="rId4"/>
+              </a:rPr>
+              <a:t>https://refactoring.guru/design-patterns/prototype</a:t>
+            </a:r>
+            <a:endParaRPr kumimoji="0" lang="en-US" sz="4000" b="0" i="0" u="none" strike="noStrike" cap="none" spc="0" normalizeH="0" baseline="0" dirty="0">
+              <a:ln>
+                <a:noFill/>
+              </a:ln>
+              <a:solidFill>
+                <a:schemeClr val="bg2"/>
+              </a:solidFill>
+              <a:effectLst/>
+              <a:uFillTx/>
+              <a:latin typeface="+mn-lt"/>
+              <a:ea typeface="+mn-ea"/>
+              <a:cs typeface="+mn-cs"/>
+              <a:sym typeface="Poppins Regular"/>
+            </a:endParaRPr>
+          </a:p>
+        </p:txBody>
+      </p:sp>
+    </p:spTree>
+    <p:extLst>
+      <p:ext uri="{BB962C8B-B14F-4D97-AF65-F5344CB8AC3E}">
+        <p14:creationId xmlns:p14="http://schemas.microsoft.com/office/powerpoint/2010/main" val="78095804"/>
+      </p:ext>
+    </p:extLst>
+  </p:cSld>
+  <p:clrMapOvr>
+    <a:masterClrMapping/>
+  </p:clrMapOvr>
+  <p:transition spd="med"/>
+</p:sld>
+</file>
+
+<file path=ppt/slides/slide21.xml><?xml version="1.0" encoding="utf-8"?>
+<p:sld xmlns:a="http://schemas.openxmlformats.org/drawingml/2006/main" xmlns:r="http://schemas.openxmlformats.org/officeDocument/2006/relationships" xmlns:p="http://schemas.openxmlformats.org/presentationml/2006/main">
+  <p:cSld>
+    <p:spTree>
+      <p:nvGrpSpPr>
+        <p:cNvPr id="1" name="">
+          <a:extLst>
+            <a:ext uri="{FF2B5EF4-FFF2-40B4-BE49-F238E27FC236}">
+              <a16:creationId xmlns:a16="http://schemas.microsoft.com/office/drawing/2014/main" id="{FE64DC5B-6F34-AC8F-443F-12E728DCAB45}"/>
+            </a:ext>
+          </a:extLst>
+        </p:cNvPr>
+        <p:cNvGrpSpPr/>
+        <p:nvPr/>
+      </p:nvGrpSpPr>
+      <p:grpSpPr>
+        <a:xfrm>
+          <a:off x="0" y="0"/>
+          <a:ext cx="0" cy="0"/>
+          <a:chOff x="0" y="0"/>
+          <a:chExt cx="0" cy="0"/>
+        </a:xfrm>
+      </p:grpSpPr>
+      <p:sp>
+        <p:nvSpPr>
+          <p:cNvPr id="3" name="Title 2">
+            <a:extLst>
+              <a:ext uri="{FF2B5EF4-FFF2-40B4-BE49-F238E27FC236}">
+                <a16:creationId xmlns:a16="http://schemas.microsoft.com/office/drawing/2014/main" id="{5EE94DED-7A2B-B3D1-87FD-D1AD2901C16A}"/>
+              </a:ext>
+            </a:extLst>
+          </p:cNvPr>
+          <p:cNvSpPr>
+            <a:spLocks noGrp="1"/>
+          </p:cNvSpPr>
+          <p:nvPr>
+            <p:ph type="title"/>
+          </p:nvPr>
+        </p:nvSpPr>
+        <p:spPr>
+          <a:xfrm>
+            <a:off x="2352898" y="5710018"/>
+            <a:ext cx="19678204" cy="5957990"/>
+          </a:xfrm>
+        </p:spPr>
+        <p:txBody>
+          <a:bodyPr/>
+          <a:lstStyle/>
+          <a:p>
+            <a:pPr algn="ctr"/>
+            <a:r>
+              <a:rPr lang="en-US" dirty="0"/>
+              <a:t>Q &amp; A</a:t>
+            </a:r>
+          </a:p>
+        </p:txBody>
+      </p:sp>
+    </p:spTree>
+    <p:extLst>
+      <p:ext uri="{BB962C8B-B14F-4D97-AF65-F5344CB8AC3E}">
+        <p14:creationId xmlns:p14="http://schemas.microsoft.com/office/powerpoint/2010/main" val="3937631067"/>
+      </p:ext>
+    </p:extLst>
+  </p:cSld>
+  <p:clrMapOvr>
+    <a:masterClrMapping/>
+  </p:clrMapOvr>
+  <p:transition spd="med"/>
+</p:sld>
+</file>
+
+<file path=ppt/slides/slide22.xml><?xml version="1.0" encoding="utf-8"?>
+<p:sld xmlns:a="http://schemas.openxmlformats.org/drawingml/2006/main" xmlns:r="http://schemas.openxmlformats.org/officeDocument/2006/relationships" xmlns:p="http://schemas.openxmlformats.org/presentationml/2006/main">
+  <p:cSld>
+    <p:spTree>
+      <p:nvGrpSpPr>
+        <p:cNvPr id="1" name="">
+          <a:extLst>
+            <a:ext uri="{FF2B5EF4-FFF2-40B4-BE49-F238E27FC236}">
+              <a16:creationId xmlns:a16="http://schemas.microsoft.com/office/drawing/2014/main" id="{B788128B-3B66-6525-8963-92655AFB8C77}"/>
+            </a:ext>
+          </a:extLst>
+        </p:cNvPr>
+        <p:cNvGrpSpPr/>
+        <p:nvPr/>
+      </p:nvGrpSpPr>
+      <p:grpSpPr>
+        <a:xfrm>
+          <a:off x="0" y="0"/>
+          <a:ext cx="0" cy="0"/>
+          <a:chOff x="0" y="0"/>
+          <a:chExt cx="0" cy="0"/>
+        </a:xfrm>
+      </p:grpSpPr>
+      <p:sp>
+        <p:nvSpPr>
+          <p:cNvPr id="3" name="Title 2">
+            <a:extLst>
+              <a:ext uri="{FF2B5EF4-FFF2-40B4-BE49-F238E27FC236}">
+                <a16:creationId xmlns:a16="http://schemas.microsoft.com/office/drawing/2014/main" id="{74061CB3-B102-B6C1-96E5-E6801DBFB608}"/>
+              </a:ext>
+            </a:extLst>
+          </p:cNvPr>
+          <p:cNvSpPr>
+            <a:spLocks noGrp="1"/>
+          </p:cNvSpPr>
+          <p:nvPr>
+            <p:ph type="title"/>
+          </p:nvPr>
+        </p:nvSpPr>
+        <p:spPr>
+          <a:xfrm>
+            <a:off x="2352898" y="5710018"/>
+            <a:ext cx="19678204" cy="5957990"/>
+          </a:xfrm>
+        </p:spPr>
+        <p:txBody>
+          <a:bodyPr/>
+          <a:lstStyle/>
+          <a:p>
+            <a:pPr algn="ctr"/>
+            <a:r>
+              <a:rPr lang="en-US" dirty="0"/>
+              <a:t>Thank you</a:t>
+            </a:r>
+          </a:p>
+        </p:txBody>
+      </p:sp>
+    </p:spTree>
+    <p:extLst>
+      <p:ext uri="{BB962C8B-B14F-4D97-AF65-F5344CB8AC3E}">
+        <p14:creationId xmlns:p14="http://schemas.microsoft.com/office/powerpoint/2010/main" val="3438298875"/>
+      </p:ext>
+    </p:extLst>
+  </p:cSld>
+  <p:clrMapOvr>
+    <a:masterClrMapping/>
+  </p:clrMapOvr>
+  <p:transition spd="med"/>
+</p:sld>
+</file>
+
+<file path=ppt/slides/slide3.xml><?xml version="1.0" encoding="utf-8"?>
+<p:sld xmlns:a="http://schemas.openxmlformats.org/drawingml/2006/main" xmlns:r="http://schemas.openxmlformats.org/officeDocument/2006/relationships" xmlns:p="http://schemas.openxmlformats.org/presentationml/2006/main">
+  <p:cSld>
+    <p:spTree>
+      <p:nvGrpSpPr>
+        <p:cNvPr id="1" name="">
+          <a:extLst>
+            <a:ext uri="{FF2B5EF4-FFF2-40B4-BE49-F238E27FC236}">
+              <a16:creationId xmlns:a16="http://schemas.microsoft.com/office/drawing/2014/main" id="{ADFD551C-FBAC-BEB1-B270-5EA1978151D8}"/>
+            </a:ext>
+          </a:extLst>
+        </p:cNvPr>
+        <p:cNvGrpSpPr/>
+        <p:nvPr/>
+      </p:nvGrpSpPr>
+      <p:grpSpPr>
+        <a:xfrm>
+          <a:off x="0" y="0"/>
+          <a:ext cx="0" cy="0"/>
+          <a:chOff x="0" y="0"/>
+          <a:chExt cx="0" cy="0"/>
+        </a:xfrm>
+      </p:grpSpPr>
+      <p:sp>
+        <p:nvSpPr>
+          <p:cNvPr id="6" name="Title 1">
+            <a:extLst>
+              <a:ext uri="{FF2B5EF4-FFF2-40B4-BE49-F238E27FC236}">
+                <a16:creationId xmlns:a16="http://schemas.microsoft.com/office/drawing/2014/main" id="{1F5384B0-C5ED-D04C-B5FF-B5A25392AEAB}"/>
+              </a:ext>
+            </a:extLst>
+          </p:cNvPr>
+          <p:cNvSpPr>
+            <a:spLocks noGrp="1"/>
+          </p:cNvSpPr>
+          <p:nvPr>
+            <p:ph type="title"/>
+          </p:nvPr>
+        </p:nvSpPr>
+        <p:spPr>
+          <a:xfrm>
+            <a:off x="609600" y="1625600"/>
+            <a:ext cx="22085300" cy="2286000"/>
+          </a:xfrm>
+        </p:spPr>
+        <p:txBody>
+          <a:bodyPr anchor="ctr">
+            <a:normAutofit/>
+          </a:bodyPr>
+          <a:lstStyle/>
+          <a:p>
+            <a:r>
+              <a:rPr lang="en-US" dirty="0"/>
+              <a:t>Target audience</a:t>
+            </a:r>
+          </a:p>
+        </p:txBody>
+      </p:sp>
+      <p:sp>
+        <p:nvSpPr>
+          <p:cNvPr id="2" name="TextBox 1">
+            <a:extLst>
+              <a:ext uri="{FF2B5EF4-FFF2-40B4-BE49-F238E27FC236}">
+                <a16:creationId xmlns:a16="http://schemas.microsoft.com/office/drawing/2014/main" id="{92A1373A-69D4-0BF1-308D-9A57F19314D7}"/>
+              </a:ext>
+            </a:extLst>
+          </p:cNvPr>
+          <p:cNvSpPr txBox="1"/>
+          <p:nvPr/>
+        </p:nvSpPr>
+        <p:spPr>
+          <a:xfrm>
+            <a:off x="609600" y="4102100"/>
+            <a:ext cx="10852150" cy="8705088"/>
+          </a:xfrm>
+          <a:prstGeom prst="rect">
+            <a:avLst/>
+          </a:prstGeom>
+          <a:ln w="12700">
+            <a:miter lim="400000"/>
+          </a:ln>
+          <a:extLst>
+            <a:ext uri="{C572A759-6A51-4108-AA02-DFA0A04FC94B}">
+              <ma14:wrappingTextBoxFlag xmlns:m="http://schemas.openxmlformats.org/officeDocument/2006/math" xmlns:a14="http://schemas.microsoft.com/office/drawing/2010/main" xmlns:ma14="http://schemas.microsoft.com/office/mac/drawingml/2011/main" xmlns="" val="1"/>
+            </a:ext>
+          </a:extLst>
+        </p:spPr>
+        <p:style>
+          <a:lnRef idx="0">
+            <a:scrgbClr r="0" g="0" b="0"/>
+          </a:lnRef>
+          <a:fillRef idx="0">
+            <a:scrgbClr r="0" g="0" b="0"/>
+          </a:fillRef>
+          <a:effectRef idx="0">
+            <a:scrgbClr r="0" g="0" b="0"/>
+          </a:effectRef>
+          <a:fontRef idx="none"/>
+        </p:style>
+        <p:txBody>
+          <a:bodyPr rot="0" spcFirstLastPara="1" vertOverflow="overflow" horzOverflow="overflow" vert="horz" lIns="50800" tIns="50800" rIns="50800" bIns="50800" numCol="1" spcCol="38100" rtlCol="0" anchor="t">
+            <a:normAutofit/>
+          </a:bodyPr>
+          <a:lstStyle/>
+          <a:p>
+            <a:pPr marR="0" indent="-571500" fontAlgn="auto">
+              <a:spcBef>
+                <a:spcPts val="1500"/>
+              </a:spcBef>
+              <a:spcAft>
+                <a:spcPts val="0"/>
+              </a:spcAft>
+              <a:buClrTx/>
+              <a:buSzTx/>
+              <a:buFont typeface="Arial" panose="020B0604020202020204" pitchFamily="34" charset="0"/>
+              <a:buChar char="•"/>
+              <a:tabLst/>
+            </a:pPr>
+            <a:r>
+              <a:rPr kumimoji="0" lang="en-US" sz="4000" b="0" i="0" u="none" strike="noStrike" kern="1200" cap="none" spc="0" normalizeH="0" baseline="0">
+                <a:ln>
+                  <a:noFill/>
+                </a:ln>
+                <a:solidFill>
+                  <a:srgbClr val="FFFFFF"/>
+                </a:solidFill>
+                <a:effectLst/>
+                <a:uFillTx/>
+              </a:rPr>
+              <a:t>Developers</a:t>
+            </a:r>
+          </a:p>
+          <a:p>
+            <a:pPr marR="0" indent="-571500" fontAlgn="auto">
+              <a:spcBef>
+                <a:spcPts val="1500"/>
+              </a:spcBef>
+              <a:spcAft>
+                <a:spcPts val="0"/>
+              </a:spcAft>
+              <a:buClrTx/>
+              <a:buSzTx/>
+              <a:buFont typeface="Arial" panose="020B0604020202020204" pitchFamily="34" charset="0"/>
+              <a:buChar char="•"/>
+              <a:tabLst/>
+            </a:pPr>
+            <a:r>
+              <a:rPr lang="en-US" sz="4000" kern="1200">
+                <a:solidFill>
+                  <a:srgbClr val="FFFFFF"/>
+                </a:solidFill>
+              </a:rPr>
+              <a:t>Technical leads</a:t>
+            </a:r>
+            <a:endParaRPr kumimoji="0" lang="en-US" sz="4000" b="0" i="0" u="none" strike="noStrike" kern="1200" cap="none" spc="0" normalizeH="0" baseline="0">
+              <a:ln>
+                <a:noFill/>
+              </a:ln>
+              <a:solidFill>
+                <a:srgbClr val="FFFFFF"/>
+              </a:solidFill>
+              <a:effectLst/>
+              <a:uFillTx/>
+            </a:endParaRPr>
+          </a:p>
+        </p:txBody>
+      </p:sp>
+      <p:pic>
+        <p:nvPicPr>
+          <p:cNvPr id="2050" name="Picture 2" descr="Some Great Tips for Graphic Designers as Per New Trends | Articles ...">
+            <a:extLst>
+              <a:ext uri="{FF2B5EF4-FFF2-40B4-BE49-F238E27FC236}">
+                <a16:creationId xmlns:a16="http://schemas.microsoft.com/office/drawing/2014/main" id="{E6B9BE86-AD5C-E713-76A4-EB8055C56F98}"/>
+              </a:ext>
+            </a:extLst>
+          </p:cNvPr>
+          <p:cNvPicPr>
+            <a:picLocks noChangeAspect="1" noChangeArrowheads="1"/>
+          </p:cNvPicPr>
+          <p:nvPr/>
+        </p:nvPicPr>
+        <p:blipFill>
+          <a:blip r:embed="rId2">
+            <a:extLst>
+              <a:ext uri="{28A0092B-C50C-407E-A947-70E740481C1C}">
+                <a14:useLocalDpi xmlns:a14="http://schemas.microsoft.com/office/drawing/2010/main" val="0"/>
+              </a:ext>
+            </a:extLst>
+          </a:blip>
+          <a:srcRect l="6704" r="10082" b="-1"/>
+          <a:stretch>
+            <a:fillRect/>
+          </a:stretch>
+        </p:blipFill>
+        <p:spPr bwMode="auto">
+          <a:xfrm>
+            <a:off x="11842750" y="4102100"/>
+            <a:ext cx="10852150" cy="8705088"/>
+          </a:xfrm>
+          <a:prstGeom prst="rect">
+            <a:avLst/>
+          </a:prstGeom>
+          <a:solidFill>
+            <a:srgbClr val="FFFFFF"/>
+          </a:solidFill>
+          <a:ln w="12700">
+            <a:miter lim="400000"/>
+          </a:ln>
+          <a:extLst>
+            <a:ext uri="{909E8E84-426E-40DD-AFC4-6F175D3DCCD1}">
+              <a14:hiddenFill xmlns:a14="http://schemas.microsoft.com/office/drawing/2010/main">
+                <a:solidFill>
+                  <a:srgbClr val="FFFFFF"/>
+                </a:solidFill>
+              </a14:hiddenFill>
+            </a:ext>
+          </a:extLst>
+        </p:spPr>
+      </p:pic>
+    </p:spTree>
+    <p:extLst>
+      <p:ext uri="{BB962C8B-B14F-4D97-AF65-F5344CB8AC3E}">
+        <p14:creationId xmlns:p14="http://schemas.microsoft.com/office/powerpoint/2010/main" val="3527077400"/>
+      </p:ext>
+    </p:extLst>
+  </p:cSld>
+  <p:clrMapOvr>
+    <a:masterClrMapping/>
+  </p:clrMapOvr>
+  <p:transition spd="med"/>
+</p:sld>
+</file>
+
+<file path=ppt/slides/slide4.xml><?xml version="1.0" encoding="utf-8"?>
+<p:sld xmlns:a="http://schemas.openxmlformats.org/drawingml/2006/main" xmlns:r="http://schemas.openxmlformats.org/officeDocument/2006/relationships" xmlns:p="http://schemas.openxmlformats.org/presentationml/2006/main">
+  <p:cSld>
+    <p:spTree>
+      <p:nvGrpSpPr>
+        <p:cNvPr id="1" name="">
+          <a:extLst>
+            <a:ext uri="{FF2B5EF4-FFF2-40B4-BE49-F238E27FC236}">
+              <a16:creationId xmlns:a16="http://schemas.microsoft.com/office/drawing/2014/main" id="{7045AEAD-1D99-FE67-5BDC-98B0725A4465}"/>
+            </a:ext>
+          </a:extLst>
+        </p:cNvPr>
+        <p:cNvGrpSpPr/>
+        <p:nvPr/>
+      </p:nvGrpSpPr>
+      <p:grpSpPr>
+        <a:xfrm>
+          <a:off x="0" y="0"/>
+          <a:ext cx="0" cy="0"/>
+          <a:chOff x="0" y="0"/>
+          <a:chExt cx="0" cy="0"/>
+        </a:xfrm>
+      </p:grpSpPr>
+      <p:sp>
+        <p:nvSpPr>
+          <p:cNvPr id="6" name="Title 1">
+            <a:extLst>
+              <a:ext uri="{FF2B5EF4-FFF2-40B4-BE49-F238E27FC236}">
+                <a16:creationId xmlns:a16="http://schemas.microsoft.com/office/drawing/2014/main" id="{77677075-118B-C0A6-1234-3D1F9857DB17}"/>
+              </a:ext>
+            </a:extLst>
+          </p:cNvPr>
+          <p:cNvSpPr>
+            <a:spLocks noGrp="1"/>
+          </p:cNvSpPr>
+          <p:nvPr>
+            <p:ph type="title"/>
+          </p:nvPr>
+        </p:nvSpPr>
+        <p:spPr>
+          <a:xfrm>
+            <a:off x="1008184" y="1304885"/>
+            <a:ext cx="10859255" cy="1402948"/>
+          </a:xfrm>
+        </p:spPr>
+        <p:txBody>
+          <a:bodyPr/>
+          <a:lstStyle/>
+          <a:p>
+            <a:r>
+              <a:rPr lang="en-US" dirty="0"/>
+              <a:t>Introduction</a:t>
+            </a:r>
+          </a:p>
+        </p:txBody>
+      </p:sp>
+      <p:sp>
+        <p:nvSpPr>
+          <p:cNvPr id="3" name="TextBox 2">
+            <a:extLst>
+              <a:ext uri="{FF2B5EF4-FFF2-40B4-BE49-F238E27FC236}">
+                <a16:creationId xmlns:a16="http://schemas.microsoft.com/office/drawing/2014/main" id="{62B1C560-2BDE-847D-33EF-4C596A0C62F5}"/>
               </a:ext>
             </a:extLst>
           </p:cNvPr>
@@ -17176,7 +19285,7 @@
           <p:cNvPr id="4" name="TextBox 3">
             <a:extLst>
               <a:ext uri="{FF2B5EF4-FFF2-40B4-BE49-F238E27FC236}">
-                <a16:creationId xmlns:a16="http://schemas.microsoft.com/office/drawing/2014/main" id="{D8ECD6E7-0E54-BCF2-09CA-FCA7772CA821}"/>
+                <a16:creationId xmlns:a16="http://schemas.microsoft.com/office/drawing/2014/main" id="{88553654-773D-B17D-7F35-8FBE157F8DD7}"/>
               </a:ext>
             </a:extLst>
           </p:cNvPr>
@@ -17185,7 +19294,7 @@
         </p:nvSpPr>
         <p:spPr>
           <a:xfrm>
-            <a:off x="1042652" y="5562785"/>
+            <a:off x="1025418" y="4427591"/>
             <a:ext cx="21081402" cy="4860818"/>
           </a:xfrm>
           <a:prstGeom prst="rect">
@@ -17342,7 +19451,7 @@
     </p:spTree>
     <p:extLst>
       <p:ext uri="{BB962C8B-B14F-4D97-AF65-F5344CB8AC3E}">
-        <p14:creationId xmlns:p14="http://schemas.microsoft.com/office/powerpoint/2010/main" val="2370860523"/>
+        <p14:creationId xmlns:p14="http://schemas.microsoft.com/office/powerpoint/2010/main" val="2495409337"/>
       </p:ext>
     </p:extLst>
   </p:cSld>
@@ -17353,7 +19462,7 @@
 </p:sld>
 </file>
 
-<file path=ppt/slides/slide3.xml><?xml version="1.0" encoding="utf-8"?>
+<file path=ppt/slides/slide5.xml><?xml version="1.0" encoding="utf-8"?>
 <p:sld xmlns:a="http://schemas.openxmlformats.org/drawingml/2006/main" xmlns:r="http://schemas.openxmlformats.org/officeDocument/2006/relationships" xmlns:p="http://schemas.openxmlformats.org/presentationml/2006/main">
   <p:cSld>
     <p:spTree>
@@ -17394,8 +19503,8 @@
         </p:nvSpPr>
         <p:spPr>
           <a:xfrm>
-            <a:off x="1006004" y="1255829"/>
-            <a:ext cx="21120232" cy="1452004"/>
+            <a:off x="1006003" y="1566080"/>
+            <a:ext cx="11185997" cy="1364174"/>
           </a:xfrm>
         </p:spPr>
         <p:txBody>
@@ -17628,7 +19737,7 @@
 </p:sld>
 </file>
 
-<file path=ppt/slides/slide4.xml><?xml version="1.0" encoding="utf-8"?>
+<file path=ppt/slides/slide6.xml><?xml version="1.0" encoding="utf-8"?>
 <p:sld xmlns:a="http://schemas.openxmlformats.org/drawingml/2006/main" xmlns:r="http://schemas.openxmlformats.org/officeDocument/2006/relationships" xmlns:p="http://schemas.openxmlformats.org/presentationml/2006/main">
   <p:cSld>
     <p:spTree>
@@ -17669,8 +19778,8 @@
         </p:nvSpPr>
         <p:spPr>
           <a:xfrm>
-            <a:off x="1006004" y="1255829"/>
-            <a:ext cx="21120232" cy="1452004"/>
+            <a:off x="1040479" y="1597447"/>
+            <a:ext cx="6867845" cy="1294953"/>
           </a:xfrm>
         </p:spPr>
         <p:txBody>
@@ -18063,7 +20172,7 @@
 </p:sld>
 </file>
 
-<file path=ppt/slides/slide5.xml><?xml version="1.0" encoding="utf-8"?>
+<file path=ppt/slides/slide7.xml><?xml version="1.0" encoding="utf-8"?>
 <p:sld xmlns:a="http://schemas.openxmlformats.org/drawingml/2006/main" xmlns:r="http://schemas.openxmlformats.org/officeDocument/2006/relationships" xmlns:p="http://schemas.openxmlformats.org/presentationml/2006/main">
   <p:cSld>
     <p:spTree>
@@ -18104,8 +20213,8 @@
         </p:nvSpPr>
         <p:spPr>
           <a:xfrm>
-            <a:off x="1006004" y="1255829"/>
-            <a:ext cx="21120232" cy="1452004"/>
+            <a:off x="1006004" y="1619462"/>
+            <a:ext cx="7485683" cy="1452004"/>
           </a:xfrm>
         </p:spPr>
         <p:txBody>
@@ -18409,15 +20518,7 @@
                   <a:schemeClr val="bg2"/>
                 </a:solidFill>
               </a:rPr>
-              <a:t>Proxy – Provides a substitute or placeholder to control access to another </a:t>
-            </a:r>
-            <a:r>
-              <a:rPr lang="en-US" sz="3600" dirty="0" err="1">
-                <a:solidFill>
-                  <a:schemeClr val="bg2"/>
-                </a:solidFill>
-              </a:rPr>
-              <a:t>objec</a:t>
+              <a:t>Proxy – Provides a substitute or placeholder to control access to another object</a:t>
             </a:r>
             <a:endParaRPr kumimoji="0" lang="en-US" sz="3600" b="0" i="0" u="none" strike="noStrike" cap="none" spc="0" normalizeH="0" baseline="0" dirty="0">
               <a:ln>
@@ -18486,7 +20587,7 @@
 </p:sld>
 </file>
 
-<file path=ppt/slides/slide6.xml><?xml version="1.0" encoding="utf-8"?>
+<file path=ppt/slides/slide8.xml><?xml version="1.0" encoding="utf-8"?>
 <p:sld xmlns:a="http://schemas.openxmlformats.org/drawingml/2006/main" xmlns:r="http://schemas.openxmlformats.org/officeDocument/2006/relationships" xmlns:p="http://schemas.openxmlformats.org/presentationml/2006/main">
   <p:cSld>
     <p:spTree>
@@ -18527,8 +20628,8 @@
         </p:nvSpPr>
         <p:spPr>
           <a:xfrm>
-            <a:off x="1006004" y="1255829"/>
-            <a:ext cx="21120232" cy="1452004"/>
+            <a:off x="1006004" y="1574997"/>
+            <a:ext cx="6877607" cy="1402948"/>
           </a:xfrm>
         </p:spPr>
         <p:txBody>
@@ -18969,7 +21070,7 @@
 </p:sld>
 </file>
 
-<file path=ppt/slides/slide7.xml><?xml version="1.0" encoding="utf-8"?>
+<file path=ppt/slides/slide9.xml><?xml version="1.0" encoding="utf-8"?>
 <p:sld xmlns:a="http://schemas.openxmlformats.org/drawingml/2006/main" xmlns:r="http://schemas.openxmlformats.org/officeDocument/2006/relationships" xmlns:p="http://schemas.openxmlformats.org/presentationml/2006/main">
   <p:cSld>
     <p:spTree>
@@ -19010,8 +21111,8 @@
         </p:nvSpPr>
         <p:spPr>
           <a:xfrm>
-            <a:off x="1006004" y="1255829"/>
-            <a:ext cx="21120232" cy="1452004"/>
+            <a:off x="1006004" y="1623485"/>
+            <a:ext cx="6408050" cy="1402948"/>
           </a:xfrm>
         </p:spPr>
         <p:txBody>
@@ -19543,538 +21644,6 @@
     <p:extLst>
       <p:ext uri="{BB962C8B-B14F-4D97-AF65-F5344CB8AC3E}">
         <p14:creationId xmlns:p14="http://schemas.microsoft.com/office/powerpoint/2010/main" val="1656584900"/>
-      </p:ext>
-    </p:extLst>
-  </p:cSld>
-  <p:clrMapOvr>
-    <a:masterClrMapping/>
-  </p:clrMapOvr>
-  <p:transition spd="med"/>
-</p:sld>
-</file>
-
-<file path=ppt/slides/slide8.xml><?xml version="1.0" encoding="utf-8"?>
-<p:sld xmlns:a="http://schemas.openxmlformats.org/drawingml/2006/main" xmlns:r="http://schemas.openxmlformats.org/officeDocument/2006/relationships" xmlns:p="http://schemas.openxmlformats.org/presentationml/2006/main">
-  <p:cSld>
-    <p:spTree>
-      <p:nvGrpSpPr>
-        <p:cNvPr id="1" name="">
-          <a:extLst>
-            <a:ext uri="{FF2B5EF4-FFF2-40B4-BE49-F238E27FC236}">
-              <a16:creationId xmlns:a16="http://schemas.microsoft.com/office/drawing/2014/main" id="{0493754E-F329-12FE-2EC3-5CA42947A3A4}"/>
-            </a:ext>
-          </a:extLst>
-        </p:cNvPr>
-        <p:cNvGrpSpPr/>
-        <p:nvPr/>
-      </p:nvGrpSpPr>
-      <p:grpSpPr>
-        <a:xfrm>
-          <a:off x="0" y="0"/>
-          <a:ext cx="0" cy="0"/>
-          <a:chOff x="0" y="0"/>
-          <a:chExt cx="0" cy="0"/>
-        </a:xfrm>
-      </p:grpSpPr>
-      <p:sp>
-        <p:nvSpPr>
-          <p:cNvPr id="6" name="Title 1">
-            <a:extLst>
-              <a:ext uri="{FF2B5EF4-FFF2-40B4-BE49-F238E27FC236}">
-                <a16:creationId xmlns:a16="http://schemas.microsoft.com/office/drawing/2014/main" id="{E015503E-6998-4268-C1F5-6AFA2187BC5F}"/>
-              </a:ext>
-            </a:extLst>
-          </p:cNvPr>
-          <p:cNvSpPr>
-            <a:spLocks noGrp="1"/>
-          </p:cNvSpPr>
-          <p:nvPr>
-            <p:ph type="title"/>
-          </p:nvPr>
-        </p:nvSpPr>
-        <p:spPr>
-          <a:xfrm>
-            <a:off x="1006004" y="1255829"/>
-            <a:ext cx="21120232" cy="1452004"/>
-          </a:xfrm>
-        </p:spPr>
-        <p:txBody>
-          <a:bodyPr/>
-          <a:lstStyle/>
-          <a:p>
-            <a:r>
-              <a:rPr lang="en-US" dirty="0"/>
-              <a:t>Bridge</a:t>
-            </a:r>
-          </a:p>
-        </p:txBody>
-      </p:sp>
-      <p:sp>
-        <p:nvSpPr>
-          <p:cNvPr id="3" name="TextBox 2">
-            <a:extLst>
-              <a:ext uri="{FF2B5EF4-FFF2-40B4-BE49-F238E27FC236}">
-                <a16:creationId xmlns:a16="http://schemas.microsoft.com/office/drawing/2014/main" id="{1626B9A1-5239-6F2E-FE25-89AA3967ED7B}"/>
-              </a:ext>
-            </a:extLst>
-          </p:cNvPr>
-          <p:cNvSpPr txBox="1"/>
-          <p:nvPr/>
-        </p:nvSpPr>
-        <p:spPr>
-          <a:xfrm>
-            <a:off x="1006004" y="2707833"/>
-            <a:ext cx="13811965" cy="1402948"/>
-          </a:xfrm>
-          <a:prstGeom prst="rect">
-            <a:avLst/>
-          </a:prstGeom>
-        </p:spPr>
-        <p:style>
-          <a:lnRef idx="0">
-            <a:scrgbClr r="0" g="0" b="0"/>
-          </a:lnRef>
-          <a:fillRef idx="0">
-            <a:scrgbClr r="0" g="0" b="0"/>
-          </a:fillRef>
-          <a:effectRef idx="0">
-            <a:scrgbClr r="0" g="0" b="0"/>
-          </a:effectRef>
-          <a:fontRef idx="none"/>
-        </p:style>
-        <p:txBody>
-          <a:bodyPr rot="0" spcFirstLastPara="1" vertOverflow="overflow" horzOverflow="overflow" vert="horz" wrap="square" lIns="50800" tIns="50800" rIns="50800" bIns="50800" numCol="1" spcCol="38100" rtlCol="0" anchor="ctr">
-            <a:spAutoFit/>
-          </a:bodyPr>
-          <a:lstStyle/>
-          <a:p>
-            <a:pPr marL="0" marR="0" indent="0" algn="l" defTabSz="821531" rtl="0" fontAlgn="auto" latinLnBrk="0" hangingPunct="0">
-              <a:lnSpc>
-                <a:spcPct val="120000"/>
-              </a:lnSpc>
-              <a:spcBef>
-                <a:spcPts val="1500"/>
-              </a:spcBef>
-              <a:spcAft>
-                <a:spcPts val="0"/>
-              </a:spcAft>
-              <a:buClrTx/>
-              <a:buSzTx/>
-              <a:buFontTx/>
-              <a:buNone/>
-              <a:tabLst/>
-            </a:pPr>
-            <a:r>
-              <a:rPr lang="en-US" sz="6000" dirty="0">
-                <a:solidFill>
-                  <a:schemeClr val="bg2"/>
-                </a:solidFill>
-              </a:rPr>
-              <a:t>Real life application context:</a:t>
-            </a:r>
-          </a:p>
-        </p:txBody>
-      </p:sp>
-      <p:sp>
-        <p:nvSpPr>
-          <p:cNvPr id="2" name="TextBox 1">
-            <a:extLst>
-              <a:ext uri="{FF2B5EF4-FFF2-40B4-BE49-F238E27FC236}">
-                <a16:creationId xmlns:a16="http://schemas.microsoft.com/office/drawing/2014/main" id="{3D890230-94CE-6452-273D-D57E6FA9EF88}"/>
-              </a:ext>
-            </a:extLst>
-          </p:cNvPr>
-          <p:cNvSpPr txBox="1"/>
-          <p:nvPr/>
-        </p:nvSpPr>
-        <p:spPr>
-          <a:xfrm>
-            <a:off x="1006004" y="4848476"/>
-            <a:ext cx="22371992" cy="4019049"/>
-          </a:xfrm>
-          <a:prstGeom prst="rect">
-            <a:avLst/>
-          </a:prstGeom>
-          <a:noFill/>
-          <a:ln w="12700" cap="flat">
-            <a:noFill/>
-            <a:miter lim="400000"/>
-          </a:ln>
-          <a:effectLst/>
-          <a:sp3d/>
-        </p:spPr>
-        <p:style>
-          <a:lnRef idx="0">
-            <a:scrgbClr r="0" g="0" b="0"/>
-          </a:lnRef>
-          <a:fillRef idx="0">
-            <a:scrgbClr r="0" g="0" b="0"/>
-          </a:fillRef>
-          <a:effectRef idx="0">
-            <a:scrgbClr r="0" g="0" b="0"/>
-          </a:effectRef>
-          <a:fontRef idx="none"/>
-        </p:style>
-        <p:txBody>
-          <a:bodyPr rot="0" spcFirstLastPara="1" vertOverflow="overflow" horzOverflow="overflow" vert="horz" wrap="square" lIns="50800" tIns="50800" rIns="50800" bIns="50800" numCol="1" spcCol="38100" rtlCol="0" anchor="ctr">
-            <a:spAutoFit/>
-          </a:bodyPr>
-          <a:lstStyle/>
-          <a:p>
-            <a:pPr marL="457200" marR="0" indent="-457200" algn="l" defTabSz="821531" rtl="0" fontAlgn="auto" latinLnBrk="0" hangingPunct="0">
-              <a:lnSpc>
-                <a:spcPct val="120000"/>
-              </a:lnSpc>
-              <a:spcBef>
-                <a:spcPts val="1500"/>
-              </a:spcBef>
-              <a:spcAft>
-                <a:spcPts val="0"/>
-              </a:spcAft>
-              <a:buClrTx/>
-              <a:buSzTx/>
-              <a:buFont typeface="Arial" panose="020B0604020202020204" pitchFamily="34" charset="0"/>
-              <a:buChar char="•"/>
-              <a:tabLst/>
-            </a:pPr>
-            <a:r>
-              <a:rPr kumimoji="0" lang="en-US" sz="3200" b="0" i="0" u="none" strike="noStrike" cap="none" spc="0" normalizeH="0" baseline="0" dirty="0">
-                <a:ln>
-                  <a:noFill/>
-                </a:ln>
-                <a:solidFill>
-                  <a:schemeClr val="bg2"/>
-                </a:solidFill>
-                <a:effectLst/>
-                <a:uFillTx/>
-                <a:latin typeface="+mn-lt"/>
-                <a:ea typeface="+mn-ea"/>
-                <a:cs typeface="+mn-cs"/>
-                <a:sym typeface="Poppins Regular"/>
-              </a:rPr>
-              <a:t>A medical booth for remote consultations equipped with medical devices for performing various </a:t>
-            </a:r>
-          </a:p>
-          <a:p>
-            <a:pPr marL="0" marR="0" indent="0" algn="l" defTabSz="821531" rtl="0" fontAlgn="auto" latinLnBrk="0" hangingPunct="0">
-              <a:lnSpc>
-                <a:spcPct val="120000"/>
-              </a:lnSpc>
-              <a:spcBef>
-                <a:spcPts val="1500"/>
-              </a:spcBef>
-              <a:spcAft>
-                <a:spcPts val="0"/>
-              </a:spcAft>
-              <a:buClrTx/>
-              <a:buSzTx/>
-              <a:buFontTx/>
-              <a:buNone/>
-              <a:tabLst/>
-            </a:pPr>
-            <a:r>
-              <a:rPr kumimoji="0" lang="en-US" sz="3200" b="0" i="0" u="none" strike="noStrike" cap="none" spc="0" normalizeH="0" baseline="0" dirty="0">
-                <a:ln>
-                  <a:noFill/>
-                </a:ln>
-                <a:solidFill>
-                  <a:schemeClr val="bg2"/>
-                </a:solidFill>
-                <a:effectLst/>
-                <a:uFillTx/>
-                <a:latin typeface="+mn-lt"/>
-                <a:ea typeface="+mn-ea"/>
-                <a:cs typeface="+mn-cs"/>
-                <a:sym typeface="Poppins Regular"/>
-              </a:rPr>
-              <a:t>measurements (blood pressure, oximetry, weight).</a:t>
-            </a:r>
-          </a:p>
-          <a:p>
-            <a:pPr marL="457200" marR="0" indent="-457200" algn="l" defTabSz="821531" rtl="0" fontAlgn="auto" latinLnBrk="0" hangingPunct="0">
-              <a:lnSpc>
-                <a:spcPct val="120000"/>
-              </a:lnSpc>
-              <a:spcBef>
-                <a:spcPts val="1500"/>
-              </a:spcBef>
-              <a:spcAft>
-                <a:spcPts val="0"/>
-              </a:spcAft>
-              <a:buClrTx/>
-              <a:buSzTx/>
-              <a:buFont typeface="Arial" panose="020B0604020202020204" pitchFamily="34" charset="0"/>
-              <a:buChar char="•"/>
-              <a:tabLst/>
-            </a:pPr>
-            <a:r>
-              <a:rPr kumimoji="0" lang="en-US" sz="3200" b="0" i="0" u="none" strike="noStrike" cap="none" spc="0" normalizeH="0" baseline="0" dirty="0">
-                <a:ln>
-                  <a:noFill/>
-                </a:ln>
-                <a:solidFill>
-                  <a:schemeClr val="bg2"/>
-                </a:solidFill>
-                <a:effectLst/>
-                <a:uFillTx/>
-                <a:latin typeface="+mn-lt"/>
-                <a:ea typeface="+mn-ea"/>
-                <a:cs typeface="+mn-cs"/>
-                <a:sym typeface="Poppins Regular"/>
-              </a:rPr>
-              <a:t>The booth communicates with each device using a C# driver (which implements the </a:t>
-            </a:r>
-          </a:p>
-          <a:p>
-            <a:pPr marL="0" marR="0" indent="0" algn="l" defTabSz="821531" rtl="0" fontAlgn="auto" latinLnBrk="0" hangingPunct="0">
-              <a:lnSpc>
-                <a:spcPct val="120000"/>
-              </a:lnSpc>
-              <a:spcBef>
-                <a:spcPts val="1500"/>
-              </a:spcBef>
-              <a:spcAft>
-                <a:spcPts val="0"/>
-              </a:spcAft>
-              <a:buClrTx/>
-              <a:buSzTx/>
-              <a:buFontTx/>
-              <a:buNone/>
-              <a:tabLst/>
-            </a:pPr>
-            <a:r>
-              <a:rPr kumimoji="0" lang="en-US" sz="3200" b="0" i="0" u="none" strike="noStrike" cap="none" spc="0" normalizeH="0" baseline="0" dirty="0">
-                <a:ln>
-                  <a:noFill/>
-                </a:ln>
-                <a:solidFill>
-                  <a:schemeClr val="bg2"/>
-                </a:solidFill>
-                <a:effectLst/>
-                <a:uFillTx/>
-                <a:latin typeface="+mn-lt"/>
-                <a:ea typeface="+mn-ea"/>
-                <a:cs typeface="+mn-cs"/>
-                <a:sym typeface="Poppins Regular"/>
-              </a:rPr>
-              <a:t>communication protocol provided by manufacturer).</a:t>
-            </a:r>
-          </a:p>
-          <a:p>
-            <a:pPr marL="457200" indent="-457200" defTabSz="821531" hangingPunct="0">
-              <a:lnSpc>
-                <a:spcPct val="120000"/>
-              </a:lnSpc>
-              <a:spcBef>
-                <a:spcPts val="1500"/>
-              </a:spcBef>
-              <a:buFont typeface="Arial" panose="020B0604020202020204" pitchFamily="34" charset="0"/>
-              <a:buChar char="•"/>
-            </a:pPr>
-            <a:r>
-              <a:rPr kumimoji="0" lang="en-US" sz="3200" b="0" i="0" u="none" strike="noStrike" cap="none" spc="0" normalizeH="0" baseline="0" dirty="0">
-                <a:ln>
-                  <a:noFill/>
-                </a:ln>
-                <a:solidFill>
-                  <a:schemeClr val="bg2"/>
-                </a:solidFill>
-                <a:effectLst/>
-                <a:uFillTx/>
-                <a:latin typeface="+mn-lt"/>
-                <a:ea typeface="+mn-ea"/>
-                <a:cs typeface="+mn-cs"/>
-                <a:sym typeface="Poppins Regular"/>
-              </a:rPr>
-              <a:t>The problem: </a:t>
-            </a:r>
-            <a:r>
-              <a:rPr lang="en-US" sz="3200" dirty="0">
-                <a:solidFill>
-                  <a:schemeClr val="bg2"/>
-                </a:solidFill>
-                <a:sym typeface="Poppins Regular"/>
-              </a:rPr>
-              <a:t>The drivers were evolving in different dimensions.</a:t>
-            </a:r>
-          </a:p>
-        </p:txBody>
-      </p:sp>
-    </p:spTree>
-    <p:extLst>
-      <p:ext uri="{BB962C8B-B14F-4D97-AF65-F5344CB8AC3E}">
-        <p14:creationId xmlns:p14="http://schemas.microsoft.com/office/powerpoint/2010/main" val="3767381252"/>
-      </p:ext>
-    </p:extLst>
-  </p:cSld>
-  <p:clrMapOvr>
-    <a:masterClrMapping/>
-  </p:clrMapOvr>
-  <p:transition spd="med"/>
-</p:sld>
-</file>
-
-<file path=ppt/slides/slide9.xml><?xml version="1.0" encoding="utf-8"?>
-<p:sld xmlns:a="http://schemas.openxmlformats.org/drawingml/2006/main" xmlns:r="http://schemas.openxmlformats.org/officeDocument/2006/relationships" xmlns:p="http://schemas.openxmlformats.org/presentationml/2006/main">
-  <p:cSld>
-    <p:spTree>
-      <p:nvGrpSpPr>
-        <p:cNvPr id="1" name="">
-          <a:extLst>
-            <a:ext uri="{FF2B5EF4-FFF2-40B4-BE49-F238E27FC236}">
-              <a16:creationId xmlns:a16="http://schemas.microsoft.com/office/drawing/2014/main" id="{8E3C7DE0-7813-7B38-8A01-827AB2DA94ED}"/>
-            </a:ext>
-          </a:extLst>
-        </p:cNvPr>
-        <p:cNvGrpSpPr/>
-        <p:nvPr/>
-      </p:nvGrpSpPr>
-      <p:grpSpPr>
-        <a:xfrm>
-          <a:off x="0" y="0"/>
-          <a:ext cx="0" cy="0"/>
-          <a:chOff x="0" y="0"/>
-          <a:chExt cx="0" cy="0"/>
-        </a:xfrm>
-      </p:grpSpPr>
-      <p:sp>
-        <p:nvSpPr>
-          <p:cNvPr id="6" name="Title 1">
-            <a:extLst>
-              <a:ext uri="{FF2B5EF4-FFF2-40B4-BE49-F238E27FC236}">
-                <a16:creationId xmlns:a16="http://schemas.microsoft.com/office/drawing/2014/main" id="{EA9FF163-2E35-9F16-6224-D4C5E670A89F}"/>
-              </a:ext>
-            </a:extLst>
-          </p:cNvPr>
-          <p:cNvSpPr>
-            <a:spLocks noGrp="1"/>
-          </p:cNvSpPr>
-          <p:nvPr>
-            <p:ph type="title"/>
-          </p:nvPr>
-        </p:nvSpPr>
-        <p:spPr>
-          <a:xfrm>
-            <a:off x="1006004" y="1255829"/>
-            <a:ext cx="21120232" cy="1452004"/>
-          </a:xfrm>
-        </p:spPr>
-        <p:txBody>
-          <a:bodyPr/>
-          <a:lstStyle/>
-          <a:p>
-            <a:r>
-              <a:rPr lang="en-US" dirty="0"/>
-              <a:t>Bridge</a:t>
-            </a:r>
-          </a:p>
-        </p:txBody>
-      </p:sp>
-      <p:sp>
-        <p:nvSpPr>
-          <p:cNvPr id="3" name="TextBox 2">
-            <a:extLst>
-              <a:ext uri="{FF2B5EF4-FFF2-40B4-BE49-F238E27FC236}">
-                <a16:creationId xmlns:a16="http://schemas.microsoft.com/office/drawing/2014/main" id="{708520F1-5CB1-3E72-1463-566343371991}"/>
-              </a:ext>
-            </a:extLst>
-          </p:cNvPr>
-          <p:cNvSpPr txBox="1"/>
-          <p:nvPr/>
-        </p:nvSpPr>
-        <p:spPr>
-          <a:xfrm>
-            <a:off x="1006004" y="2707833"/>
-            <a:ext cx="13811965" cy="1402948"/>
-          </a:xfrm>
-          <a:prstGeom prst="rect">
-            <a:avLst/>
-          </a:prstGeom>
-        </p:spPr>
-        <p:style>
-          <a:lnRef idx="0">
-            <a:scrgbClr r="0" g="0" b="0"/>
-          </a:lnRef>
-          <a:fillRef idx="0">
-            <a:scrgbClr r="0" g="0" b="0"/>
-          </a:fillRef>
-          <a:effectRef idx="0">
-            <a:scrgbClr r="0" g="0" b="0"/>
-          </a:effectRef>
-          <a:fontRef idx="none"/>
-        </p:style>
-        <p:txBody>
-          <a:bodyPr rot="0" spcFirstLastPara="1" vertOverflow="overflow" horzOverflow="overflow" vert="horz" wrap="square" lIns="50800" tIns="50800" rIns="50800" bIns="50800" numCol="1" spcCol="38100" rtlCol="0" anchor="ctr">
-            <a:spAutoFit/>
-          </a:bodyPr>
-          <a:lstStyle/>
-          <a:p>
-            <a:pPr marL="0" marR="0" indent="0" algn="l" defTabSz="821531" rtl="0" fontAlgn="auto" latinLnBrk="0" hangingPunct="0">
-              <a:lnSpc>
-                <a:spcPct val="120000"/>
-              </a:lnSpc>
-              <a:spcBef>
-                <a:spcPts val="1500"/>
-              </a:spcBef>
-              <a:spcAft>
-                <a:spcPts val="0"/>
-              </a:spcAft>
-              <a:buClrTx/>
-              <a:buSzTx/>
-              <a:buFontTx/>
-              <a:buNone/>
-              <a:tabLst/>
-            </a:pPr>
-            <a:r>
-              <a:rPr lang="en-US" sz="6000" dirty="0">
-                <a:solidFill>
-                  <a:schemeClr val="bg2"/>
-                </a:solidFill>
-              </a:rPr>
-              <a:t>The problem</a:t>
-            </a:r>
-          </a:p>
-        </p:txBody>
-      </p:sp>
-      <p:pic>
-        <p:nvPicPr>
-          <p:cNvPr id="10" name="Picture Placeholder 7" descr="A diagram of a device&#10;&#10;Description automatically generated">
-            <a:extLst>
-              <a:ext uri="{FF2B5EF4-FFF2-40B4-BE49-F238E27FC236}">
-                <a16:creationId xmlns:a16="http://schemas.microsoft.com/office/drawing/2014/main" id="{287354BD-7291-E8E8-7CC7-8E1DB2133063}"/>
-              </a:ext>
-            </a:extLst>
-          </p:cNvPr>
-          <p:cNvPicPr>
-            <a:picLocks noChangeAspect="1"/>
-          </p:cNvPicPr>
-          <p:nvPr/>
-        </p:nvPicPr>
-        <p:blipFill>
-          <a:blip r:embed="rId3">
-            <a:extLst>
-              <a:ext uri="{28A0092B-C50C-407E-A947-70E740481C1C}">
-                <a14:useLocalDpi xmlns:a14="http://schemas.microsoft.com/office/drawing/2010/main" val="0"/>
-              </a:ext>
-            </a:extLst>
-          </a:blip>
-          <a:srcRect l="-1744" t="-1498" r="-951" b="-2111"/>
-          <a:stretch/>
-        </p:blipFill>
-        <p:spPr>
-          <a:xfrm>
-            <a:off x="4516284" y="4605314"/>
-            <a:ext cx="15351431" cy="8660230"/>
-          </a:xfrm>
-          <a:prstGeom prst="rect">
-            <a:avLst/>
-          </a:prstGeom>
-        </p:spPr>
-      </p:pic>
-    </p:spTree>
-    <p:extLst>
-      <p:ext uri="{BB962C8B-B14F-4D97-AF65-F5344CB8AC3E}">
-        <p14:creationId xmlns:p14="http://schemas.microsoft.com/office/powerpoint/2010/main" val="3640432184"/>
       </p:ext>
     </p:extLst>
   </p:cSld>

</xml_diff>